<commit_message>
Updated slide 2 and 3.  Intro and Data source
</commit_message>
<xml_diff>
--- a/Reducing_Attrition_AnEdit.pptx
+++ b/Reducing_Attrition_AnEdit.pptx
@@ -204,7 +204,7 @@
           <a:p>
             <a:fld id="{380F82E0-DA90-F642-BDF9-D28F7CF5A168}" type="datetimeFigureOut">
               <a:rPr lang="en-US" smtClean="0"/>
-              <a:t>8/4/2018</a:t>
+              <a:t>8/4/18</a:t>
             </a:fld>
             <a:endParaRPr lang="en-US"/>
           </a:p>
@@ -663,7 +663,7 @@
             <a:fld id="{B61BEF0D-F0BB-DE4B-95CE-6DB70DBA9567}" type="datetimeFigureOut">
               <a:rPr lang="en-US" dirty="0"/>
               <a:pPr/>
-              <a:t>8/4/2018</a:t>
+              <a:t>8/4/18</a:t>
             </a:fld>
             <a:endParaRPr lang="en-US" dirty="0"/>
           </a:p>
@@ -1096,7 +1096,7 @@
             <a:fld id="{B61BEF0D-F0BB-DE4B-95CE-6DB70DBA9567}" type="datetimeFigureOut">
               <a:rPr lang="en-US" dirty="0"/>
               <a:pPr/>
-              <a:t>8/4/2018</a:t>
+              <a:t>8/4/18</a:t>
             </a:fld>
             <a:endParaRPr lang="en-US" dirty="0"/>
           </a:p>
@@ -1343,7 +1343,7 @@
             <a:fld id="{B61BEF0D-F0BB-DE4B-95CE-6DB70DBA9567}" type="datetimeFigureOut">
               <a:rPr lang="en-US" dirty="0"/>
               <a:pPr/>
-              <a:t>8/4/2018</a:t>
+              <a:t>8/4/18</a:t>
             </a:fld>
             <a:endParaRPr lang="en-US" dirty="0"/>
           </a:p>
@@ -1648,7 +1648,7 @@
             <a:fld id="{B61BEF0D-F0BB-DE4B-95CE-6DB70DBA9567}" type="datetimeFigureOut">
               <a:rPr lang="en-US" dirty="0"/>
               <a:pPr/>
-              <a:t>8/4/2018</a:t>
+              <a:t>8/4/18</a:t>
             </a:fld>
             <a:endParaRPr lang="en-US" dirty="0"/>
           </a:p>
@@ -1963,7 +1963,7 @@
             <a:fld id="{B61BEF0D-F0BB-DE4B-95CE-6DB70DBA9567}" type="datetimeFigureOut">
               <a:rPr lang="en-US" dirty="0"/>
               <a:pPr/>
-              <a:t>8/4/2018</a:t>
+              <a:t>8/4/18</a:t>
             </a:fld>
             <a:endParaRPr lang="en-US" dirty="0"/>
           </a:p>
@@ -2262,7 +2262,7 @@
             <a:fld id="{B61BEF0D-F0BB-DE4B-95CE-6DB70DBA9567}" type="datetimeFigureOut">
               <a:rPr lang="en-US" dirty="0"/>
               <a:pPr/>
-              <a:t>8/4/2018</a:t>
+              <a:t>8/4/18</a:t>
             </a:fld>
             <a:endParaRPr lang="en-US" dirty="0"/>
           </a:p>
@@ -2626,7 +2626,7 @@
             <a:fld id="{B61BEF0D-F0BB-DE4B-95CE-6DB70DBA9567}" type="datetimeFigureOut">
               <a:rPr lang="en-US" dirty="0"/>
               <a:pPr/>
-              <a:t>8/4/2018</a:t>
+              <a:t>8/4/18</a:t>
             </a:fld>
             <a:endParaRPr lang="en-US" dirty="0"/>
           </a:p>
@@ -2797,7 +2797,7 @@
             <a:fld id="{B61BEF0D-F0BB-DE4B-95CE-6DB70DBA9567}" type="datetimeFigureOut">
               <a:rPr lang="en-US" dirty="0"/>
               <a:pPr/>
-              <a:t>8/4/2018</a:t>
+              <a:t>8/4/18</a:t>
             </a:fld>
             <a:endParaRPr lang="en-US" dirty="0"/>
           </a:p>
@@ -2974,7 +2974,7 @@
             <a:fld id="{B61BEF0D-F0BB-DE4B-95CE-6DB70DBA9567}" type="datetimeFigureOut">
               <a:rPr lang="en-US" dirty="0"/>
               <a:pPr/>
-              <a:t>8/4/2018</a:t>
+              <a:t>8/4/18</a:t>
             </a:fld>
             <a:endParaRPr lang="en-US" dirty="0"/>
           </a:p>
@@ -3141,7 +3141,7 @@
             <a:fld id="{B61BEF0D-F0BB-DE4B-95CE-6DB70DBA9567}" type="datetimeFigureOut">
               <a:rPr lang="en-US" dirty="0"/>
               <a:pPr/>
-              <a:t>8/4/2018</a:t>
+              <a:t>8/4/18</a:t>
             </a:fld>
             <a:endParaRPr lang="en-US" dirty="0"/>
           </a:p>
@@ -3388,7 +3388,7 @@
             <a:fld id="{B61BEF0D-F0BB-DE4B-95CE-6DB70DBA9567}" type="datetimeFigureOut">
               <a:rPr lang="en-US" dirty="0"/>
               <a:pPr/>
-              <a:t>8/4/2018</a:t>
+              <a:t>8/4/18</a:t>
             </a:fld>
             <a:endParaRPr lang="en-US" dirty="0"/>
           </a:p>
@@ -3621,7 +3621,7 @@
             <a:fld id="{B61BEF0D-F0BB-DE4B-95CE-6DB70DBA9567}" type="datetimeFigureOut">
               <a:rPr lang="en-US" dirty="0"/>
               <a:pPr/>
-              <a:t>8/4/2018</a:t>
+              <a:t>8/4/18</a:t>
             </a:fld>
             <a:endParaRPr lang="en-US" dirty="0"/>
           </a:p>
@@ -4000,7 +4000,7 @@
             <a:fld id="{B61BEF0D-F0BB-DE4B-95CE-6DB70DBA9567}" type="datetimeFigureOut">
               <a:rPr lang="en-US" dirty="0"/>
               <a:pPr/>
-              <a:t>8/4/2018</a:t>
+              <a:t>8/4/18</a:t>
             </a:fld>
             <a:endParaRPr lang="en-US" dirty="0"/>
           </a:p>
@@ -4115,7 +4115,7 @@
             <a:fld id="{B61BEF0D-F0BB-DE4B-95CE-6DB70DBA9567}" type="datetimeFigureOut">
               <a:rPr lang="en-US" dirty="0"/>
               <a:pPr/>
-              <a:t>8/4/2018</a:t>
+              <a:t>8/4/18</a:t>
             </a:fld>
             <a:endParaRPr lang="en-US" dirty="0"/>
           </a:p>
@@ -4207,7 +4207,7 @@
             <a:fld id="{B61BEF0D-F0BB-DE4B-95CE-6DB70DBA9567}" type="datetimeFigureOut">
               <a:rPr lang="en-US" dirty="0"/>
               <a:pPr/>
-              <a:t>8/4/2018</a:t>
+              <a:t>8/4/18</a:t>
             </a:fld>
             <a:endParaRPr lang="en-US" dirty="0"/>
           </a:p>
@@ -4459,7 +4459,7 @@
             <a:fld id="{B61BEF0D-F0BB-DE4B-95CE-6DB70DBA9567}" type="datetimeFigureOut">
               <a:rPr lang="en-US" dirty="0"/>
               <a:pPr/>
-              <a:t>8/4/2018</a:t>
+              <a:t>8/4/18</a:t>
             </a:fld>
             <a:endParaRPr lang="en-US" dirty="0"/>
           </a:p>
@@ -4739,7 +4739,7 @@
             <a:fld id="{B61BEF0D-F0BB-DE4B-95CE-6DB70DBA9567}" type="datetimeFigureOut">
               <a:rPr lang="en-US" dirty="0"/>
               <a:pPr/>
-              <a:t>8/4/2018</a:t>
+              <a:t>8/4/18</a:t>
             </a:fld>
             <a:endParaRPr lang="en-US" dirty="0"/>
           </a:p>
@@ -5142,7 +5142,7 @@
             <a:fld id="{B61BEF0D-F0BB-DE4B-95CE-6DB70DBA9567}" type="datetimeFigureOut">
               <a:rPr lang="en-US" dirty="0"/>
               <a:pPr/>
-              <a:t>8/4/2018</a:t>
+              <a:t>8/4/18</a:t>
             </a:fld>
             <a:endParaRPr lang="en-US" dirty="0"/>
           </a:p>
@@ -5688,6 +5688,10 @@
           <a:bodyPr/>
           <a:lstStyle/>
           <a:p>
+            <a:r>
+              <a:rPr lang="en-US" dirty="0"/>
+              <a:t/>
+            </a:r>
             <a:br>
               <a:rPr lang="en-US" dirty="0"/>
             </a:br>
@@ -6016,51 +6020,49 @@
         </p:nvSpPr>
         <p:spPr>
           <a:xfrm>
-            <a:off x="684213" y="1193800"/>
-            <a:ext cx="3173803" cy="371953"/>
+            <a:off x="557211" y="1970171"/>
+            <a:ext cx="3275753" cy="1042441"/>
           </a:xfrm>
         </p:spPr>
         <p:txBody>
-          <a:bodyPr/>
-          <a:lstStyle/>
-          <a:p>
-            <a:r>
-              <a:rPr lang="en-US" dirty="0"/>
-              <a:t>Total Observations:  1470</a:t>
-            </a:r>
-          </a:p>
-        </p:txBody>
-      </p:sp>
-      <p:sp>
-        <p:nvSpPr>
-          <p:cNvPr id="4" name="TextBox 3"/>
-          <p:cNvSpPr txBox="1"/>
-          <p:nvPr/>
-        </p:nvSpPr>
-        <p:spPr>
-          <a:xfrm>
-            <a:off x="1095831" y="1546187"/>
-            <a:ext cx="3137966" cy="369332"/>
-          </a:xfrm>
-          <a:prstGeom prst="rect">
-            <a:avLst/>
-          </a:prstGeom>
-          <a:noFill/>
-        </p:spPr>
-        <p:txBody>
-          <a:bodyPr wrap="square" rtlCol="0">
-            <a:spAutoFit/>
+          <a:bodyPr>
+            <a:normAutofit fontScale="92500" lnSpcReduction="20000"/>
           </a:bodyPr>
           <a:lstStyle/>
           <a:p>
             <a:r>
-              <a:rPr lang="en-US" dirty="0">
+              <a:rPr lang="en-US" b="1" u="sng" dirty="0" smtClean="0">
                 <a:solidFill>
                   <a:srgbClr val="002060"/>
                 </a:solidFill>
               </a:rPr>
-              <a:t>Total Variables:  35</a:t>
-            </a:r>
+              <a:t>Data Dimension</a:t>
+            </a:r>
+          </a:p>
+          <a:p>
+            <a:r>
+              <a:rPr lang="en-US" dirty="0" smtClean="0">
+                <a:solidFill>
+                  <a:srgbClr val="002060"/>
+                </a:solidFill>
+              </a:rPr>
+              <a:t>Total Observations: 1470</a:t>
+            </a:r>
+          </a:p>
+          <a:p>
+            <a:r>
+              <a:rPr lang="en-US" dirty="0" smtClean="0">
+                <a:solidFill>
+                  <a:srgbClr val="002060"/>
+                </a:solidFill>
+              </a:rPr>
+              <a:t>Total Variables	 :  35</a:t>
+            </a:r>
+            <a:endParaRPr lang="en-US" dirty="0">
+              <a:solidFill>
+                <a:srgbClr val="002060"/>
+              </a:solidFill>
+            </a:endParaRPr>
           </a:p>
         </p:txBody>
       </p:sp>
@@ -6086,8 +6088,8 @@
         </p:blipFill>
         <p:spPr>
           <a:xfrm>
-            <a:off x="623473" y="2083240"/>
-            <a:ext cx="4659985" cy="4553210"/>
+            <a:off x="7954027" y="2015143"/>
+            <a:ext cx="4036800" cy="4280798"/>
           </a:xfrm>
           <a:prstGeom prst="rect">
             <a:avLst/>
@@ -6102,7 +6104,7 @@
         </p:nvSpPr>
         <p:spPr>
           <a:xfrm>
-            <a:off x="2038034" y="4568719"/>
+            <a:off x="9091612" y="4155541"/>
             <a:ext cx="789140" cy="369332"/>
           </a:xfrm>
           <a:prstGeom prst="rect">
@@ -6131,7 +6133,7 @@
         </p:nvSpPr>
         <p:spPr>
           <a:xfrm>
-            <a:off x="3573322" y="5227476"/>
+            <a:off x="10412533" y="4906218"/>
             <a:ext cx="569387" cy="369332"/>
           </a:xfrm>
           <a:prstGeom prst="rect">
@@ -6154,14 +6156,14 @@
       </p:sp>
       <p:sp>
         <p:nvSpPr>
-          <p:cNvPr id="13" name="TextBox 12"/>
+          <p:cNvPr id="5" name="TextBox 4"/>
           <p:cNvSpPr txBox="1"/>
           <p:nvPr/>
         </p:nvSpPr>
         <p:spPr>
           <a:xfrm>
-            <a:off x="7072131" y="2708475"/>
-            <a:ext cx="3272050" cy="646331"/>
+            <a:off x="557211" y="5372611"/>
+            <a:ext cx="3689112" cy="923330"/>
           </a:xfrm>
           <a:prstGeom prst="rect">
             <a:avLst/>
@@ -6169,21 +6171,270 @@
           <a:noFill/>
         </p:spPr>
         <p:txBody>
+          <a:bodyPr wrap="square" rtlCol="0">
+            <a:spAutoFit/>
+          </a:bodyPr>
+          <a:lstStyle/>
+          <a:p>
+            <a:r>
+              <a:rPr lang="en-US" b="1" u="sng" dirty="0" smtClean="0">
+                <a:solidFill>
+                  <a:srgbClr val="002060"/>
+                </a:solidFill>
+              </a:rPr>
+              <a:t>Excluded Variables: </a:t>
+            </a:r>
+          </a:p>
+          <a:p>
+            <a:r>
+              <a:rPr lang="en-US" dirty="0" err="1" smtClean="0">
+                <a:solidFill>
+                  <a:srgbClr val="002060"/>
+                </a:solidFill>
+              </a:rPr>
+              <a:t>HeadCount</a:t>
+            </a:r>
+            <a:r>
+              <a:rPr lang="en-US" dirty="0" smtClean="0">
+                <a:solidFill>
+                  <a:srgbClr val="002060"/>
+                </a:solidFill>
+              </a:rPr>
+              <a:t>, </a:t>
+            </a:r>
+            <a:r>
+              <a:rPr lang="en-US" dirty="0" err="1" smtClean="0">
+                <a:solidFill>
+                  <a:srgbClr val="002060"/>
+                </a:solidFill>
+              </a:rPr>
+              <a:t>EmployeeID</a:t>
+            </a:r>
+            <a:r>
+              <a:rPr lang="en-US" dirty="0" smtClean="0">
+                <a:solidFill>
+                  <a:srgbClr val="002060"/>
+                </a:solidFill>
+              </a:rPr>
+              <a:t>, Over18, </a:t>
+            </a:r>
+            <a:r>
+              <a:rPr lang="en-US" dirty="0" err="1" smtClean="0">
+                <a:solidFill>
+                  <a:srgbClr val="002060"/>
+                </a:solidFill>
+              </a:rPr>
+              <a:t>StdHours</a:t>
+            </a:r>
+            <a:endParaRPr lang="en-US" dirty="0">
+              <a:solidFill>
+                <a:srgbClr val="002060"/>
+              </a:solidFill>
+            </a:endParaRPr>
+          </a:p>
+        </p:txBody>
+      </p:sp>
+      <p:sp>
+        <p:nvSpPr>
+          <p:cNvPr id="6" name="TextBox 5"/>
+          <p:cNvSpPr txBox="1"/>
+          <p:nvPr/>
+        </p:nvSpPr>
+        <p:spPr>
+          <a:xfrm>
+            <a:off x="557211" y="1130103"/>
+            <a:ext cx="11001730" cy="646331"/>
+          </a:xfrm>
+          <a:prstGeom prst="rect">
+            <a:avLst/>
+          </a:prstGeom>
+          <a:noFill/>
+        </p:spPr>
+        <p:txBody>
           <a:bodyPr wrap="none" rtlCol="0">
             <a:spAutoFit/>
           </a:bodyPr>
           <a:lstStyle/>
           <a:p>
             <a:r>
-              <a:rPr lang="en-US"/>
-              <a:t>ANDY to add more content</a:t>
-            </a:r>
-          </a:p>
-          <a:p>
-            <a:endParaRPr lang="en-US" dirty="0"/>
-          </a:p>
-        </p:txBody>
-      </p:sp>
+              <a:rPr lang="en-US" b="1" dirty="0" smtClean="0">
+                <a:solidFill>
+                  <a:srgbClr val="002060"/>
+                </a:solidFill>
+              </a:rPr>
+              <a:t>Summary: </a:t>
+            </a:r>
+            <a:r>
+              <a:rPr lang="en-US" dirty="0" smtClean="0">
+                <a:solidFill>
+                  <a:srgbClr val="002060"/>
+                </a:solidFill>
+              </a:rPr>
+              <a:t>The dataset provided required minimal tidying.  There was no missing data (i.e. NA).  It </a:t>
+            </a:r>
+          </a:p>
+          <a:p>
+            <a:r>
+              <a:rPr lang="en-US" dirty="0">
+                <a:solidFill>
+                  <a:srgbClr val="002060"/>
+                </a:solidFill>
+              </a:rPr>
+              <a:t>i</a:t>
+            </a:r>
+            <a:r>
+              <a:rPr lang="en-US" dirty="0" smtClean="0">
+                <a:solidFill>
+                  <a:srgbClr val="002060"/>
+                </a:solidFill>
+              </a:rPr>
+              <a:t>ncluded both personal and professional data on employee from various departments.</a:t>
+            </a:r>
+            <a:endParaRPr lang="en-US" dirty="0">
+              <a:solidFill>
+                <a:srgbClr val="002060"/>
+              </a:solidFill>
+            </a:endParaRPr>
+          </a:p>
+        </p:txBody>
+      </p:sp>
+      <p:sp>
+        <p:nvSpPr>
+          <p:cNvPr id="7" name="TextBox 6"/>
+          <p:cNvSpPr txBox="1"/>
+          <p:nvPr/>
+        </p:nvSpPr>
+        <p:spPr>
+          <a:xfrm>
+            <a:off x="557211" y="3323270"/>
+            <a:ext cx="2353770" cy="923330"/>
+          </a:xfrm>
+          <a:prstGeom prst="rect">
+            <a:avLst/>
+          </a:prstGeom>
+          <a:noFill/>
+        </p:spPr>
+        <p:txBody>
+          <a:bodyPr wrap="square" rtlCol="0">
+            <a:spAutoFit/>
+          </a:bodyPr>
+          <a:lstStyle/>
+          <a:p>
+            <a:r>
+              <a:rPr lang="en-US" b="1" u="sng" dirty="0" smtClean="0">
+                <a:solidFill>
+                  <a:srgbClr val="002060"/>
+                </a:solidFill>
+              </a:rPr>
+              <a:t>Data Class Type</a:t>
+            </a:r>
+          </a:p>
+          <a:p>
+            <a:r>
+              <a:rPr lang="en-US" dirty="0" smtClean="0">
+                <a:solidFill>
+                  <a:srgbClr val="002060"/>
+                </a:solidFill>
+              </a:rPr>
+              <a:t>Numeric 	: 25</a:t>
+            </a:r>
+          </a:p>
+          <a:p>
+            <a:r>
+              <a:rPr lang="en-US" dirty="0" smtClean="0">
+                <a:solidFill>
+                  <a:srgbClr val="002060"/>
+                </a:solidFill>
+              </a:rPr>
+              <a:t>Character	: 10</a:t>
+            </a:r>
+            <a:endParaRPr lang="en-US" dirty="0">
+              <a:solidFill>
+                <a:srgbClr val="002060"/>
+              </a:solidFill>
+            </a:endParaRPr>
+          </a:p>
+        </p:txBody>
+      </p:sp>
+      <p:sp>
+        <p:nvSpPr>
+          <p:cNvPr id="8" name="TextBox 7"/>
+          <p:cNvSpPr txBox="1"/>
+          <p:nvPr/>
+        </p:nvSpPr>
+        <p:spPr>
+          <a:xfrm>
+            <a:off x="557211" y="4608818"/>
+            <a:ext cx="3093928" cy="677108"/>
+          </a:xfrm>
+          <a:prstGeom prst="rect">
+            <a:avLst/>
+          </a:prstGeom>
+          <a:noFill/>
+        </p:spPr>
+        <p:txBody>
+          <a:bodyPr wrap="square" rtlCol="0">
+            <a:spAutoFit/>
+          </a:bodyPr>
+          <a:lstStyle/>
+          <a:p>
+            <a:r>
+              <a:rPr lang="en-US" b="1" u="sng" dirty="0" smtClean="0">
+                <a:solidFill>
+                  <a:srgbClr val="002060"/>
+                </a:solidFill>
+              </a:rPr>
+              <a:t>Length &gt; 12 Variables</a:t>
+            </a:r>
+          </a:p>
+          <a:p>
+            <a:pPr lvl="1"/>
+            <a:r>
+              <a:rPr lang="en-US" sz="2000" dirty="0" smtClean="0">
+                <a:solidFill>
+                  <a:srgbClr val="002060"/>
+                </a:solidFill>
+              </a:rPr>
+              <a:t>	23</a:t>
+            </a:r>
+            <a:endParaRPr lang="en-US" sz="2000" dirty="0">
+              <a:solidFill>
+                <a:srgbClr val="002060"/>
+              </a:solidFill>
+            </a:endParaRPr>
+          </a:p>
+        </p:txBody>
+      </p:sp>
+      <p:pic>
+        <p:nvPicPr>
+          <p:cNvPr id="12" name="Picture 11"/>
+          <p:cNvPicPr>
+            <a:picLocks noChangeAspect="1"/>
+          </p:cNvPicPr>
+          <p:nvPr/>
+        </p:nvPicPr>
+        <p:blipFill>
+          <a:blip r:embed="rId3">
+            <a:extLst>
+              <a:ext uri="{28A0092B-C50C-407E-A947-70E740481C1C}">
+                <a14:useLocalDpi xmlns:a14="http://schemas.microsoft.com/office/drawing/2010/main" val="0"/>
+              </a:ext>
+            </a:extLst>
+          </a:blip>
+          <a:stretch>
+            <a:fillRect/>
+          </a:stretch>
+        </p:blipFill>
+        <p:spPr>
+          <a:xfrm>
+            <a:off x="3635986" y="2015142"/>
+            <a:ext cx="3811383" cy="4280799"/>
+          </a:xfrm>
+          <a:prstGeom prst="rect">
+            <a:avLst/>
+          </a:prstGeom>
+        </p:spPr>
+      </p:pic>
     </p:spTree>
     <p:extLst>
       <p:ext uri="{BB962C8B-B14F-4D97-AF65-F5344CB8AC3E}">
@@ -6354,7 +6605,7 @@
           <p:cNvPr id="5" name="Table 4">
             <a:extLst>
               <a:ext uri="{FF2B5EF4-FFF2-40B4-BE49-F238E27FC236}">
-                <a16:creationId xmlns:a16="http://schemas.microsoft.com/office/drawing/2014/main" id="{B703D80E-7F52-4EC4-8019-B211F825CC91}"/>
+                <a16:creationId xmlns:a16="http://schemas.microsoft.com/office/drawing/2014/main" xmlns="" id="{B703D80E-7F52-4EC4-8019-B211F825CC91}"/>
               </a:ext>
             </a:extLst>
           </p:cNvPr>
@@ -6383,49 +6634,49 @@
                 <a:gridCol w="2686368">
                   <a:extLst>
                     <a:ext uri="{9D8B030D-6E8A-4147-A177-3AD203B41FA5}">
-                      <a16:colId xmlns:a16="http://schemas.microsoft.com/office/drawing/2014/main" val="2088784793"/>
+                      <a16:colId xmlns:a16="http://schemas.microsoft.com/office/drawing/2014/main" xmlns="" val="2088784793"/>
                     </a:ext>
                   </a:extLst>
                 </a:gridCol>
                 <a:gridCol w="1071880">
                   <a:extLst>
                     <a:ext uri="{9D8B030D-6E8A-4147-A177-3AD203B41FA5}">
-                      <a16:colId xmlns:a16="http://schemas.microsoft.com/office/drawing/2014/main" val="44769478"/>
+                      <a16:colId xmlns:a16="http://schemas.microsoft.com/office/drawing/2014/main" xmlns="" val="44769478"/>
                     </a:ext>
                   </a:extLst>
                 </a:gridCol>
                 <a:gridCol w="1071880">
                   <a:extLst>
                     <a:ext uri="{9D8B030D-6E8A-4147-A177-3AD203B41FA5}">
-                      <a16:colId xmlns:a16="http://schemas.microsoft.com/office/drawing/2014/main" val="2042025665"/>
+                      <a16:colId xmlns:a16="http://schemas.microsoft.com/office/drawing/2014/main" xmlns="" val="2042025665"/>
                     </a:ext>
                   </a:extLst>
                 </a:gridCol>
                 <a:gridCol w="1092518">
                   <a:extLst>
                     <a:ext uri="{9D8B030D-6E8A-4147-A177-3AD203B41FA5}">
-                      <a16:colId xmlns:a16="http://schemas.microsoft.com/office/drawing/2014/main" val="3310055283"/>
+                      <a16:colId xmlns:a16="http://schemas.microsoft.com/office/drawing/2014/main" xmlns="" val="3310055283"/>
                     </a:ext>
                   </a:extLst>
                 </a:gridCol>
                 <a:gridCol w="1071880">
                   <a:extLst>
                     <a:ext uri="{9D8B030D-6E8A-4147-A177-3AD203B41FA5}">
-                      <a16:colId xmlns:a16="http://schemas.microsoft.com/office/drawing/2014/main" val="3606606852"/>
+                      <a16:colId xmlns:a16="http://schemas.microsoft.com/office/drawing/2014/main" xmlns="" val="3606606852"/>
                     </a:ext>
                   </a:extLst>
                 </a:gridCol>
                 <a:gridCol w="1071880">
                   <a:extLst>
                     <a:ext uri="{9D8B030D-6E8A-4147-A177-3AD203B41FA5}">
-                      <a16:colId xmlns:a16="http://schemas.microsoft.com/office/drawing/2014/main" val="801426414"/>
+                      <a16:colId xmlns:a16="http://schemas.microsoft.com/office/drawing/2014/main" xmlns="" val="801426414"/>
                     </a:ext>
                   </a:extLst>
                 </a:gridCol>
                 <a:gridCol w="1217785">
                   <a:extLst>
                     <a:ext uri="{9D8B030D-6E8A-4147-A177-3AD203B41FA5}">
-                      <a16:colId xmlns:a16="http://schemas.microsoft.com/office/drawing/2014/main" val="2064332225"/>
+                      <a16:colId xmlns:a16="http://schemas.microsoft.com/office/drawing/2014/main" xmlns="" val="2064332225"/>
                     </a:ext>
                   </a:extLst>
                 </a:gridCol>
@@ -6543,7 +6794,7 @@
                 </a:tc>
                 <a:extLst>
                   <a:ext uri="{0D108BD9-81ED-4DB2-BD59-A6C34878D82A}">
-                    <a16:rowId xmlns:a16="http://schemas.microsoft.com/office/drawing/2014/main" val="4011550691"/>
+                    <a16:rowId xmlns:a16="http://schemas.microsoft.com/office/drawing/2014/main" xmlns="" val="4011550691"/>
                   </a:ext>
                 </a:extLst>
               </a:tr>
@@ -6647,7 +6898,7 @@
                 </a:tc>
                 <a:extLst>
                   <a:ext uri="{0D108BD9-81ED-4DB2-BD59-A6C34878D82A}">
-                    <a16:rowId xmlns:a16="http://schemas.microsoft.com/office/drawing/2014/main" val="4283831565"/>
+                    <a16:rowId xmlns:a16="http://schemas.microsoft.com/office/drawing/2014/main" xmlns="" val="4283831565"/>
                   </a:ext>
                 </a:extLst>
               </a:tr>
@@ -6751,7 +7002,7 @@
                 </a:tc>
                 <a:extLst>
                   <a:ext uri="{0D108BD9-81ED-4DB2-BD59-A6C34878D82A}">
-                    <a16:rowId xmlns:a16="http://schemas.microsoft.com/office/drawing/2014/main" val="1934653851"/>
+                    <a16:rowId xmlns:a16="http://schemas.microsoft.com/office/drawing/2014/main" xmlns="" val="1934653851"/>
                   </a:ext>
                 </a:extLst>
               </a:tr>
@@ -6840,7 +7091,7 @@
                 </a:tc>
                 <a:extLst>
                   <a:ext uri="{0D108BD9-81ED-4DB2-BD59-A6C34878D82A}">
-                    <a16:rowId xmlns:a16="http://schemas.microsoft.com/office/drawing/2014/main" val="3996762099"/>
+                    <a16:rowId xmlns:a16="http://schemas.microsoft.com/office/drawing/2014/main" xmlns="" val="3996762099"/>
                   </a:ext>
                 </a:extLst>
               </a:tr>
@@ -6945,7 +7196,7 @@
                 </a:tc>
                 <a:extLst>
                   <a:ext uri="{0D108BD9-81ED-4DB2-BD59-A6C34878D82A}">
-                    <a16:rowId xmlns:a16="http://schemas.microsoft.com/office/drawing/2014/main" val="3424020629"/>
+                    <a16:rowId xmlns:a16="http://schemas.microsoft.com/office/drawing/2014/main" xmlns="" val="3424020629"/>
                   </a:ext>
                 </a:extLst>
               </a:tr>
@@ -7049,7 +7300,7 @@
                 </a:tc>
                 <a:extLst>
                   <a:ext uri="{0D108BD9-81ED-4DB2-BD59-A6C34878D82A}">
-                    <a16:rowId xmlns:a16="http://schemas.microsoft.com/office/drawing/2014/main" val="2676320322"/>
+                    <a16:rowId xmlns:a16="http://schemas.microsoft.com/office/drawing/2014/main" xmlns="" val="2676320322"/>
                   </a:ext>
                 </a:extLst>
               </a:tr>
@@ -7153,7 +7404,7 @@
                 </a:tc>
                 <a:extLst>
                   <a:ext uri="{0D108BD9-81ED-4DB2-BD59-A6C34878D82A}">
-                    <a16:rowId xmlns:a16="http://schemas.microsoft.com/office/drawing/2014/main" val="1617085218"/>
+                    <a16:rowId xmlns:a16="http://schemas.microsoft.com/office/drawing/2014/main" xmlns="" val="1617085218"/>
                   </a:ext>
                 </a:extLst>
               </a:tr>
@@ -7257,7 +7508,7 @@
                 </a:tc>
                 <a:extLst>
                   <a:ext uri="{0D108BD9-81ED-4DB2-BD59-A6C34878D82A}">
-                    <a16:rowId xmlns:a16="http://schemas.microsoft.com/office/drawing/2014/main" val="3306714524"/>
+                    <a16:rowId xmlns:a16="http://schemas.microsoft.com/office/drawing/2014/main" xmlns="" val="3306714524"/>
                   </a:ext>
                 </a:extLst>
               </a:tr>
@@ -7329,7 +7580,7 @@
           <p:cNvPr id="4" name="Picture 3">
             <a:extLst>
               <a:ext uri="{FF2B5EF4-FFF2-40B4-BE49-F238E27FC236}">
-                <a16:creationId xmlns:a16="http://schemas.microsoft.com/office/drawing/2014/main" id="{83E526A8-A255-469E-8E06-53C7CD74A94E}"/>
+                <a16:creationId xmlns:a16="http://schemas.microsoft.com/office/drawing/2014/main" xmlns="" id="{83E526A8-A255-469E-8E06-53C7CD74A94E}"/>
               </a:ext>
             </a:extLst>
           </p:cNvPr>
@@ -7408,7 +7659,7 @@
           <p:cNvPr id="5" name="Picture 4">
             <a:extLst>
               <a:ext uri="{FF2B5EF4-FFF2-40B4-BE49-F238E27FC236}">
-                <a16:creationId xmlns:a16="http://schemas.microsoft.com/office/drawing/2014/main" id="{CBD66ADA-93F9-4C07-BC0C-98D35D5D57BB}"/>
+                <a16:creationId xmlns:a16="http://schemas.microsoft.com/office/drawing/2014/main" xmlns="" id="{CBD66ADA-93F9-4C07-BC0C-98D35D5D57BB}"/>
               </a:ext>
             </a:extLst>
           </p:cNvPr>
@@ -7438,7 +7689,7 @@
           <p:cNvPr id="6" name="Picture 5">
             <a:extLst>
               <a:ext uri="{FF2B5EF4-FFF2-40B4-BE49-F238E27FC236}">
-                <a16:creationId xmlns:a16="http://schemas.microsoft.com/office/drawing/2014/main" id="{A405E111-F8BB-4FFA-BAED-ABC207E3B77D}"/>
+                <a16:creationId xmlns:a16="http://schemas.microsoft.com/office/drawing/2014/main" xmlns="" id="{A405E111-F8BB-4FFA-BAED-ABC207E3B77D}"/>
               </a:ext>
             </a:extLst>
           </p:cNvPr>
@@ -7523,10 +7774,10 @@
           <p:cNvPr id="72" name="Straight Connector 71">
             <a:extLst>
               <a:ext uri="{FF2B5EF4-FFF2-40B4-BE49-F238E27FC236}">
-                <a16:creationId xmlns:a16="http://schemas.microsoft.com/office/drawing/2014/main" id="{DD6CFB6C-6ECB-4250-B68E-01966297A513}"/>
+                <a16:creationId xmlns:a16="http://schemas.microsoft.com/office/drawing/2014/main" xmlns="" id="{DD6CFB6C-6ECB-4250-B68E-01966297A513}"/>
               </a:ext>
               <a:ext uri="{C183D7F6-B498-43B3-948B-1728B52AA6E4}">
-                <adec:decorative xmlns:adec="http://schemas.microsoft.com/office/drawing/2017/decorative" val="1"/>
+                <adec:decorative xmlns:adec="http://schemas.microsoft.com/office/drawing/2017/decorative" xmlns="" val="1"/>
               </a:ext>
             </a:extLst>
           </p:cNvPr>
@@ -7575,10 +7826,10 @@
           <p:cNvPr id="74" name="Straight Connector 73">
             <a:extLst>
               <a:ext uri="{FF2B5EF4-FFF2-40B4-BE49-F238E27FC236}">
-                <a16:creationId xmlns:a16="http://schemas.microsoft.com/office/drawing/2014/main" id="{B8359141-C085-46E4-B4EC-42F9599BA7D2}"/>
+                <a16:creationId xmlns:a16="http://schemas.microsoft.com/office/drawing/2014/main" xmlns="" id="{B8359141-C085-46E4-B4EC-42F9599BA7D2}"/>
               </a:ext>
               <a:ext uri="{C183D7F6-B498-43B3-948B-1728B52AA6E4}">
-                <adec:decorative xmlns:adec="http://schemas.microsoft.com/office/drawing/2017/decorative" val="1"/>
+                <adec:decorative xmlns:adec="http://schemas.microsoft.com/office/drawing/2017/decorative" xmlns="" val="1"/>
               </a:ext>
             </a:extLst>
           </p:cNvPr>
@@ -7627,10 +7878,10 @@
           <p:cNvPr id="76" name="Straight Connector 75">
             <a:extLst>
               <a:ext uri="{FF2B5EF4-FFF2-40B4-BE49-F238E27FC236}">
-                <a16:creationId xmlns:a16="http://schemas.microsoft.com/office/drawing/2014/main" id="{FA903156-0F0C-44A5-9019-0CAF51EB494A}"/>
+                <a16:creationId xmlns:a16="http://schemas.microsoft.com/office/drawing/2014/main" xmlns="" id="{FA903156-0F0C-44A5-9019-0CAF51EB494A}"/>
               </a:ext>
               <a:ext uri="{C183D7F6-B498-43B3-948B-1728B52AA6E4}">
-                <adec:decorative xmlns:adec="http://schemas.microsoft.com/office/drawing/2017/decorative" val="1"/>
+                <adec:decorative xmlns:adec="http://schemas.microsoft.com/office/drawing/2017/decorative" xmlns="" val="1"/>
               </a:ext>
             </a:extLst>
           </p:cNvPr>
@@ -7679,10 +7930,10 @@
           <p:cNvPr id="78" name="Straight Connector 77">
             <a:extLst>
               <a:ext uri="{FF2B5EF4-FFF2-40B4-BE49-F238E27FC236}">
-                <a16:creationId xmlns:a16="http://schemas.microsoft.com/office/drawing/2014/main" id="{66E5E851-3725-463F-9451-2FFEF5D3E089}"/>
+                <a16:creationId xmlns:a16="http://schemas.microsoft.com/office/drawing/2014/main" xmlns="" id="{66E5E851-3725-463F-9451-2FFEF5D3E089}"/>
               </a:ext>
               <a:ext uri="{C183D7F6-B498-43B3-948B-1728B52AA6E4}">
-                <adec:decorative xmlns:adec="http://schemas.microsoft.com/office/drawing/2017/decorative" val="1"/>
+                <adec:decorative xmlns:adec="http://schemas.microsoft.com/office/drawing/2017/decorative" xmlns="" val="1"/>
               </a:ext>
             </a:extLst>
           </p:cNvPr>
@@ -7731,10 +7982,10 @@
           <p:cNvPr id="80" name="Straight Connector 79">
             <a:extLst>
               <a:ext uri="{FF2B5EF4-FFF2-40B4-BE49-F238E27FC236}">
-                <a16:creationId xmlns:a16="http://schemas.microsoft.com/office/drawing/2014/main" id="{94209D59-6810-40C2-B8D6-6DACF8A06143}"/>
+                <a16:creationId xmlns:a16="http://schemas.microsoft.com/office/drawing/2014/main" xmlns="" id="{94209D59-6810-40C2-B8D6-6DACF8A06143}"/>
               </a:ext>
               <a:ext uri="{C183D7F6-B498-43B3-948B-1728B52AA6E4}">
-                <adec:decorative xmlns:adec="http://schemas.microsoft.com/office/drawing/2017/decorative" val="1"/>
+                <adec:decorative xmlns:adec="http://schemas.microsoft.com/office/drawing/2017/decorative" xmlns="" val="1"/>
               </a:ext>
             </a:extLst>
           </p:cNvPr>
@@ -7783,10 +8034,10 @@
           <p:cNvPr id="82" name="Rectangle 81">
             <a:extLst>
               <a:ext uri="{FF2B5EF4-FFF2-40B4-BE49-F238E27FC236}">
-                <a16:creationId xmlns:a16="http://schemas.microsoft.com/office/drawing/2014/main" id="{0BE1027C-ABCB-4C82-91A2-F67B9A5A65A6}"/>
+                <a16:creationId xmlns:a16="http://schemas.microsoft.com/office/drawing/2014/main" xmlns="" id="{0BE1027C-ABCB-4C82-91A2-F67B9A5A65A6}"/>
               </a:ext>
               <a:ext uri="{C183D7F6-B498-43B3-948B-1728B52AA6E4}">
-                <adec:decorative xmlns:adec="http://schemas.microsoft.com/office/drawing/2017/decorative" val="1"/>
+                <adec:decorative xmlns:adec="http://schemas.microsoft.com/office/drawing/2017/decorative" xmlns="" val="1"/>
               </a:ext>
             </a:extLst>
           </p:cNvPr>
@@ -7866,7 +8117,7 @@
               </a:lnSpc>
             </a:pPr>
             <a:r>
-              <a:rPr lang="en-US" sz="4100"/>
+              <a:rPr lang="en-US" sz="4100" dirty="0"/>
               <a:t>Third and Fourth Factors attributing to Attrition</a:t>
             </a:r>
           </a:p>
@@ -7903,10 +8154,10 @@
           <p:cNvPr id="84" name="Group 83">
             <a:extLst>
               <a:ext uri="{FF2B5EF4-FFF2-40B4-BE49-F238E27FC236}">
-                <a16:creationId xmlns:a16="http://schemas.microsoft.com/office/drawing/2014/main" id="{0CC57C46-4659-4AF2-9180-2DEED214CDD7}"/>
+                <a16:creationId xmlns:a16="http://schemas.microsoft.com/office/drawing/2014/main" xmlns="" id="{0CC57C46-4659-4AF2-9180-2DEED214CDD7}"/>
               </a:ext>
               <a:ext uri="{C183D7F6-B498-43B3-948B-1728B52AA6E4}">
-                <adec:decorative xmlns:adec="http://schemas.microsoft.com/office/drawing/2017/decorative" val="1"/>
+                <adec:decorative xmlns:adec="http://schemas.microsoft.com/office/drawing/2017/decorative" xmlns="" val="1"/>
               </a:ext>
             </a:extLst>
           </p:cNvPr>
@@ -7934,10 +8185,10 @@
             <p:cNvPr id="85" name="Straight Connector 84">
               <a:extLst>
                 <a:ext uri="{FF2B5EF4-FFF2-40B4-BE49-F238E27FC236}">
-                  <a16:creationId xmlns:a16="http://schemas.microsoft.com/office/drawing/2014/main" id="{CFB52317-0F00-40C0-B1F2-33ED6D30D97A}"/>
+                  <a16:creationId xmlns:a16="http://schemas.microsoft.com/office/drawing/2014/main" xmlns="" id="{CFB52317-0F00-40C0-B1F2-33ED6D30D97A}"/>
                 </a:ext>
                 <a:ext uri="{C183D7F6-B498-43B3-948B-1728B52AA6E4}">
-                  <adec:decorative xmlns:adec="http://schemas.microsoft.com/office/drawing/2017/decorative" val="1"/>
+                  <adec:decorative xmlns:adec="http://schemas.microsoft.com/office/drawing/2017/decorative" xmlns="" val="1"/>
                 </a:ext>
               </a:extLst>
             </p:cNvPr>
@@ -7984,10 +8235,10 @@
             <p:cNvPr id="86" name="Straight Connector 85">
               <a:extLst>
                 <a:ext uri="{FF2B5EF4-FFF2-40B4-BE49-F238E27FC236}">
-                  <a16:creationId xmlns:a16="http://schemas.microsoft.com/office/drawing/2014/main" id="{2468ACF9-4EF2-4251-9FAD-3F225BF7417D}"/>
+                  <a16:creationId xmlns:a16="http://schemas.microsoft.com/office/drawing/2014/main" xmlns="" id="{2468ACF9-4EF2-4251-9FAD-3F225BF7417D}"/>
                 </a:ext>
                 <a:ext uri="{C183D7F6-B498-43B3-948B-1728B52AA6E4}">
-                  <adec:decorative xmlns:adec="http://schemas.microsoft.com/office/drawing/2017/decorative" val="1"/>
+                  <adec:decorative xmlns:adec="http://schemas.microsoft.com/office/drawing/2017/decorative" xmlns="" val="1"/>
                 </a:ext>
               </a:extLst>
             </p:cNvPr>
@@ -8034,10 +8285,10 @@
             <p:cNvPr id="87" name="Straight Connector 86">
               <a:extLst>
                 <a:ext uri="{FF2B5EF4-FFF2-40B4-BE49-F238E27FC236}">
-                  <a16:creationId xmlns:a16="http://schemas.microsoft.com/office/drawing/2014/main" id="{CE4A3ECD-6924-4912-B117-3C617B584BCF}"/>
+                  <a16:creationId xmlns:a16="http://schemas.microsoft.com/office/drawing/2014/main" xmlns="" id="{CE4A3ECD-6924-4912-B117-3C617B584BCF}"/>
                 </a:ext>
                 <a:ext uri="{C183D7F6-B498-43B3-948B-1728B52AA6E4}">
-                  <adec:decorative xmlns:adec="http://schemas.microsoft.com/office/drawing/2017/decorative" val="1"/>
+                  <adec:decorative xmlns:adec="http://schemas.microsoft.com/office/drawing/2017/decorative" xmlns="" val="1"/>
                 </a:ext>
               </a:extLst>
             </p:cNvPr>
@@ -8084,10 +8335,10 @@
             <p:cNvPr id="88" name="Straight Connector 87">
               <a:extLst>
                 <a:ext uri="{FF2B5EF4-FFF2-40B4-BE49-F238E27FC236}">
-                  <a16:creationId xmlns:a16="http://schemas.microsoft.com/office/drawing/2014/main" id="{D1DFE1F5-FA7A-403F-B9D9-0434E2BE2F5B}"/>
+                  <a16:creationId xmlns:a16="http://schemas.microsoft.com/office/drawing/2014/main" xmlns="" id="{D1DFE1F5-FA7A-403F-B9D9-0434E2BE2F5B}"/>
                 </a:ext>
                 <a:ext uri="{C183D7F6-B498-43B3-948B-1728B52AA6E4}">
-                  <adec:decorative xmlns:adec="http://schemas.microsoft.com/office/drawing/2017/decorative" val="1"/>
+                  <adec:decorative xmlns:adec="http://schemas.microsoft.com/office/drawing/2017/decorative" xmlns="" val="1"/>
                 </a:ext>
               </a:extLst>
             </p:cNvPr>
@@ -8134,10 +8385,10 @@
             <p:cNvPr id="89" name="Straight Connector 88">
               <a:extLst>
                 <a:ext uri="{FF2B5EF4-FFF2-40B4-BE49-F238E27FC236}">
-                  <a16:creationId xmlns:a16="http://schemas.microsoft.com/office/drawing/2014/main" id="{92CF27E4-09D0-444E-B18D-F90487103863}"/>
+                  <a16:creationId xmlns:a16="http://schemas.microsoft.com/office/drawing/2014/main" xmlns="" id="{92CF27E4-09D0-444E-B18D-F90487103863}"/>
                 </a:ext>
                 <a:ext uri="{C183D7F6-B498-43B3-948B-1728B52AA6E4}">
-                  <adec:decorative xmlns:adec="http://schemas.microsoft.com/office/drawing/2017/decorative" val="1"/>
+                  <adec:decorative xmlns:adec="http://schemas.microsoft.com/office/drawing/2017/decorative" xmlns="" val="1"/>
                 </a:ext>
               </a:extLst>
             </p:cNvPr>
@@ -8185,10 +8436,10 @@
           <p:cNvPr id="91" name="Snip Diagonal Corner Rectangle 12">
             <a:extLst>
               <a:ext uri="{FF2B5EF4-FFF2-40B4-BE49-F238E27FC236}">
-                <a16:creationId xmlns:a16="http://schemas.microsoft.com/office/drawing/2014/main" id="{FDAF26D5-7469-49F5-902D-571FA58A7EEE}"/>
+                <a16:creationId xmlns:a16="http://schemas.microsoft.com/office/drawing/2014/main" xmlns="" id="{FDAF26D5-7469-49F5-902D-571FA58A7EEE}"/>
               </a:ext>
               <a:ext uri="{C183D7F6-B498-43B3-948B-1728B52AA6E4}">
-                <adec:decorative xmlns:adec="http://schemas.microsoft.com/office/drawing/2017/decorative" val="1"/>
+                <adec:decorative xmlns:adec="http://schemas.microsoft.com/office/drawing/2017/decorative" xmlns="" val="1"/>
               </a:ext>
             </a:extLst>
           </p:cNvPr>
@@ -8262,7 +8513,7 @@
           <p:cNvPr id="5" name="Picture 4">
             <a:extLst>
               <a:ext uri="{FF2B5EF4-FFF2-40B4-BE49-F238E27FC236}">
-                <a16:creationId xmlns:a16="http://schemas.microsoft.com/office/drawing/2014/main" id="{FD53BF36-7A56-44EE-9194-375264E4AA93}"/>
+                <a16:creationId xmlns:a16="http://schemas.microsoft.com/office/drawing/2014/main" xmlns="" id="{FD53BF36-7A56-44EE-9194-375264E4AA93}"/>
               </a:ext>
             </a:extLst>
           </p:cNvPr>
@@ -8291,7 +8542,7 @@
           <p:cNvPr id="6" name="Picture 5">
             <a:extLst>
               <a:ext uri="{FF2B5EF4-FFF2-40B4-BE49-F238E27FC236}">
-                <a16:creationId xmlns:a16="http://schemas.microsoft.com/office/drawing/2014/main" id="{6DA0AA6D-86CD-46D0-86C0-5450BFC0E85E}"/>
+                <a16:creationId xmlns:a16="http://schemas.microsoft.com/office/drawing/2014/main" xmlns="" id="{6DA0AA6D-86CD-46D0-86C0-5450BFC0E85E}"/>
               </a:ext>
             </a:extLst>
           </p:cNvPr>

</xml_diff>

<commit_message>
update with new attrition predictions
</commit_message>
<xml_diff>
--- a/Reducing_Attrition_AnEdit.pptx
+++ b/Reducing_Attrition_AnEdit.pptx
@@ -14,8 +14,8 @@
     <p:sldId id="260" r:id="rId5"/>
     <p:sldId id="261" r:id="rId6"/>
     <p:sldId id="262" r:id="rId7"/>
-    <p:sldId id="264" r:id="rId8"/>
-    <p:sldId id="263" r:id="rId9"/>
+    <p:sldId id="263" r:id="rId8"/>
+    <p:sldId id="264" r:id="rId9"/>
   </p:sldIdLst>
   <p:sldSz cx="12192000" cy="6858000"/>
   <p:notesSz cx="6858000" cy="9144000"/>
@@ -204,7 +204,7 @@
           <a:p>
             <a:fld id="{380F82E0-DA90-F642-BDF9-D28F7CF5A168}" type="datetimeFigureOut">
               <a:rPr lang="en-US" smtClean="0"/>
-              <a:t>8/4/18</a:t>
+              <a:t>8/4/2018</a:t>
             </a:fld>
             <a:endParaRPr lang="en-US"/>
           </a:p>
@@ -663,7 +663,7 @@
             <a:fld id="{B61BEF0D-F0BB-DE4B-95CE-6DB70DBA9567}" type="datetimeFigureOut">
               <a:rPr lang="en-US" dirty="0"/>
               <a:pPr/>
-              <a:t>8/4/18</a:t>
+              <a:t>8/4/2018</a:t>
             </a:fld>
             <a:endParaRPr lang="en-US" dirty="0"/>
           </a:p>
@@ -1096,7 +1096,7 @@
             <a:fld id="{B61BEF0D-F0BB-DE4B-95CE-6DB70DBA9567}" type="datetimeFigureOut">
               <a:rPr lang="en-US" dirty="0"/>
               <a:pPr/>
-              <a:t>8/4/18</a:t>
+              <a:t>8/4/2018</a:t>
             </a:fld>
             <a:endParaRPr lang="en-US" dirty="0"/>
           </a:p>
@@ -1343,7 +1343,7 @@
             <a:fld id="{B61BEF0D-F0BB-DE4B-95CE-6DB70DBA9567}" type="datetimeFigureOut">
               <a:rPr lang="en-US" dirty="0"/>
               <a:pPr/>
-              <a:t>8/4/18</a:t>
+              <a:t>8/4/2018</a:t>
             </a:fld>
             <a:endParaRPr lang="en-US" dirty="0"/>
           </a:p>
@@ -1648,7 +1648,7 @@
             <a:fld id="{B61BEF0D-F0BB-DE4B-95CE-6DB70DBA9567}" type="datetimeFigureOut">
               <a:rPr lang="en-US" dirty="0"/>
               <a:pPr/>
-              <a:t>8/4/18</a:t>
+              <a:t>8/4/2018</a:t>
             </a:fld>
             <a:endParaRPr lang="en-US" dirty="0"/>
           </a:p>
@@ -1963,7 +1963,7 @@
             <a:fld id="{B61BEF0D-F0BB-DE4B-95CE-6DB70DBA9567}" type="datetimeFigureOut">
               <a:rPr lang="en-US" dirty="0"/>
               <a:pPr/>
-              <a:t>8/4/18</a:t>
+              <a:t>8/4/2018</a:t>
             </a:fld>
             <a:endParaRPr lang="en-US" dirty="0"/>
           </a:p>
@@ -2262,7 +2262,7 @@
             <a:fld id="{B61BEF0D-F0BB-DE4B-95CE-6DB70DBA9567}" type="datetimeFigureOut">
               <a:rPr lang="en-US" dirty="0"/>
               <a:pPr/>
-              <a:t>8/4/18</a:t>
+              <a:t>8/4/2018</a:t>
             </a:fld>
             <a:endParaRPr lang="en-US" dirty="0"/>
           </a:p>
@@ -2626,7 +2626,7 @@
             <a:fld id="{B61BEF0D-F0BB-DE4B-95CE-6DB70DBA9567}" type="datetimeFigureOut">
               <a:rPr lang="en-US" dirty="0"/>
               <a:pPr/>
-              <a:t>8/4/18</a:t>
+              <a:t>8/4/2018</a:t>
             </a:fld>
             <a:endParaRPr lang="en-US" dirty="0"/>
           </a:p>
@@ -2797,7 +2797,7 @@
             <a:fld id="{B61BEF0D-F0BB-DE4B-95CE-6DB70DBA9567}" type="datetimeFigureOut">
               <a:rPr lang="en-US" dirty="0"/>
               <a:pPr/>
-              <a:t>8/4/18</a:t>
+              <a:t>8/4/2018</a:t>
             </a:fld>
             <a:endParaRPr lang="en-US" dirty="0"/>
           </a:p>
@@ -2974,7 +2974,7 @@
             <a:fld id="{B61BEF0D-F0BB-DE4B-95CE-6DB70DBA9567}" type="datetimeFigureOut">
               <a:rPr lang="en-US" dirty="0"/>
               <a:pPr/>
-              <a:t>8/4/18</a:t>
+              <a:t>8/4/2018</a:t>
             </a:fld>
             <a:endParaRPr lang="en-US" dirty="0"/>
           </a:p>
@@ -3141,7 +3141,7 @@
             <a:fld id="{B61BEF0D-F0BB-DE4B-95CE-6DB70DBA9567}" type="datetimeFigureOut">
               <a:rPr lang="en-US" dirty="0"/>
               <a:pPr/>
-              <a:t>8/4/18</a:t>
+              <a:t>8/4/2018</a:t>
             </a:fld>
             <a:endParaRPr lang="en-US" dirty="0"/>
           </a:p>
@@ -3388,7 +3388,7 @@
             <a:fld id="{B61BEF0D-F0BB-DE4B-95CE-6DB70DBA9567}" type="datetimeFigureOut">
               <a:rPr lang="en-US" dirty="0"/>
               <a:pPr/>
-              <a:t>8/4/18</a:t>
+              <a:t>8/4/2018</a:t>
             </a:fld>
             <a:endParaRPr lang="en-US" dirty="0"/>
           </a:p>
@@ -3621,7 +3621,7 @@
             <a:fld id="{B61BEF0D-F0BB-DE4B-95CE-6DB70DBA9567}" type="datetimeFigureOut">
               <a:rPr lang="en-US" dirty="0"/>
               <a:pPr/>
-              <a:t>8/4/18</a:t>
+              <a:t>8/4/2018</a:t>
             </a:fld>
             <a:endParaRPr lang="en-US" dirty="0"/>
           </a:p>
@@ -4000,7 +4000,7 @@
             <a:fld id="{B61BEF0D-F0BB-DE4B-95CE-6DB70DBA9567}" type="datetimeFigureOut">
               <a:rPr lang="en-US" dirty="0"/>
               <a:pPr/>
-              <a:t>8/4/18</a:t>
+              <a:t>8/4/2018</a:t>
             </a:fld>
             <a:endParaRPr lang="en-US" dirty="0"/>
           </a:p>
@@ -4115,7 +4115,7 @@
             <a:fld id="{B61BEF0D-F0BB-DE4B-95CE-6DB70DBA9567}" type="datetimeFigureOut">
               <a:rPr lang="en-US" dirty="0"/>
               <a:pPr/>
-              <a:t>8/4/18</a:t>
+              <a:t>8/4/2018</a:t>
             </a:fld>
             <a:endParaRPr lang="en-US" dirty="0"/>
           </a:p>
@@ -4207,7 +4207,7 @@
             <a:fld id="{B61BEF0D-F0BB-DE4B-95CE-6DB70DBA9567}" type="datetimeFigureOut">
               <a:rPr lang="en-US" dirty="0"/>
               <a:pPr/>
-              <a:t>8/4/18</a:t>
+              <a:t>8/4/2018</a:t>
             </a:fld>
             <a:endParaRPr lang="en-US" dirty="0"/>
           </a:p>
@@ -4459,7 +4459,7 @@
             <a:fld id="{B61BEF0D-F0BB-DE4B-95CE-6DB70DBA9567}" type="datetimeFigureOut">
               <a:rPr lang="en-US" dirty="0"/>
               <a:pPr/>
-              <a:t>8/4/18</a:t>
+              <a:t>8/4/2018</a:t>
             </a:fld>
             <a:endParaRPr lang="en-US" dirty="0"/>
           </a:p>
@@ -4739,7 +4739,7 @@
             <a:fld id="{B61BEF0D-F0BB-DE4B-95CE-6DB70DBA9567}" type="datetimeFigureOut">
               <a:rPr lang="en-US" dirty="0"/>
               <a:pPr/>
-              <a:t>8/4/18</a:t>
+              <a:t>8/4/2018</a:t>
             </a:fld>
             <a:endParaRPr lang="en-US" dirty="0"/>
           </a:p>
@@ -5142,7 +5142,7 @@
             <a:fld id="{B61BEF0D-F0BB-DE4B-95CE-6DB70DBA9567}" type="datetimeFigureOut">
               <a:rPr lang="en-US" dirty="0"/>
               <a:pPr/>
-              <a:t>8/4/18</a:t>
+              <a:t>8/4/2018</a:t>
             </a:fld>
             <a:endParaRPr lang="en-US" dirty="0"/>
           </a:p>
@@ -5688,10 +5688,6 @@
           <a:bodyPr/>
           <a:lstStyle/>
           <a:p>
-            <a:r>
-              <a:rPr lang="en-US" dirty="0"/>
-              <a:t/>
-            </a:r>
             <a:br>
               <a:rPr lang="en-US" dirty="0"/>
             </a:br>
@@ -6031,7 +6027,7 @@
           <a:lstStyle/>
           <a:p>
             <a:r>
-              <a:rPr lang="en-US" b="1" u="sng" dirty="0" smtClean="0">
+              <a:rPr lang="en-US" b="1" u="sng" dirty="0">
                 <a:solidFill>
                   <a:srgbClr val="002060"/>
                 </a:solidFill>
@@ -6041,7 +6037,7 @@
           </a:p>
           <a:p>
             <a:r>
-              <a:rPr lang="en-US" dirty="0" smtClean="0">
+              <a:rPr lang="en-US" dirty="0">
                 <a:solidFill>
                   <a:srgbClr val="002060"/>
                 </a:solidFill>
@@ -6051,18 +6047,13 @@
           </a:p>
           <a:p>
             <a:r>
-              <a:rPr lang="en-US" dirty="0" smtClean="0">
+              <a:rPr lang="en-US" dirty="0">
                 <a:solidFill>
                   <a:srgbClr val="002060"/>
                 </a:solidFill>
               </a:rPr>
               <a:t>Total Variables	 :  35</a:t>
             </a:r>
-            <a:endParaRPr lang="en-US" dirty="0">
-              <a:solidFill>
-                <a:srgbClr val="002060"/>
-              </a:solidFill>
-            </a:endParaRPr>
           </a:p>
         </p:txBody>
       </p:sp>
@@ -6177,7 +6168,7 @@
           <a:lstStyle/>
           <a:p>
             <a:r>
-              <a:rPr lang="en-US" b="1" u="sng" dirty="0" smtClean="0">
+              <a:rPr lang="en-US" b="1" u="sng" dirty="0">
                 <a:solidFill>
                   <a:srgbClr val="002060"/>
                 </a:solidFill>
@@ -6187,7 +6178,7 @@
           </a:p>
           <a:p>
             <a:r>
-              <a:rPr lang="en-US" dirty="0" err="1" smtClean="0">
+              <a:rPr lang="en-US" dirty="0" err="1">
                 <a:solidFill>
                   <a:srgbClr val="002060"/>
                 </a:solidFill>
@@ -6195,7 +6186,7 @@
               <a:t>HeadCount</a:t>
             </a:r>
             <a:r>
-              <a:rPr lang="en-US" dirty="0" smtClean="0">
+              <a:rPr lang="en-US" dirty="0">
                 <a:solidFill>
                   <a:srgbClr val="002060"/>
                 </a:solidFill>
@@ -6203,7 +6194,7 @@
               <a:t>, </a:t>
             </a:r>
             <a:r>
-              <a:rPr lang="en-US" dirty="0" err="1" smtClean="0">
+              <a:rPr lang="en-US" dirty="0" err="1">
                 <a:solidFill>
                   <a:srgbClr val="002060"/>
                 </a:solidFill>
@@ -6211,7 +6202,7 @@
               <a:t>EmployeeID</a:t>
             </a:r>
             <a:r>
-              <a:rPr lang="en-US" dirty="0" smtClean="0">
+              <a:rPr lang="en-US" dirty="0">
                 <a:solidFill>
                   <a:srgbClr val="002060"/>
                 </a:solidFill>
@@ -6219,7 +6210,7 @@
               <a:t>, Over18, </a:t>
             </a:r>
             <a:r>
-              <a:rPr lang="en-US" dirty="0" err="1" smtClean="0">
+              <a:rPr lang="en-US" dirty="0" err="1">
                 <a:solidFill>
                   <a:srgbClr val="002060"/>
                 </a:solidFill>
@@ -6257,7 +6248,7 @@
           <a:lstStyle/>
           <a:p>
             <a:r>
-              <a:rPr lang="en-US" b="1" dirty="0" smtClean="0">
+              <a:rPr lang="en-US" b="1" dirty="0">
                 <a:solidFill>
                   <a:srgbClr val="002060"/>
                 </a:solidFill>
@@ -6265,7 +6256,7 @@
               <a:t>Summary: </a:t>
             </a:r>
             <a:r>
-              <a:rPr lang="en-US" dirty="0" smtClean="0">
+              <a:rPr lang="en-US" dirty="0">
                 <a:solidFill>
                   <a:srgbClr val="002060"/>
                 </a:solidFill>
@@ -6280,21 +6271,8 @@
                   <a:srgbClr val="002060"/>
                 </a:solidFill>
               </a:rPr>
-              <a:t>i</a:t>
-            </a:r>
-            <a:r>
-              <a:rPr lang="en-US" dirty="0" smtClean="0">
-                <a:solidFill>
-                  <a:srgbClr val="002060"/>
-                </a:solidFill>
-              </a:rPr>
-              <a:t>ncluded both personal and professional data on employee from various departments.</a:t>
-            </a:r>
-            <a:endParaRPr lang="en-US" dirty="0">
-              <a:solidFill>
-                <a:srgbClr val="002060"/>
-              </a:solidFill>
-            </a:endParaRPr>
+              <a:t>included both personal and professional data on employee from various departments.</a:t>
+            </a:r>
           </a:p>
         </p:txBody>
       </p:sp>
@@ -6321,7 +6299,7 @@
           <a:lstStyle/>
           <a:p>
             <a:r>
-              <a:rPr lang="en-US" b="1" u="sng" dirty="0" smtClean="0">
+              <a:rPr lang="en-US" b="1" u="sng" dirty="0">
                 <a:solidFill>
                   <a:srgbClr val="002060"/>
                 </a:solidFill>
@@ -6331,7 +6309,7 @@
           </a:p>
           <a:p>
             <a:r>
-              <a:rPr lang="en-US" dirty="0" smtClean="0">
+              <a:rPr lang="en-US" dirty="0">
                 <a:solidFill>
                   <a:srgbClr val="002060"/>
                 </a:solidFill>
@@ -6341,18 +6319,13 @@
           </a:p>
           <a:p>
             <a:r>
-              <a:rPr lang="en-US" dirty="0" smtClean="0">
+              <a:rPr lang="en-US" dirty="0">
                 <a:solidFill>
                   <a:srgbClr val="002060"/>
                 </a:solidFill>
               </a:rPr>
               <a:t>Character	: 10</a:t>
             </a:r>
-            <a:endParaRPr lang="en-US" dirty="0">
-              <a:solidFill>
-                <a:srgbClr val="002060"/>
-              </a:solidFill>
-            </a:endParaRPr>
           </a:p>
         </p:txBody>
       </p:sp>
@@ -6379,7 +6352,7 @@
           <a:lstStyle/>
           <a:p>
             <a:r>
-              <a:rPr lang="en-US" b="1" u="sng" dirty="0" smtClean="0">
+              <a:rPr lang="en-US" b="1" u="sng" dirty="0">
                 <a:solidFill>
                   <a:srgbClr val="002060"/>
                 </a:solidFill>
@@ -6390,18 +6363,13 @@
           <a:p>
             <a:pPr lvl="1"/>
             <a:r>
-              <a:rPr lang="en-US" sz="2000" dirty="0" smtClean="0">
+              <a:rPr lang="en-US" sz="2000" dirty="0">
                 <a:solidFill>
                   <a:srgbClr val="002060"/>
                 </a:solidFill>
               </a:rPr>
               <a:t>	23</a:t>
             </a:r>
-            <a:endParaRPr lang="en-US" sz="2000" dirty="0">
-              <a:solidFill>
-                <a:srgbClr val="002060"/>
-              </a:solidFill>
-            </a:endParaRPr>
           </a:p>
         </p:txBody>
       </p:sp>
@@ -6605,7 +6573,7 @@
           <p:cNvPr id="5" name="Table 4">
             <a:extLst>
               <a:ext uri="{FF2B5EF4-FFF2-40B4-BE49-F238E27FC236}">
-                <a16:creationId xmlns:a16="http://schemas.microsoft.com/office/drawing/2014/main" xmlns="" id="{B703D80E-7F52-4EC4-8019-B211F825CC91}"/>
+                <a16:creationId xmlns:a16="http://schemas.microsoft.com/office/drawing/2014/main" id="{B703D80E-7F52-4EC4-8019-B211F825CC91}"/>
               </a:ext>
             </a:extLst>
           </p:cNvPr>
@@ -6615,14 +6583,14 @@
           <p:nvPr>
             <p:extLst>
               <p:ext uri="{D42A27DB-BD31-4B8C-83A1-F6EECF244321}">
-                <p14:modId xmlns:p14="http://schemas.microsoft.com/office/powerpoint/2010/main" val="4001867734"/>
+                <p14:modId xmlns:p14="http://schemas.microsoft.com/office/powerpoint/2010/main" val="2618910518"/>
               </p:ext>
             </p:extLst>
           </p:nvPr>
         </p:nvGraphicFramePr>
         <p:xfrm>
           <a:off x="684213" y="1965960"/>
-          <a:ext cx="9284191" cy="2926080"/>
+          <a:ext cx="10128031" cy="2926080"/>
         </p:xfrm>
         <a:graphic>
           <a:graphicData uri="http://schemas.openxmlformats.org/drawingml/2006/table">
@@ -6631,52 +6599,52 @@
                 <a:tableStyleId>{5C22544A-7EE6-4342-B048-85BDC9FD1C3A}</a:tableStyleId>
               </a:tblPr>
               <a:tblGrid>
-                <a:gridCol w="2686368">
+                <a:gridCol w="3299143">
                   <a:extLst>
                     <a:ext uri="{9D8B030D-6E8A-4147-A177-3AD203B41FA5}">
-                      <a16:colId xmlns:a16="http://schemas.microsoft.com/office/drawing/2014/main" xmlns="" val="2088784793"/>
+                      <a16:colId xmlns:a16="http://schemas.microsoft.com/office/drawing/2014/main" val="2088784793"/>
                     </a:ext>
                   </a:extLst>
                 </a:gridCol>
                 <a:gridCol w="1071880">
                   <a:extLst>
                     <a:ext uri="{9D8B030D-6E8A-4147-A177-3AD203B41FA5}">
-                      <a16:colId xmlns:a16="http://schemas.microsoft.com/office/drawing/2014/main" xmlns="" val="44769478"/>
+                      <a16:colId xmlns:a16="http://schemas.microsoft.com/office/drawing/2014/main" val="44769478"/>
                     </a:ext>
                   </a:extLst>
                 </a:gridCol>
-                <a:gridCol w="1071880">
+                <a:gridCol w="1160963">
                   <a:extLst>
                     <a:ext uri="{9D8B030D-6E8A-4147-A177-3AD203B41FA5}">
-                      <a16:colId xmlns:a16="http://schemas.microsoft.com/office/drawing/2014/main" xmlns="" val="2042025665"/>
+                      <a16:colId xmlns:a16="http://schemas.microsoft.com/office/drawing/2014/main" val="2042025665"/>
                     </a:ext>
                   </a:extLst>
                 </a:gridCol>
-                <a:gridCol w="1092518">
+                <a:gridCol w="1153844">
                   <a:extLst>
                     <a:ext uri="{9D8B030D-6E8A-4147-A177-3AD203B41FA5}">
-                      <a16:colId xmlns:a16="http://schemas.microsoft.com/office/drawing/2014/main" xmlns="" val="3310055283"/>
+                      <a16:colId xmlns:a16="http://schemas.microsoft.com/office/drawing/2014/main" val="3310055283"/>
                     </a:ext>
                   </a:extLst>
                 </a:gridCol>
-                <a:gridCol w="1071880">
+                <a:gridCol w="1126087">
                   <a:extLst>
                     <a:ext uri="{9D8B030D-6E8A-4147-A177-3AD203B41FA5}">
-                      <a16:colId xmlns:a16="http://schemas.microsoft.com/office/drawing/2014/main" xmlns="" val="3606606852"/>
+                      <a16:colId xmlns:a16="http://schemas.microsoft.com/office/drawing/2014/main" val="3606606852"/>
                     </a:ext>
                   </a:extLst>
                 </a:gridCol>
-                <a:gridCol w="1071880">
+                <a:gridCol w="1098329">
                   <a:extLst>
                     <a:ext uri="{9D8B030D-6E8A-4147-A177-3AD203B41FA5}">
-                      <a16:colId xmlns:a16="http://schemas.microsoft.com/office/drawing/2014/main" xmlns="" val="801426414"/>
+                      <a16:colId xmlns:a16="http://schemas.microsoft.com/office/drawing/2014/main" val="801426414"/>
                     </a:ext>
                   </a:extLst>
                 </a:gridCol>
                 <a:gridCol w="1217785">
                   <a:extLst>
                     <a:ext uri="{9D8B030D-6E8A-4147-A177-3AD203B41FA5}">
-                      <a16:colId xmlns:a16="http://schemas.microsoft.com/office/drawing/2014/main" xmlns="" val="2064332225"/>
+                      <a16:colId xmlns:a16="http://schemas.microsoft.com/office/drawing/2014/main" val="2064332225"/>
                     </a:ext>
                   </a:extLst>
                 </a:gridCol>
@@ -6794,7 +6762,7 @@
                 </a:tc>
                 <a:extLst>
                   <a:ext uri="{0D108BD9-81ED-4DB2-BD59-A6C34878D82A}">
-                    <a16:rowId xmlns:a16="http://schemas.microsoft.com/office/drawing/2014/main" xmlns="" val="4011550691"/>
+                    <a16:rowId xmlns:a16="http://schemas.microsoft.com/office/drawing/2014/main" val="4011550691"/>
                   </a:ext>
                 </a:extLst>
               </a:tr>
@@ -6898,7 +6866,7 @@
                 </a:tc>
                 <a:extLst>
                   <a:ext uri="{0D108BD9-81ED-4DB2-BD59-A6C34878D82A}">
-                    <a16:rowId xmlns:a16="http://schemas.microsoft.com/office/drawing/2014/main" xmlns="" val="4283831565"/>
+                    <a16:rowId xmlns:a16="http://schemas.microsoft.com/office/drawing/2014/main" val="4283831565"/>
                   </a:ext>
                 </a:extLst>
               </a:tr>
@@ -6966,7 +6934,7 @@
                       <a:pPr algn="ctr"/>
                       <a:r>
                         <a:rPr lang="en-US" dirty="0"/>
-                        <a:t>37</a:t>
+                        <a:t>36.9</a:t>
                       </a:r>
                     </a:p>
                   </a:txBody>
@@ -7002,7 +6970,7 @@
                 </a:tc>
                 <a:extLst>
                   <a:ext uri="{0D108BD9-81ED-4DB2-BD59-A6C34878D82A}">
-                    <a16:rowId xmlns:a16="http://schemas.microsoft.com/office/drawing/2014/main" xmlns="" val="1934653851"/>
+                    <a16:rowId xmlns:a16="http://schemas.microsoft.com/office/drawing/2014/main" val="1934653851"/>
                   </a:ext>
                 </a:extLst>
               </a:tr>
@@ -7014,13 +6982,13 @@
                     <a:p>
                       <a:r>
                         <a:rPr lang="en-US" dirty="0"/>
-                        <a:t>Over Time</a:t>
+                        <a:t>Distance From Home</a:t>
                       </a:r>
                     </a:p>
                   </a:txBody>
                   <a:tcPr/>
                 </a:tc>
-                <a:tc gridSpan="6">
+                <a:tc>
                   <a:txBody>
                     <a:bodyPr/>
                     <a:lstStyle/>
@@ -7028,70 +6996,85 @@
                       <a:pPr algn="ctr"/>
                       <a:r>
                         <a:rPr lang="en-US" dirty="0"/>
-                        <a:t>Categorial (data will be shown below)</a:t>
+                        <a:t>1</a:t>
                       </a:r>
                     </a:p>
                   </a:txBody>
                   <a:tcPr/>
                 </a:tc>
-                <a:tc hMerge="1">
+                <a:tc>
                   <a:txBody>
                     <a:bodyPr/>
                     <a:lstStyle/>
                     <a:p>
                       <a:pPr algn="ctr"/>
-                      <a:endParaRPr lang="en-US" dirty="0"/>
+                      <a:r>
+                        <a:rPr lang="en-US" dirty="0"/>
+                        <a:t>2</a:t>
+                      </a:r>
                     </a:p>
                   </a:txBody>
                   <a:tcPr/>
                 </a:tc>
-                <a:tc hMerge="1">
+                <a:tc>
                   <a:txBody>
                     <a:bodyPr/>
                     <a:lstStyle/>
                     <a:p>
                       <a:pPr algn="ctr"/>
-                      <a:endParaRPr lang="en-US" dirty="0"/>
+                      <a:r>
+                        <a:rPr lang="en-US" dirty="0"/>
+                        <a:t>7</a:t>
+                      </a:r>
                     </a:p>
                   </a:txBody>
                   <a:tcPr/>
                 </a:tc>
-                <a:tc hMerge="1">
+                <a:tc>
                   <a:txBody>
                     <a:bodyPr/>
                     <a:lstStyle/>
                     <a:p>
                       <a:pPr algn="ctr"/>
-                      <a:endParaRPr lang="en-US" dirty="0"/>
+                      <a:r>
+                        <a:rPr lang="en-US" dirty="0"/>
+                        <a:t>9.19</a:t>
+                      </a:r>
                     </a:p>
                   </a:txBody>
                   <a:tcPr/>
                 </a:tc>
-                <a:tc hMerge="1">
+                <a:tc>
                   <a:txBody>
                     <a:bodyPr/>
                     <a:lstStyle/>
                     <a:p>
                       <a:pPr algn="ctr"/>
-                      <a:endParaRPr lang="en-US" dirty="0"/>
+                      <a:r>
+                        <a:rPr lang="en-US" dirty="0"/>
+                        <a:t>14</a:t>
+                      </a:r>
                     </a:p>
                   </a:txBody>
                   <a:tcPr/>
                 </a:tc>
-                <a:tc hMerge="1">
+                <a:tc>
                   <a:txBody>
                     <a:bodyPr/>
                     <a:lstStyle/>
                     <a:p>
                       <a:pPr algn="ctr"/>
-                      <a:endParaRPr lang="en-US" dirty="0"/>
+                      <a:r>
+                        <a:rPr lang="en-US" dirty="0"/>
+                        <a:t>29</a:t>
+                      </a:r>
                     </a:p>
                   </a:txBody>
                   <a:tcPr/>
                 </a:tc>
                 <a:extLst>
                   <a:ext uri="{0D108BD9-81ED-4DB2-BD59-A6C34878D82A}">
-                    <a16:rowId xmlns:a16="http://schemas.microsoft.com/office/drawing/2014/main" xmlns="" val="3996762099"/>
+                    <a16:rowId xmlns:a16="http://schemas.microsoft.com/office/drawing/2014/main" val="3996762099"/>
                   </a:ext>
                 </a:extLst>
               </a:tr>
@@ -7103,13 +7086,13 @@
                     <a:p>
                       <a:r>
                         <a:rPr lang="en-US" dirty="0"/>
-                        <a:t>Job Role</a:t>
+                        <a:t>Percent Salary Increase</a:t>
                       </a:r>
                     </a:p>
                   </a:txBody>
                   <a:tcPr/>
                 </a:tc>
-                <a:tc gridSpan="6">
+                <a:tc>
                   <a:txBody>
                     <a:bodyPr/>
                     <a:lstStyle/>
@@ -7133,82 +7116,7 @@
                       </a:pPr>
                       <a:r>
                         <a:rPr lang="en-US" dirty="0"/>
-                        <a:t>Categorial (data will be shown below)</a:t>
-                      </a:r>
-                    </a:p>
-                  </a:txBody>
-                  <a:tcPr/>
-                </a:tc>
-                <a:tc hMerge="1">
-                  <a:txBody>
-                    <a:bodyPr/>
-                    <a:lstStyle/>
-                    <a:p>
-                      <a:pPr algn="ctr"/>
-                      <a:endParaRPr lang="en-US" dirty="0"/>
-                    </a:p>
-                  </a:txBody>
-                  <a:tcPr/>
-                </a:tc>
-                <a:tc hMerge="1">
-                  <a:txBody>
-                    <a:bodyPr/>
-                    <a:lstStyle/>
-                    <a:p>
-                      <a:pPr algn="ctr"/>
-                      <a:endParaRPr lang="en-US" dirty="0"/>
-                    </a:p>
-                  </a:txBody>
-                  <a:tcPr/>
-                </a:tc>
-                <a:tc hMerge="1">
-                  <a:txBody>
-                    <a:bodyPr/>
-                    <a:lstStyle/>
-                    <a:p>
-                      <a:pPr algn="ctr"/>
-                      <a:endParaRPr lang="en-US" dirty="0"/>
-                    </a:p>
-                  </a:txBody>
-                  <a:tcPr/>
-                </a:tc>
-                <a:tc hMerge="1">
-                  <a:txBody>
-                    <a:bodyPr/>
-                    <a:lstStyle/>
-                    <a:p>
-                      <a:pPr algn="ctr"/>
-                      <a:endParaRPr lang="en-US" dirty="0"/>
-                    </a:p>
-                  </a:txBody>
-                  <a:tcPr/>
-                </a:tc>
-                <a:tc hMerge="1">
-                  <a:txBody>
-                    <a:bodyPr/>
-                    <a:lstStyle/>
-                    <a:p>
-                      <a:pPr algn="ctr"/>
-                      <a:endParaRPr lang="en-US" dirty="0"/>
-                    </a:p>
-                  </a:txBody>
-                  <a:tcPr/>
-                </a:tc>
-                <a:extLst>
-                  <a:ext uri="{0D108BD9-81ED-4DB2-BD59-A6C34878D82A}">
-                    <a16:rowId xmlns:a16="http://schemas.microsoft.com/office/drawing/2014/main" xmlns="" val="3424020629"/>
-                  </a:ext>
-                </a:extLst>
-              </a:tr>
-              <a:tr h="0">
-                <a:tc>
-                  <a:txBody>
-                    <a:bodyPr/>
-                    <a:lstStyle/>
-                    <a:p>
-                      <a:r>
-                        <a:rPr lang="en-US" dirty="0"/>
-                        <a:t>Monthly Rate</a:t>
+                        <a:t>11</a:t>
                       </a:r>
                     </a:p>
                   </a:txBody>
@@ -7222,7 +7130,7 @@
                       <a:pPr algn="ctr"/>
                       <a:r>
                         <a:rPr lang="en-US" dirty="0"/>
-                        <a:t>2094</a:t>
+                        <a:t>12</a:t>
                       </a:r>
                     </a:p>
                   </a:txBody>
@@ -7236,7 +7144,7 @@
                       <a:pPr algn="ctr"/>
                       <a:r>
                         <a:rPr lang="en-US" dirty="0"/>
-                        <a:t>8047</a:t>
+                        <a:t>14</a:t>
                       </a:r>
                     </a:p>
                   </a:txBody>
@@ -7250,7 +7158,7 @@
                       <a:pPr algn="ctr"/>
                       <a:r>
                         <a:rPr lang="en-US" dirty="0"/>
-                        <a:t>14235.5</a:t>
+                        <a:t>15.2</a:t>
                       </a:r>
                     </a:p>
                   </a:txBody>
@@ -7264,7 +7172,7 @@
                       <a:pPr algn="ctr"/>
                       <a:r>
                         <a:rPr lang="en-US" dirty="0"/>
-                        <a:t>14313.1</a:t>
+                        <a:t>18</a:t>
                       </a:r>
                     </a:p>
                   </a:txBody>
@@ -7278,21 +7186,7 @@
                       <a:pPr algn="ctr"/>
                       <a:r>
                         <a:rPr lang="en-US" dirty="0"/>
-                        <a:t>20461.5</a:t>
-                      </a:r>
-                    </a:p>
-                  </a:txBody>
-                  <a:tcPr/>
-                </a:tc>
-                <a:tc>
-                  <a:txBody>
-                    <a:bodyPr/>
-                    <a:lstStyle/>
-                    <a:p>
-                      <a:pPr algn="ctr"/>
-                      <a:r>
-                        <a:rPr lang="en-US" dirty="0"/>
-                        <a:t>26999</a:t>
+                        <a:t>25</a:t>
                       </a:r>
                     </a:p>
                   </a:txBody>
@@ -7300,111 +7194,7 @@
                 </a:tc>
                 <a:extLst>
                   <a:ext uri="{0D108BD9-81ED-4DB2-BD59-A6C34878D82A}">
-                    <a16:rowId xmlns:a16="http://schemas.microsoft.com/office/drawing/2014/main" xmlns="" val="2676320322"/>
-                  </a:ext>
-                </a:extLst>
-              </a:tr>
-              <a:tr h="0">
-                <a:tc>
-                  <a:txBody>
-                    <a:bodyPr/>
-                    <a:lstStyle/>
-                    <a:p>
-                      <a:r>
-                        <a:rPr lang="en-US" dirty="0"/>
-                        <a:t>Daily Rate</a:t>
-                      </a:r>
-                    </a:p>
-                  </a:txBody>
-                  <a:tcPr/>
-                </a:tc>
-                <a:tc>
-                  <a:txBody>
-                    <a:bodyPr/>
-                    <a:lstStyle/>
-                    <a:p>
-                      <a:pPr algn="ctr"/>
-                      <a:r>
-                        <a:rPr lang="en-US" dirty="0"/>
-                        <a:t>102</a:t>
-                      </a:r>
-                    </a:p>
-                  </a:txBody>
-                  <a:tcPr/>
-                </a:tc>
-                <a:tc>
-                  <a:txBody>
-                    <a:bodyPr/>
-                    <a:lstStyle/>
-                    <a:p>
-                      <a:pPr algn="ctr"/>
-                      <a:r>
-                        <a:rPr lang="en-US" dirty="0"/>
-                        <a:t>465</a:t>
-                      </a:r>
-                    </a:p>
-                  </a:txBody>
-                  <a:tcPr/>
-                </a:tc>
-                <a:tc>
-                  <a:txBody>
-                    <a:bodyPr/>
-                    <a:lstStyle/>
-                    <a:p>
-                      <a:pPr algn="ctr"/>
-                      <a:r>
-                        <a:rPr lang="en-US" dirty="0"/>
-                        <a:t>802</a:t>
-                      </a:r>
-                    </a:p>
-                  </a:txBody>
-                  <a:tcPr/>
-                </a:tc>
-                <a:tc>
-                  <a:txBody>
-                    <a:bodyPr/>
-                    <a:lstStyle/>
-                    <a:p>
-                      <a:pPr algn="ctr"/>
-                      <a:r>
-                        <a:rPr lang="en-US" dirty="0"/>
-                        <a:t>802.5</a:t>
-                      </a:r>
-                    </a:p>
-                  </a:txBody>
-                  <a:tcPr/>
-                </a:tc>
-                <a:tc>
-                  <a:txBody>
-                    <a:bodyPr/>
-                    <a:lstStyle/>
-                    <a:p>
-                      <a:pPr algn="ctr"/>
-                      <a:r>
-                        <a:rPr lang="en-US" dirty="0"/>
-                        <a:t>1157</a:t>
-                      </a:r>
-                    </a:p>
-                  </a:txBody>
-                  <a:tcPr/>
-                </a:tc>
-                <a:tc>
-                  <a:txBody>
-                    <a:bodyPr/>
-                    <a:lstStyle/>
-                    <a:p>
-                      <a:pPr algn="ctr"/>
-                      <a:r>
-                        <a:rPr lang="en-US" dirty="0"/>
-                        <a:t>1499</a:t>
-                      </a:r>
-                    </a:p>
-                  </a:txBody>
-                  <a:tcPr/>
-                </a:tc>
-                <a:extLst>
-                  <a:ext uri="{0D108BD9-81ED-4DB2-BD59-A6C34878D82A}">
-                    <a16:rowId xmlns:a16="http://schemas.microsoft.com/office/drawing/2014/main" xmlns="" val="1617085218"/>
+                    <a16:rowId xmlns:a16="http://schemas.microsoft.com/office/drawing/2014/main" val="3424020629"/>
                   </a:ext>
                 </a:extLst>
               </a:tr>
@@ -7508,7 +7298,220 @@
                 </a:tc>
                 <a:extLst>
                   <a:ext uri="{0D108BD9-81ED-4DB2-BD59-A6C34878D82A}">
-                    <a16:rowId xmlns:a16="http://schemas.microsoft.com/office/drawing/2014/main" xmlns="" val="3306714524"/>
+                    <a16:rowId xmlns:a16="http://schemas.microsoft.com/office/drawing/2014/main" val="2676320322"/>
+                  </a:ext>
+                </a:extLst>
+              </a:tr>
+              <a:tr h="0">
+                <a:tc>
+                  <a:txBody>
+                    <a:bodyPr/>
+                    <a:lstStyle/>
+                    <a:p>
+                      <a:r>
+                        <a:rPr lang="en-US" dirty="0"/>
+                        <a:t>Years at Company</a:t>
+                      </a:r>
+                    </a:p>
+                  </a:txBody>
+                  <a:tcPr/>
+                </a:tc>
+                <a:tc>
+                  <a:txBody>
+                    <a:bodyPr/>
+                    <a:lstStyle/>
+                    <a:p>
+                      <a:pPr algn="ctr"/>
+                      <a:r>
+                        <a:rPr lang="en-US" dirty="0"/>
+                        <a:t>0</a:t>
+                      </a:r>
+                    </a:p>
+                  </a:txBody>
+                  <a:tcPr/>
+                </a:tc>
+                <a:tc>
+                  <a:txBody>
+                    <a:bodyPr/>
+                    <a:lstStyle/>
+                    <a:p>
+                      <a:pPr algn="ctr"/>
+                      <a:r>
+                        <a:rPr lang="en-US" dirty="0"/>
+                        <a:t>3</a:t>
+                      </a:r>
+                    </a:p>
+                  </a:txBody>
+                  <a:tcPr/>
+                </a:tc>
+                <a:tc>
+                  <a:txBody>
+                    <a:bodyPr/>
+                    <a:lstStyle/>
+                    <a:p>
+                      <a:pPr algn="ctr"/>
+                      <a:r>
+                        <a:rPr lang="en-US" dirty="0"/>
+                        <a:t>5</a:t>
+                      </a:r>
+                    </a:p>
+                  </a:txBody>
+                  <a:tcPr/>
+                </a:tc>
+                <a:tc>
+                  <a:txBody>
+                    <a:bodyPr/>
+                    <a:lstStyle/>
+                    <a:p>
+                      <a:pPr algn="ctr"/>
+                      <a:r>
+                        <a:rPr lang="en-US" dirty="0"/>
+                        <a:t>7.01</a:t>
+                      </a:r>
+                    </a:p>
+                  </a:txBody>
+                  <a:tcPr/>
+                </a:tc>
+                <a:tc>
+                  <a:txBody>
+                    <a:bodyPr/>
+                    <a:lstStyle/>
+                    <a:p>
+                      <a:pPr algn="ctr"/>
+                      <a:r>
+                        <a:rPr lang="en-US" dirty="0"/>
+                        <a:t>9</a:t>
+                      </a:r>
+                    </a:p>
+                  </a:txBody>
+                  <a:tcPr/>
+                </a:tc>
+                <a:tc>
+                  <a:txBody>
+                    <a:bodyPr/>
+                    <a:lstStyle/>
+                    <a:p>
+                      <a:pPr algn="ctr"/>
+                      <a:r>
+                        <a:rPr lang="en-US" dirty="0"/>
+                        <a:t>40</a:t>
+                      </a:r>
+                    </a:p>
+                  </a:txBody>
+                  <a:tcPr/>
+                </a:tc>
+                <a:extLst>
+                  <a:ext uri="{0D108BD9-81ED-4DB2-BD59-A6C34878D82A}">
+                    <a16:rowId xmlns:a16="http://schemas.microsoft.com/office/drawing/2014/main" val="1617085218"/>
+                  </a:ext>
+                </a:extLst>
+              </a:tr>
+              <a:tr h="0">
+                <a:tc>
+                  <a:txBody>
+                    <a:bodyPr/>
+                    <a:lstStyle/>
+                    <a:p>
+                      <a:r>
+                        <a:rPr lang="en-US" dirty="0"/>
+                        <a:t>Number of Prior </a:t>
+                      </a:r>
+                      <a:r>
+                        <a:rPr lang="en-US" dirty="0" err="1"/>
+                        <a:t>Comapany</a:t>
+                      </a:r>
+                      <a:endParaRPr lang="en-US" dirty="0"/>
+                    </a:p>
+                  </a:txBody>
+                  <a:tcPr/>
+                </a:tc>
+                <a:tc>
+                  <a:txBody>
+                    <a:bodyPr/>
+                    <a:lstStyle/>
+                    <a:p>
+                      <a:pPr algn="ctr"/>
+                      <a:r>
+                        <a:rPr lang="en-US" dirty="0"/>
+                        <a:t>0</a:t>
+                      </a:r>
+                    </a:p>
+                  </a:txBody>
+                  <a:tcPr/>
+                </a:tc>
+                <a:tc>
+                  <a:txBody>
+                    <a:bodyPr/>
+                    <a:lstStyle/>
+                    <a:p>
+                      <a:pPr algn="ctr"/>
+                      <a:r>
+                        <a:rPr lang="en-US" dirty="0"/>
+                        <a:t>1</a:t>
+                      </a:r>
+                    </a:p>
+                  </a:txBody>
+                  <a:tcPr/>
+                </a:tc>
+                <a:tc>
+                  <a:txBody>
+                    <a:bodyPr/>
+                    <a:lstStyle/>
+                    <a:p>
+                      <a:pPr algn="ctr"/>
+                      <a:r>
+                        <a:rPr lang="en-US" dirty="0"/>
+                        <a:t>2</a:t>
+                      </a:r>
+                    </a:p>
+                  </a:txBody>
+                  <a:tcPr/>
+                </a:tc>
+                <a:tc>
+                  <a:txBody>
+                    <a:bodyPr/>
+                    <a:lstStyle/>
+                    <a:p>
+                      <a:pPr algn="ctr"/>
+                      <a:r>
+                        <a:rPr lang="en-US" dirty="0"/>
+                        <a:t>2.69</a:t>
+                      </a:r>
+                    </a:p>
+                  </a:txBody>
+                  <a:tcPr/>
+                </a:tc>
+                <a:tc>
+                  <a:txBody>
+                    <a:bodyPr/>
+                    <a:lstStyle/>
+                    <a:p>
+                      <a:pPr algn="ctr"/>
+                      <a:r>
+                        <a:rPr lang="en-US" dirty="0"/>
+                        <a:t>4</a:t>
+                      </a:r>
+                    </a:p>
+                  </a:txBody>
+                  <a:tcPr/>
+                </a:tc>
+                <a:tc>
+                  <a:txBody>
+                    <a:bodyPr/>
+                    <a:lstStyle/>
+                    <a:p>
+                      <a:pPr algn="ctr"/>
+                      <a:r>
+                        <a:rPr lang="en-US" dirty="0"/>
+                        <a:t>9</a:t>
+                      </a:r>
+                    </a:p>
+                  </a:txBody>
+                  <a:tcPr/>
+                </a:tc>
+                <a:extLst>
+                  <a:ext uri="{0D108BD9-81ED-4DB2-BD59-A6C34878D82A}">
+                    <a16:rowId xmlns:a16="http://schemas.microsoft.com/office/drawing/2014/main" val="3306714524"/>
                   </a:ext>
                 </a:extLst>
               </a:tr>
@@ -7580,7 +7583,7 @@
           <p:cNvPr id="4" name="Picture 3">
             <a:extLst>
               <a:ext uri="{FF2B5EF4-FFF2-40B4-BE49-F238E27FC236}">
-                <a16:creationId xmlns:a16="http://schemas.microsoft.com/office/drawing/2014/main" xmlns="" id="{83E526A8-A255-469E-8E06-53C7CD74A94E}"/>
+                <a16:creationId xmlns:a16="http://schemas.microsoft.com/office/drawing/2014/main" id="{83E526A8-A255-469E-8E06-53C7CD74A94E}"/>
               </a:ext>
             </a:extLst>
           </p:cNvPr>
@@ -7659,7 +7662,7 @@
           <p:cNvPr id="5" name="Picture 4">
             <a:extLst>
               <a:ext uri="{FF2B5EF4-FFF2-40B4-BE49-F238E27FC236}">
-                <a16:creationId xmlns:a16="http://schemas.microsoft.com/office/drawing/2014/main" xmlns="" id="{CBD66ADA-93F9-4C07-BC0C-98D35D5D57BB}"/>
+                <a16:creationId xmlns:a16="http://schemas.microsoft.com/office/drawing/2014/main" id="{CBD66ADA-93F9-4C07-BC0C-98D35D5D57BB}"/>
               </a:ext>
             </a:extLst>
           </p:cNvPr>
@@ -7689,7 +7692,7 @@
           <p:cNvPr id="6" name="Picture 5">
             <a:extLst>
               <a:ext uri="{FF2B5EF4-FFF2-40B4-BE49-F238E27FC236}">
-                <a16:creationId xmlns:a16="http://schemas.microsoft.com/office/drawing/2014/main" xmlns="" id="{A405E111-F8BB-4FFA-BAED-ABC207E3B77D}"/>
+                <a16:creationId xmlns:a16="http://schemas.microsoft.com/office/drawing/2014/main" id="{A405E111-F8BB-4FFA-BAED-ABC207E3B77D}"/>
               </a:ext>
             </a:extLst>
           </p:cNvPr>
@@ -7728,6 +7731,137 @@
 </file>
 
 <file path=ppt/slides/slide7.xml><?xml version="1.0" encoding="utf-8"?>
+<p:sld xmlns:a="http://schemas.openxmlformats.org/drawingml/2006/main" xmlns:r="http://schemas.openxmlformats.org/officeDocument/2006/relationships" xmlns:p="http://schemas.openxmlformats.org/presentationml/2006/main">
+  <p:cSld>
+    <p:spTree>
+      <p:nvGrpSpPr>
+        <p:cNvPr id="1" name=""/>
+        <p:cNvGrpSpPr/>
+        <p:nvPr/>
+      </p:nvGrpSpPr>
+      <p:grpSpPr>
+        <a:xfrm>
+          <a:off x="0" y="0"/>
+          <a:ext cx="0" cy="0"/>
+          <a:chOff x="0" y="0"/>
+          <a:chExt cx="0" cy="0"/>
+        </a:xfrm>
+      </p:grpSpPr>
+      <p:sp>
+        <p:nvSpPr>
+          <p:cNvPr id="2" name="Title 1"/>
+          <p:cNvSpPr>
+            <a:spLocks noGrp="1"/>
+          </p:cNvSpPr>
+          <p:nvPr>
+            <p:ph type="title"/>
+          </p:nvPr>
+        </p:nvSpPr>
+        <p:spPr>
+          <a:xfrm>
+            <a:off x="557211" y="342900"/>
+            <a:ext cx="8534401" cy="685800"/>
+          </a:xfrm>
+        </p:spPr>
+        <p:txBody>
+          <a:bodyPr/>
+          <a:lstStyle/>
+          <a:p>
+            <a:r>
+              <a:rPr lang="en-US"/>
+              <a:t>How to mitigate attrition</a:t>
+            </a:r>
+            <a:endParaRPr lang="en-US" dirty="0"/>
+          </a:p>
+        </p:txBody>
+      </p:sp>
+      <p:sp>
+        <p:nvSpPr>
+          <p:cNvPr id="3" name="Text Placeholder 2"/>
+          <p:cNvSpPr>
+            <a:spLocks noGrp="1"/>
+          </p:cNvSpPr>
+          <p:nvPr>
+            <p:ph type="body" idx="1"/>
+          </p:nvPr>
+        </p:nvSpPr>
+        <p:spPr>
+          <a:xfrm>
+            <a:off x="684213" y="1193800"/>
+            <a:ext cx="8534400" cy="4800600"/>
+          </a:xfrm>
+        </p:spPr>
+        <p:txBody>
+          <a:bodyPr/>
+          <a:lstStyle/>
+          <a:p>
+            <a:r>
+              <a:rPr lang="en-US"/>
+              <a:t>Whole Team Provides content</a:t>
+            </a:r>
+            <a:endParaRPr lang="en-US" dirty="0"/>
+          </a:p>
+        </p:txBody>
+      </p:sp>
+      <p:sp>
+        <p:nvSpPr>
+          <p:cNvPr id="4" name="AutoShape 2" descr="data:image/png;base64,iVBORw0KGgoAAAANSUhEUgAABUAAAAPACAMAAADDuCPrAAABYlBMVEUAAAAAADoAAGYAOjoAOmYAOpAAZrYzMzM6AAA6OgA6Ojo6OmY6ZmY6ZpA6ZrY6kLY6kNtNTU1NTW5NTY5Nbm5Nbo5NbqtNjshmAABmADpmOgBmOjpmZjpmZmZmZpBmkGZmkLZmkNtmtttmtv9uTU1ubk1ubm5ubo5ujqtujshuq8huq+SOTU2Obk2Obm6Oq8iOyOSOyP+QOgCQOjqQZjqQZmaQZpCQkGaQkLaQtraQttuQ2/+rbk2rjk2rjm6rq8iryOSr5Mir5P+2ZgC2Zjq2kDq2kGa2kJC2tpC2tra2ttu229u22/+2///Ijk3Ijm7Iq27Iq6vIyKvI5KvI5OTI5P/I///bkDrbkGbbtmbbtpDbtrbb27bb29vb2//b/7bb///kq27kyI7kyKvk5P/k///r6+v8jVn/tmb/yI7/25D/27b/29v/5Kv/5Mj/5OT//7b//7///8j//9v//+T///+zjZs9AAAACXBIWXMAAB2HAAAdhwGP5fFlAAAgAElEQVR4nO3d/59b5ZnecU0wMDGEILMYh0CWwmwDxaSLN3S7xHW3mGQXkni3aY0TEijO1q2/YMe1rP+/0iNpRnPbM+fMM9e5n3PffN4/xB472Eiv6/mgGUlnJnMAQJVJ638BAIiKgAJAJQIKAJUIKABUIqAAUImAAkAlAgoAlQgoAFQioABQiYACQCUCCgCVCCgAVCKgAFCJgAJAJQIKAJVGENDZl298fzKZ7Lzw8Ten/rNuT570zvzhhcnOLwT/pgCwrXlAZ7/aPWjdS6dNKAEF4Kd1QO+9fih2p+0cAQXgp3FA7y4ffu689dXip9/+6vuCgh78ud/7reRPAoCjtA3o4qHh1ufts1/KCkpAAQyvbUCvLor59tbHy8/An1P8wQQUwPCaBnT5CfzLh37lRvmapeRPJqAABtY0oItcmswtP6d/rvzGwQPRq5vK3vv5Irg7P/jNwT/9zuzT3cnOC09+1n84oJsnka4ufyh/ygsfL3/9yx8vev3Cr/f/f+YvAIBjtQzo7NKTn7Cvmroo3n7/NvWbfWpe7LQM6NUjnro/OqA31n/Iywd/4PpB8BN/AQAcq2VAlw837efrt1c9vHrwO4tfefabVW03VtVdpPBs+fDZJ3t3ZED/fv8Pefvq4ddOPfkXAMCxWgZ0UbknHjyuo3r7IGLrli4fOb709Xz+7aebx4zlseQPv5l/+/VT/+inBnRh+Rn6l4tP1Z+Z7Lz9zeqZ/+fmT/0LAOBYLQN6+ymffS8D+vJ866Xv68/mtx6t3l5/5fTGMaE7OqAvb/6MzV9wdfUQ9il/AQAca6QBXdZxlbr180nbTysdPCY98kWjRwZ0/aubv2a+/yWCp/wFAHCssQZ0UcDypc3lVyaXMdtu2u39xj7lq58rRwb0uYO/5p1D/9en/AUAcKyRfg10Gc7ye+uQbj/Ds3mW58YxT/YcGdCXD//K/v/1aX8BABxrbM/C70f19qFP5W3f7Cfd1qkDeuRjWwDYGOfrQOclcYuIbR6IElAA4zPOdyItlbcNbV7OtPlSqPmntQHliSMAJ9I0oFu5XNt6L3z5HH7/qZ2rTz6vIw3o0/4CADhW26sx2Zdy3t765HnxmPDZ/7X/ls7tp9xv7H95VBjQp/wFAHCstgEtX3k8eOf5jcn2C5tulDderku2deGmzfNM2oA+5S8AgGM1viL9veUVlQ9dkf7gC5Grq9VvSrZ8F9GZX6+/h9LmvZfCgD7lLwCAY435eyJd3X42fPtp8lUbxQF98i8AgGO1Duih78q5c/g6crcn28+Mz36++b+dWV2wUxzQJ/8CADhW84AufPnz5Sfvz7xovy/89lVBl/60vN7x+lrIc31An/gLAOBYYwgoAIREQAGgEgEFgEoEFAAqEVAAqERAAaASAQWASgQUACoRUACoREABoBIBBYBKBBQAKhFQAKhEQAGgEgEFgEoEFAAqEVAAqNQwoP8HEtyT6MRIVEzFCGh43JPoxEhUTMUIaHjck+jESFRMxQhoeNyT6MRIVEzFCGh43JPoxEhUTMUIaHjck+jESFRMxQhoeNyT6MRIVEzFCGh43JPoxEhUTMUIaHjck+jESFRMxQhoeNyT6MRIVEzFCGh43JPoxEhUTMUIaHjck+jESFRMxQhoeNyT6MRIVEzFCGh43JPoxEhUTMUIaHjck+jESFRMxQhoeNyT6MRIVEzFCGh43JPoxEhUTMUIaHjck+jESFRMxQhoeNyT6MRIVEzFCGh43JPoxEhUTMUIaHjck+jESFRMxQhoeNyT6MRIVEzFCGh43JPoxEhUTMUIaHjck+jESFRMxQhoeNyT6MRIVEzFCGh43JPoxEhUTMUIaHjck+jESFRMxQhoeNyT6MRIVEzFCGh43JPoxEhUTMUIaHjck+jESFRMxQhoeNyT6MRIVEzFCGh43JPoxEhUTMUIaHjck+jESFRMxQhoeNyT6MRIVEzFCGh43JPoxEhUTMUIaHjck+jESFRMxQhoeNyT6MRIVEzFUgX0/+I7RL+fxAioiqkYAUVQ+v0kRkBVTMUIKILS7ycxAqpiKkZAEZR+P4kRUBVTMQKKoPT7SYyAqpiKEVAEpd9PYgRUxVSMgCIo/X4SI6AqpmIEFEHp95MYAVUxFSOgCEq/n8QIqIqpGAFFUPr9JEZAVUzFCCiC0u8nMQKqYipGQBGUfj+JEVAVUzECiqD0+0mMgKqYihFQBKXfT2IEVMVUjIAiKP1+EiOgKqZiBBRB6feTGAFVMRUjoAhKv5/ECKiKqRgBRVD6/SRGQFVMxQgogtLvJzECqmIqRkARlH4/iRFQFVMxAoqg9PtJjICqmIoRUASl309iBFTFVIyAIij9fhIjoCqmYgQUQen3kxgBVTEVI6AISr+fxAioiqkYAUVQ+v0kRkBVTMUIKILS7ycxAqpiKkZAEZR+P4kRUBVTMQKKoPT7SYyAqpiKEVAEpd9PYgRUxVSMgCIo/X4SI6AqpmKnDeiji6+tf/b4yt50+u71rg8IKDT0+0mMgKqIA3pt+tqmpNOlV744/gMCChH9fhIjoCrSgD6+Nt0E9Nr0/PX5g8vT87eO/YCAQkS/n8QIqIoyoP/2wXQT0Pt75RHmo4vnPjnuAwIKFf1+EiOgKsKA3pxO3/vzOqA39398/7gPCChU9PtJjICqKAP66j/O76zzeG36YfmxfHz0BwQUKvr9JEZAVYQB3cri48vrT9Dv752/dfQHq3/m+ZVT/s1P0fpIw5N+P8BJEVAEpd8PcFL6gL7yxdEfHPpH9Y+uWx9peNLvJzE+hVcZPKDdj0AJKAT0+0mMgKoQUOSg309iBFRlmIDyLDy86feTGAFVGSigm1d5rl/6edQHBBQq+v0kRkBVBgoo70SCM/1+EiOgKgMF9PHl6av773g/+gMCChX9fhIjoCoDBXT+YPuaS0d/QEAhot9PYgRUZaiAzh9cWVTy3VtdHxBQaOj3kxgBVREH9BT0t631kYYn/X4SI6AqpmIEFEHp95MYAVUxFSOgCEq/n8QIqIqpGAFFUPr9JEZAVUzFCCiC0u8nMQKqYipGQBGUfj+JEVAVUzECiqD0+0mMgKqYihFQBKXfT2IEVMVUjIAiKP1+EiOgKqZiBBRB6feTGAFVMRUjoAhKv5/ECKiKqRgBRVD6/SRGQFVMxQgogtLvJzECqmIqRkARlH4/iRFQFVMxAoqg9PtJjICqmIoRUASl309iBFTFVIyAIij9fhIjoCqmYgQUQen3kxgBVTEVI6AISr+fxAioiqkYAUVQ+v0kRkBVTMUIKILS7ycxAqpiKkZAEZR+P4kRUBVTMQKKoPT7SYyAqpiKEVAEpd9PYgRUxVSMgCIo/X4SI6AqpmIEFEHp95MYAVUxFSOgCEq/n8QIqIqpGAFFUPr9JEZAVUzFCCiC0u8nMQKqYipGQBGUfj+JEVAVUzECiqD0+0mMgKqYihFQBKXfT2IEVMVUjIAiKP1+EiOgKqZiBBRB6feTGAFVMRUjoAhKv5/ECKiKqRgBRVD6/SRGQFVMxQgogtLvJzECqmIqRkARlH4/iRFQFVMxAoqg9PtJjICqmIoRUASl309iBFTFVIyAIij9fhIjoCqmYgQUQen3kxgBVTEVI6AISr+fxAioiqkYAUVQ+v0kRkBVTMUIKILS7ycxAqpiKkZAEZR+P4kRUBVTMQKKoPT7SYyAqpiKEVAEpd9PYgRUxVSMgCIo/X4SI6AqpmIEFEHp95MYAVUxFSOgCEq/n8QIqIqpGAFFUPr9JEZAVUzFCCiC0u8nMQKqYipGQBGUfj+JEVAVUzECiqD0+0mMgKqYihFQBKXfT2IEVMVUjIAiKP1+EiOgKqZiBBRB6feTGAFVMRUjoAhKv5/ECKiKqRgBRVD6/SRGQFVMxQgogtLvJzECqmIqRkARlH4/iRFQFVMxAoqg9PtJjICqmIoRUASl309iBFTFVIyAIij9fhIjoCqmYgQUQen3kxgBVTEVI6AISr+fxAioiqkYAUVQ+v0kRkBVTMUIKILS7ycxAqpiKkZAEZR+P4kRUBVTMQKKoPT7SYyAqpiKEVAEpd9PYgRUxVSMgCIo/X4SI6AqpmIEFEHp95MYAVUxFSOgCEq/n8QIqIqpGAFFUPr9JEZAVUzFCCiC0u8nMQKqYipGQBGUfj+JEVAVU7GGAdVrfaThqfXaAB6BIiz9fhLjEaiKqRgBRVD6/SRGQFVMxQgogtLvJzECqmIqRkARlH4/iRFQFVMxAoqg9PtJjICqmIoRUASl309iBFTFVIyAIij9fhIjoCqmYgQUQen3kxgBVTEVI6AISr+fxAioiqkYAUVQ+v0kRkBVTMUIKILS7ycxAqpiKkZAEZR+P4kRUBVTMQKKoPT7SYyAqpiKEVAEpd9PYgRUxVSMgCIo/X4SI6AqpmIEFEHp95MYAVUxFSOgCEq/n8QIqIqpGAFFUPr9JEZAVUzFCCiC0u8nMQKqYipGQBGUfj+JEVAVUzECiqD0+0mMgKqYihFQBKXfT2IEVMVUjIAiKP1+EiOgKqZiBBRB6feTGAFVMRUjoAhKv5/ECKiKqRgBRVD6/SRGQFVMxQgogtLvJzECqmIqRkARlH4/iRFQFVMxAoqg9PtJjICqmIoRUASl309iBFTFVIyAIij9fhIjoCqmYgQUQen3kxgBVTEVI6AISr+fxAioiqkYAUVQ+v0kRkBVTMUIKILS7ycxAqpiKkZAEZR+P4kRUBVTMQKKoPT7SYyAqpiKEVAEpd9PYgRUxVSMgCIo/X4SI6AqpmIEFEHp95MYAVUxFSOgCEq/n8QIqIqpGAFFUPr9JEZAVUzFCCiC0u8nMQKqYipGQBGUfj+JEVAVUzECiqD0+0mMgKqYihFQBKXfT2IEVMVUjIAiKP1+EiOgKqZiBBRB6feTGAFVMRUjoAhKv5/ECKiKqRgBRVD6/SRGQFVMxQgogtLvJzECqmIqRkARlH4/iRFQFVMxAoqg9PtJjICqmIoRUASl309iBFTFVIyAIij9fhIjoCqmYgQUQen3kxgBVTEVI6AISr+fxAioiqkYAUVQ+v0kRkBVTMUIKILS7ycxAqpiKkZAEZR+P4kRUBVTMQKKoPT7SYyAqpiKEVAEpd9PYgRUxVSMgCIo/X4SI6AqpmIEFEHp95MYAVUxFSOgCEq/n8QIqIqpGAFFUPr9JEZAVUzFCCiC0u8nMQKqYipGQBGUfj+JEVAVUzECiqD0+0mMgKqYihFQBKXfT2IEVMVUjIAiKP1+EiOgKqZiBBRB6feTGAFVMRUjoAhKv5/ECKiKqRgBRVD6/SRGQFVMxQgogtLvJzECqmIqRkARlH4/iRFQFVMxAoqg9PtJjICqmIoRUASl309iBFTFVIyAIij9fhIjoCqmYgQUQen3kxgBVTEVI6AISr+fxAioiqmYKKCPL083XvliPn908eDni9+8sjedvnudgEJJv5/ECKiKS0Dv720FdF3TVUwJKET0+0mMgKoME9CN+3vnPln8cGf62sGvXZuevz5/cHl6/hYBhY5+P4kRUJVBA7p4IPr+qpnvbzV1/Ti0pJWAQkS/n8QIqMqgAb25epj5+PJWLG+uH43e3IoqAcWp6feTGAFVGTKgjy5OP1z9eP53H0ynP72+/ODa6tcOf1pPQHFa+v0kRkBVhgzo5sHm5jmkZTr3H43e39t8EfT5FeXfvNL6SMOTfj/ASSkDuv9lzjvT6Xu35n+5Ml18TEAxDP1+gJNSBvTO5on2zSPR5XNJWwE1L2TSP7pufaThSb+fxPgUXmW4gD6+vP5q56GiPuURKAGFgH4/iRFQleEC+sRDzPIrBBTD0O8nMQKqMlxAn3iafdVMnoXHIPT7SYyAqgwX0P1Xz+9/Ll+auXn9J68DhZR+P4kRUJXBArr16vlrqwebq5DyTiQMQr+fxAioymABfXRx/0ug9/eWL2N68EF5Vn6R0Vd5Lzzk9PtJjICqDBbQ7SeJbq4vxnR9+cEDrsaEAej3kxgBVRksoHe2H2I++Nl0eu699ccPriz6+e4t+w/ob1vrIw1P+v0kRkBVBgvoielvW+sjDU/6/SRGQFVMxQgogtLvJzECqmIqRkARlH4/iRFQFVMxAoqg9PtJjICqmIoRUASl309iBFTFVKwjoLM/fvY5AcUY6feTGAFV6RvQe//pm/n84euTyeTMLwgoxke/n8QIqErPgN6YfO+38/nVydLyZwQUI6PfT2IEVKVfQG+XbN7dnTz7zb0Lk5cJKEZHv5/ECKhKv4BeXZRzmdGdXyz/d/lzAopx0e8nMQKq0iugs0vLcq4z+vDCMJ/D629b6yMNT/r9JEZAVXoFdNXMhxcmz80JKMZJv5/ECKjKCQJ6d3fyDgHFSOn3kxgBVekV0NWn8DfKl0D5GihGSb+fxAioSq+Azq9Onls+/b4sJ8/CY5T0+0mMgKr0C+jt8gLQxWfws59PVo9DCSjGRb+fxAioSr+ALj59X3iuPJG0884g/SSgOBX9fhIjoCo9Azq/99FPPl788PBHP/jNMP0koDgV/X4SI6AqfQM6PP1ta32k4Um/n8QIqIqp2LEBnX09YD8JKE5Fv5/ECKiKqdjRAf3yx8v3wz/80VuDvIaJgOKU9PtJjICq9Azo7NPVdZgeXpicGeZiTAQUp6LfT2IEVKVnQK9OJmf+evd7v5393WSg19ETUJyKfj+JEVCVfgG9PZm8vX4P5x9Wb+gkoBgX/X4SI6Aq/QJ6dfnuo/Wb4G+US4oQUIyLfj+JEVCVXgFdvRd+HdC7u1xMBOOj309iBFSlV0A3l7Mr5eRqTBgj/X4SI6AqBBQ56PeTGAFV6RXQ2aXlE0frcnI5O4yRfj+JEVCVXgFdPXG0CugipjyJhPHR7ycxAqrSL6B3dycvfVMCeu91LmeHMdLvJzECqtIvoOVydmd3d178/uLHYa6nTEBxKvr9JEZAVXoGdP773cnaQP0koDgV/X4SI6AqfQM6//ZXZxf1fGawy4ESUJyKfj+JEVCV3gEdnP62tT7S8KTfT2IEVMVUjOuBIij9fhIjoCqmYlwPFEHp95MYAVXpGVCuB4qR0+8nMQKq0jOgXA8UI6ffT2IEVKVfQLkeKMZOv5/ECKhKv4ByPVCMnX4/iRFQlV4B5XqgGD39fhIjoCq9Asrl7DB6+v0kRkBVCChy0O8nMQKq0iugXA8Uo6ffT2IEVKVXQLkeKEZPv5/ECKhKv4ByPVCMnX4/iRFQlX4B5XqgGDv9fhIjoCo9A8r1QDFy+v0kRkBV+gaU64Fi3PT7SYyAqvQO6OD0t631kYYn/X4SI6AqpmIEFEHp95MYAVUxFTvihfQ/emnQaykTUJyafj+JEVCVfgG9MJk8M9iVlAkoBPT7SYyAqvQK6OpyypMzHw/ZUP1ta32k4Um/n8QIqEqvgC786celoS98TEAxSvr9JEZAVfoGdL76rkgLQ72QSX/bWh9peNLvJzECqnKCgC4+lf/y9WVCd94a4ikl/W1rfaThSb+fxAioyokCuvDtz8tbkl7QPwzV37bWRxqe9PtJjICqnCigs199f/OGzslLBBRjot9PYgRUpX9AN/VcPhf/7af698Trb1vrIw1P+v0kRkBVegZ0/dXPg1eD6i+rrL9trY80POn3kxgBVekV0NmliX3ySP+NPfS3rfWRhif9fhIjoCq9Arp8J9LO4ZcvPbzAI1CMiX4/iRFQlZ4B/cGvzS/NPle/lEl/21ofaXjS7ycxAqrSK6Au9Let9ZGGJ/1+EiOgKqZiBBRB6feTGAFVMRXruCL9ztlB3oREQHFq+v0kRkBV+gb0xv4r6PmeSBgj/X4SI6AqPQO67OczL775Bt+VEyOl309iBFSlX0Dv7k6eXb2K6d4lvi88xki/n8QIqEq/gF49eN/R7NLkOQKK0dHvJzECqtIroLNLW4867+6qX0JPQHF6+v0kRkBVegX00Ps29W/iJKA4Pf1+EiOgKgQUOej3kxgBVekV0NmlyTv7H+ivw0RAcXr6/SRGQFV6BZQnkTB6+v0kRkBV+gX07u7kzOpyIn96nZcxYYz0+0mMgKr0C+jqjUhnz54d8q1Icq2PNDy1XhtwzFs5/7C7fifnztsD/dX6/zi0PtLwpN9PYjwCVekb0PnsyzcWj0Bf/HiQJ5AIKE5Lv5/ECKhK74AOTn/bWh9peNLvJzECqmIqRkARlH4/iRFQFVMxG9DZR28+6Se8DhSjo99PYgRUpSOgy28n9wTeiYTx0e8nMQKqQkCRg34/iRFQlY6AOtLfttZHGp70+0mMgKqYihFQBKXfT2IEVMVU7PiAfjVcPgkoTke/n8QIqIqp2NEB/fLH5X1IP/gNAcUY6feTGAFV6RnQ2aX9p5BeGui9SPrb1vpIw5N+P4kRUJV+AV32c+fFf/jsn97YnQx0NTsCilPR7ycxAqrSL6A3JpMfrh54zn452bq4MgHFWOj3kxgBVekV0MUD0INr2F3lgsoYIf1+EiOgKr0C+vDCoe/KyQvpMT76/SRGQFV6BpRvKoeR0+8nMQKq0iugfF94jJ5+P4kRUJVeAZ3f2Pq65w2+BooR0u8nMQKq0i+gs0v7L/+8MdC1RAgoTkW/n8QIqEqvgM4+Wr7+88W3Pvvn5Y8vDHNVUP1ta32k4Um/n8QIqEqvgLpc1E5/21ofaXjS7ycxAqpCQJGDfj+JEVCVXgF1ob9trY80POn3kxgBVTEVI6AISr+fxAioiqkYAUVQ+v0kRkBVTMWODugfP9v3OS+kx+jo95MYAVXpGdDf7/JN5TBq+v0kRkBV+gX0Nt+VEyOn309iBFSlV0BnlyY7H3+17+sh+klAcSr6/SRGQFV6BfThhYEuokxAoaLfT2IEVKVnQAd6/zsBhYp+P4kRUJVeAZ1dIqAYOf1+EiOgKr0COr/Bp/AYOf1+EiOgKv0Ceuh7ehBQjJB+P4kRUJV+AZ3fuzA58+aG+kJ2BBSnp99PYgRUpWdAP+V1oBg3/X4SI6Aq/QJ6gxfSY+T0+0mMgKr0Cmh5If0gn7cTUIjo95MYAVXpFVCP55AIKE5Fv5/ECKhKz4DyOlCMnH4/iRFQlV4B5YX0GD39fhIjoCq9Ajq/MXmZgGLU9PtJjICq9Avo7NLO2wQUY6bfT2IEVKVXQGcfvTGZ7LzIC+kxXvr9JEZAVXoF1HxbY14HivHR7ycxAqpCQJGDfj+JEVCVXgF1ob9trY80POn3kxgBVTEVI6AISr+fxAioiqkYAUVQ+v0kRkBVTMVsQGd/tN8F/uGPz77A10AxOvr9JEZAVToC+vDC6imj2UebFy9tfoWAYlT0+0mMgKr0DOhBNgkoRkm/n8QIqAoBRQ76/SRGQFUIKHLQ7ycxAqpCQJGDfj+JEVAVAooc9PtJjICqEFDkoN9PYgRUhYAiB/1+EiOgKgQUOej3kxgBVSGgyEG/n8QIqAoBRQ76/SRGQFUIKHLQ7ycxAqrSHdAnEVCMj34/iRFQFQKKHPT7SYyAqnQEdPbRm0/im8phfPT7SYyAqnQE1JH+trU+0vCk309iBFTFVIyAIij9fhIjoCqmYgQUQen3kxgBVTEVI6AISr+fxAioiqkYAUVQ+v0kRkBVTMUIKILS7ycxAqpiKkZAEZR+P4kRUBVTMQKKoPT7SYyAqpiKEVAEpd9PYgRUxVTsiXciXdr5xeKHb78moBg3/X4SI6AqHQF9eGH5xvfV/xJQjJh+P4kRUJXOgC4fgRJQjJ5+P4kRUJWOgM4uTZ79/Ks/Xfjer786MMzn8/rb1vpIw5N+P4kRUJWOgM5vcDk7hKDfT2IEVKUroLNP6wL66OK0eOWL5UePr+xNp+9eX/3WoQ8IKDT0+0mMgKp0BXSR0K8+++fdnX/47MDnPa4Hen9vK6Drmq5ieugDAgoR/X4SI6Aq3QGdVz2JdGf62sEH16bnr88fXJ6ev2U/IKAQ0e8nMQKq0iugs49OfBH6a9P3939+f2/9OPTcJ+YDAgoV/X4SI6AqvQJ6co8vb/Xx5vrR6M1lVA99QEChot9PYgRUpXdAv/3V2clk5+xb/V7D9Oji+d99MJ3+9Pryg2vTD8svlk/rD31AQKGi309iBFSlb0APXs70cp+Abp5DWtZy/9Ho/b3ztw59sPr/Pr/S5489mdZHGp70+wFO6qiALvv5zItvvvH9ngW9M52+d2v+lyvTRS4JKBzo9wOc1BEBvbs7efY35Wf3Lk3K5UU6bL7SuXwuaauZr3xx6IND/4j+0XXrIw1P+v0kxqfwKv0CenXy7OZp+NmlyXPdAd24MzUPOp/yCJSAQkC/n8QIqEqvgK4vardyd/fZ/q9pMg86CSiGot9PYgRUpVdAD72Q/kSvqi+Z5Fl4DE+/n8QIqMowAX18eTuTm5d8rl8HuvUBAYWKfj+JEVCVXgGdXZq8s//B7UmPT+GvrR5frkLKO5EwPP1+EiOgKr0CevInke7vLV/G9OCD8o73RUZf3X/7+6EPCChU9PtJjICq9Avo3d3JmV+Xn/3p9V4vY1p8hr665tL15QcPti/A9ICrMWEA+v0kRkBV+gV09Uaks2fP9n4r0vzBz6bTc++tH2U+uLJI5rtP+4CAQkO/n8QIqErPgM7/sLt+J+fO2736eXL629b6SMOTfj+JEVCVvgGdz758Y/EI9MWPT3pdOwIKF/r9JEZAVXoHdHD629b6SMOTfj+JEVAVUzECiqD0+0mMgKqYihFQBKXfT2IEVMVUjIAiKP1+EiOgKqZiBBRB6feTGAFVMRUjoAhKv5/ECKiKqRgBRVD6/SRGQFVMxQgogtLvJzECqmIqRkARlH4/iRFQFVOxo67G9IPfEFCMmn4/iRFQlV4BfXhh63qgBBRjpN9PYgRUpWdAT/BdPAgoWtDvJzECqtIroIe+qRwBxRjp95MYAVXpFdD5jc23hSegGCn9fhIjoCr9AvrtLyeTZ158c+0ng1zSTn/bWh9peJuln3QAABwGSURBVNLvJzECqtIroA8vTLYN8wVR/W1rfaThSb+fxAioCgFFDvr9JEZAVXoF1IX+trU+0vCk309iBFTFVIyAIij9fhIjoCqmYscGdPb1gP0koDgV/X4SI6AqpmJHB/TLHy+/+PnwR28N9V3l9Let9ZGGJ/1+EiOgKj0DOvt09ezRwwuTMwO9KUl/21ofaXjS7ycxAqrSM6BXJ5Mzf737vd/O/m4yeXaYx6D629b6SMOTfj+JEVCVfgG9PZm8vX5H/B92B7qwiP62tT7S8KTfT2IEVKVfQK9OXt6/pMiNyXMEFKOj309iBFSlV0BXFxNZB/TuLi+kx/jo95MYAVXpFdBVOtcBHeradvrb1vpIw5N+P4kRUBUCihz0+0mMgKr0Cujs0vKJo3U5bw/0NLz+trU+0vCk309iBFSlV0BXTxytArqIKU8iYXz0+0mMgKr0C+jd3clL35SA3nt9MtDV6fW3rfWRhif9fhIjoCr9Arp4CDqZnN3defH7ix9fHqSfBBSnot9PYgRUpWdA57/f3VwNdKB+ElCcin4/iRFQlb4BnX/7q7OLej4z3DeI19+21kcanvT7SYyAqvQO6OD0t631kYYn/X4SI6AqpmLHXw/0qwH7SUBxKvr9JEZAVUzFjr8e6AKfwmOc9PtJjICq9Azo7NL+t5R7aaArKutvW+sjDU/6/SRGQFX6BXTZz50X//Nn//TGoqDDvI6egOJU9PtJjICq9Avo7f1XL81+OeF6oBgh/X4SI6AqvQK6eAB68OrPq7yVEyOk309iBFSlV0AfXth6+ybXA8UY6feTGAFV6RnQrWZyOTuMkX4/iRFQlV4BXV2Rfu3uLpezw/jo95MYAVXpFdBD3wfpxkDvhtffttZHGp70+0mMgKr0C+jDC5MffrPp5zCfwRNQnIp+P4kRUJWOgM4+erN4Y/U60H9+c3cyefEnfAqP0dHvJzECqtIR0MVDzyfxJBLGR7+fxAioCgFFDpUj+X/4DpH2pegIqCP9bWt9pOGpciStjzQ8SftSmIoRUARVOZLWRxqepH0pTMUIKIKqHEnrIw1P0r4UpmJHB/SPn+37nGfhMTqVI2l9pOFJ2peiZ0APvqccTyJhlCpH0vpIw5O0L0W/gN7mWXiMXOVIWh9peJL2pegV0Nmlyc7HX+37eoh+ElCcSuVIWh9peJL2pegV0IcXBrqIMgGFSuVIWh9peJL2pegZ0IHe/05AoVI5ktZHGp6kfSl6BXR2iYBi5CpH0vpIw5O0L0WvgM5v8Ck8Rq5yJK2PNDxJ+1L0C+ih7+lBQDFClSNpfaThSdqXol9A5/cuTM68ucHl7DA+lSNpfaThSdqXomdAP+V1oBi3ypG0PtLwJO1L0S+gN3ghPUauciStjzQ8SftS9ApoeSH9IJ+3E1CIVI6k9ZGGJ2lfil4B9XgOiYDiVCpH0vpIw5O0L0XPgPI6UIxc5UhaH2l4kval6BVQXkiP0ascSesjDU/SvhS9AjrY94InoFCpHEnrIw1P0r4U/QI6u7TzNgHFmFWOpPWRhidpX4peAZ19VL4vPC+kx3hVjqT1kYYnaV+KXgE139yY14FifCpH0vpIw5O0LwUBRQ6VI2l9pOFJ2peiV0Bd6G9b6yMNT5UjaX2k4Unal8JUjIAiqMqRtD7S8CTtS2EqRkARVOVIWh9peJL2pTAVOyKg3361jW8qh/GpHEnrIw1P0r4UvQLq8iSSXusjDU+VI2l9pOFJ2pen4Vl4BFU5ktZHGp6kfSl6BXT2x8/W/v71yc4/fM4L6TE6lSNpfaThSdqXoldAt93dfXaYK4Pqb1vrIw1PlSNpfaThSdqX4sQBHezCIvrb1vpIw1PlSFofaXiS9qU4eUCHegiqv22tjzQ8VY6k9ZGGJ2lfipMHdKirK+tvW+sjDU+VI2l9pOFJ2pfi5AG9u0tAMT6VI2l9pOFJ2pfixAGdXZ3wKTzGp3IkrY80PEn7UvQK6OyjzaVA33xjd8KTSBihypG0PtLwJO1L0Sugh19Iz8uYMEKVI2l9pOFJ2pfixAF95q2BvkG8/ra1PtLwVDmS1kcanqR9KXoF1IX+trU+0vBUOZLWRxqepH0pTMUIKIKqHEnrIw1P0r4UpmIEFEFVjqT1kYYnaV8KUzECiqAqR9L6SMOTtC+FqZgN6NYLmA7wbY0xPpUjaX2k4Unal6IjoOZKoFwPFGNVOZLWRxqepH0pCChyqBxJ6yMNT9K+FB0Btb7cnfBOJIxR5UhaH2l4kvalOFFAZz9f5PPMbwbpJwHFqVSOpPWRhidpX4qTBPQPi4efO0O9EYmA4lQqR9L6SMOTtC9F/4AO+vCTgOKUKkfS+kjDk7QvRe+Aloef/26wfBJQnE7lSFofaXiS9qXoGdB7Az/8JKA4pcqRtD7S8CTtS9EvoIM//CSgOKXKkbQ+0vAk7UvRJ6D3Li2vAjrow08CilOqHEnrIw1P0r4UPQJaHn6+PXA+CShOp3IkrY80PEn7UnQG1OfhJwHFKVWOpPWRhidpX4qugP7e5+EnAcUpVY6k9ZGGJ2lfio6A8l54BFE5ktZHGp6kfSkIKHKoHEnrIw1P0r4UHQHleqAIonIkrY80PEn7UnQE1JH+trU+0vBUOZLWRxqepH0pTMUIKIKqHEnrIw1P0r4UpmIEFEFVjqT1kYYnaV8KUzECiqAqR9L6SMOTtC+FqRgBRVCVI2l9pOFJ2pfCVIyAIqjKkbQ+0vAk7UthKkZAEVTlSFofaXiS9qUwFSOgCKpyJK2PNDxJ+1KYihFQBFU5ktZHGp6kfSlMxQgogqocSesjDU/SvhSmYgQUQVWOpPWRhidpXwpTMQKKoCpH0vpIw5O0L4WpGAFFUJUjaX2k4Unal8JUjIAiqMqRtD7S8CTtS2EqRkARVOVIWh9peJL2pTAVI6AIqnIkrY80PEn7UpiKEVAEVTmS1kcanqR9KUzFCCiCqhxJ6yMNT9K+FKZiBBRBVY6k9ZGGJ2lfClMxAoqgKkfS+kjDk7QvhakYAUVQlSNpfaThSdqXwlSMgCKoypG0PtLwJO1LYSpGQBFU5UhaH2l4kvalMBUjoAiqciStjzQ8SftSmIoRUARVOZLWRxqepH0pTMUIKIKqHEnrIw1P0r4UpmIEFEFVjqT1kYYnaV8KUzECiqAqR9L6SMOTtC+FqRgBRVCVI2l9pOFJ2pfCVIyAIqjKkbQ+0vAk7UthKkZAEVTlSFofaXiS9qUwFSOgCKpyJK2PNDxJ+1KYihFQBFU5ktZHGp6kfSlMxQgogqocSesjDU/SvhSmYgQUQVWOpPWRhidpXwpTMQKKoCpH0vpIw5O0L4WpGAFFUJUjaX2k4Unal8JUjIAiqMqRtD7S8CTtS2EqRkARVOVIWh9peJL2pTAVI6AIqnIkrY80PEn7UpiKEVAEVTmS1kcanqR9KUzFCCiCqhxJ6yMNT9K+FKZiBBRBVY6k9ZGGJ2lfClMxAoqgKkfS+kjDk7QvhakYAUVQlSNpfaThSdqXwlSMgCKoypG0PtLwJO1LYSpGQBFU5UhaH2l4kvalMBUjoAiqciStjzQ8SftSmIrpAvpvP5tOz717vfz80cVp8coXy48eX9mbTte/Q0AhUjmS1kcanqR9KYYK6L+sknnuk+UH9/e2Arqu6SqmBBQilSNpfaThSdqXYqCA3pme+9v5/MHlVSfvTF87+K1r0/PXl79z/hYBhU7lSFofaXiS9qUYJqCPL08/XP64eLT5YWnm+/u/dX9v/Th09eCUgEKjciStjzQ8SftSDBPQRxfXn6GXdD6+vBXLm+tHoze3okpAcWqVI2l9pOFJ2pdimIDuKwF9dPH87z6YTn96ffUr5bHp4U/rCShOq3IkrY80PEn7Ugwb0NUn6pvnkJbp3H80en9v80XQ51e0f/NS6yMNT5UjaX2k4Unal6cRB3T1+fqd6fS9W/O/XFk+J09AMYzKkbQ+0vAk7cvTaAN6Z/Uyps2XPZefz28F1LyQSf/ouvWRhqfKkbQ+0vAk7UsxZEDv7J378HBPz996yiNQAgqBypG0PtLwJO1LMWBAb07NK5WWDzoJKIZROZLWRxqepH0phgvov9h+rprJs/AYROVIWh9peJL2pRgqoI+vTV9df41z86r6VTM3r//kdaCQqhxJ6yMNT9K+FEMF9NrWWzWvrR5srkLKO5EwiMqRtD7S8CTtSzFQQG9uv9X9/t7yZUwPPii/tsjoq7wXHnKVI2l9pOFJ2pdimIBurl+38FrJ6eoCTNeXv/eAqzFhAJUjaX2k4Unal2KYgN6ZHgro/MHy4qDvrR9yPriy+OV3b9l/Rn/bWh9peKocSesjDU/SvhTDBLSG/ra1PtLwVDmS1kcanqR9KUzFCCiCqhxJ6yMNT9K+FKZiBBRBVY6k9ZGGJ2lfClMxAoqgKkfS+kjDk7QvhakYAUVQlSNpfaThSdqXwlSMgCKoypG0PtLwJO1LYSpGQBFU5UhaH2l4kvalMBUjoAiqciStjzQ8SftSmIoRUARVOZLWRxqepH0pTMUIKIKqHEnrIw1P0r4UpmIEFEFVjqT1kYYnaV8KUzECiqAqR9L6SMOTtC+FqRgBRVCVI2l9pOFJ2pfCVIyAIqjKkbQ+0vAk7UthKkZAEVTlSFofaXiS9qUwFSOgCKpyJK2PNDxJ+1KYihFQBFU5ktZHGp6kfSlMxQgogqocSesjDU/SvhSmYgQUQVWOpPWRhidpXwpTMQKKoCpH0vpIw5O0L4WpGAFFUJUjaX2k4Unal8JUjIAiqMqRtD7S8CTtS2EqRkARVOVIWh9peJL2pTAVI6AIqnIkrY80PEn7UpiKEVAEVTmS1kcanqR9KUzFCCiCqhxJ6yMNT9K+FKZiBBRBVY6k9ZGGJ2lfClMxAoqgKkfS+kjDk7QvhakYAUVQlSNpfaThSdqXwlSMgCKoypG0PtLwJO1LYSpGQBFU5UhaH2l4kvalMBUjoAiqciStjzQ8SftSmIoRUARVOZLWRxqepH0pTMUIKIKqHEnrIw1P0r4UpmIEFEFVjqT1kYYnaV8KUzECiqAqR9L6SMOTtC+FqRgBRVCVI2l9pOFJ2pfCVIyAIqjKkbQ+0vAk7UthKkZAEVTlSFofaXiS9qUwFSOgCKpyJK2PNDxJ+1KYihFQBFU5ktZHGp6kfSlMxQgogqocSesjDU/SvhSmYgQUQVWOpPWRhidpXwpTMQKKoCpH0vpIw5O0L4WpGAFFUJUjaX2k4Unal8JUjIAiqMqRtD7S8CTtS2EqRkARVOVIWh9peJL2pTAVI6AIqnIkrY80PEn7UpiKEVAEVTmS1kcanqR9KUzFCCiCqhxJ6yMNT9K+FKZiBBRBVY6k9ZGGJ2lfClMxAoqgKkfS+kjDk7QvhakYAUVQlSNpfaThSdqXwlSMgCKoypG0PtLwJO1LYSpGQBFU5UhaH2l4kvalMBUjoAiqciStjzQ8SftSmIoRUARVOZLWRxqepH0pTMUIKIKqHEnrIw1P0r4UpmIEFEFVjqT1kYYnaV8KUzECiqAqR9L6SMOTtC+FqRgBRVCVI2l9pOFJ2pfCVIyAIqjKkbQ+0vAk7UthKkZAEVTlSFofaXiS9qUwFSOgCKpyJK2PNDxJ+1KYihFQBFU5ktZHGp6kfSlMxQgogqocSesjDU/SvhSmYgQUQVWOpPWRhidpXwpTMQKKoCpH0vpIw5O0L4WpGAFFUJUjaX2k4Unal8JUjIAiqMqRtD7S8CTtS2EqRkARVOVIWh9peJL2pTAVI6AIqnIkrY80PEn7UpiKEVAEVTmS1kcanqR9KUzFCCiCqhxJ6yMNT9K+FKZiBBRBVY6k9ZGGJ2lfClMxAoqgKkfS+kjDk7QvhakYAUVQlSNpfaThSdqXwlSMgCKoypG0PtLwJO1LYSpGQBFU5UhaH2l4kvalMBVrGFC91kcanipH0vpIw5O0L0/DI1AEVTmS1kcanqR9KUzFCCiCqhxJ6yMNT9K+FKZiBBRBVY6k9ZGGJ2lfClMxAoqgKkfS+kjDk7QvhakYAUVQlSNpfaThSdqXwlSMgCKoypG0PtLwJO1LYSpGQBFU5UhaH2l4kvalMBUjoAiqciStjzQ8SftSmIoRUARVOZLWRxqepH0pTMUIKIKqHEnrIw1P0r4UpmIEFEFVjqT1kYYnaV8KUzECiqAqR9L6SMOTtC+FqRgBRVCVI2l9pOFJ2pfCVIyAIqjKkbQ+0vAk7UthKkZAEVTlSFofaXiS9qUwFSOgCKpyJK2PNDxJ+1KYihFQBFU5ktZHGp6kfSlMxQgogqocSesjDU/SvhSmYgQUQVWOpPWRhidpXwpTMQKKoCpH0vpIw5O0L4WpGAFFUJUjaX2k4Unal8JUjIAiqMqRtD7S8CTtS2EqRkARVOVIWh9peJL2pTAVI6AIqnIkrY80PEn7UpiKEVAEVTmS1kcanqR9KUzFCCiCqhxJ6yMNT9K+FKZiBBRBVY6k9ZGGJ2lfClMxAoqgKkfS+kjDk7QvhakYAUVQlSNpfaThSdqXwlSMgCKoypG0PtLwJO1LYSpGQBFU5UhaH2l4kvalMBUjoAiqciStjzQ8SftSmIoRUARVOZLWRxqepH0pTMUIKIKqHEnrIw1P0r4UpmIEFEFVjqT1kYYnaV8KUzECiqAqR9L6SMOTtC+FqRgBRVCVI2l9pOFJ2pfCVIyAIqjKkbQ+0vAk7UthKkZAEVTlSFofaXiS9qUwFSOgCKpyJK2PNDxJ+1KYihFQBFU5ktZHGp6kfSlMxQgogqocSesjDU/SvhSmYgQUQVWOpPWRhidpXwpTMQKKoCpH0vpIw5O0L4WpGAFFUJUjaX2k4Unal8JUjIAiqMqRtD7S8CTtS2EqRkARVOVIWh9peJL2pTAVI6AIqnIkrY80PEn7UpiKEVAEVTmS1kcanqR9KUzFCCiCqhxJ6yMNT9K+FKZiBBRBVY6k9ZGGJ2lfClMxAoqgKkfS+kjDk7QvhakYAUVQlSNpfaThSdqXwlSMgCKoypG0PtLwJO1LYSpGQBFU5UhaH2l4kvalMBUjoAiqciStjzQ8SftSmIoRUARVOZLWRxqepH0pTMUIKIKqHEnrIw1P0r4UpmIEFEFVjqT1kYYnaV8KUzECiqAqR9L6SMOTtC+FqRgBRVCVI2l9pOFJ2pfCVIyAIqjKkbQ+0vAk7UthKkZAEVTlSFofaXiS9qUwFSOgCKpyJK2PNDxJ+1KYihFQBFU5ktZHGp6kfSlMxQgogqocSesjDU/SvhSmYgQUQVWOpPWRhidpXwpTMQKKoCpH0vpIw5O0L4WpGAFFUJUjaX2k4Unal8JUjIAiqMqRtD7S8CTtS2EqRkARVOVIWh9peJL2pTAVI6AIqnIkrY80PEn7UpiKEVAEVTmS1kcanqR9KUzFCCiCqhxJ6yMNT9K+FKZiBBRBVY6k9ZGGJ2lfClMxAoqgKkfS+kjDk7QvhakYAUVQlSNpfaThSdqXwlSMgCKoypG0PtLwJO1LYSpGQBFU5UhaH2l4kvalMBUjoAiqciStjzQ8SftSmIp5BPTxlb3p9N3rBBRKlSNpfaThSdqXwj+gjy5Ol175goBCqHIkrY80PEn7UvgH9Nr0/PX5g8vT87cIKHQqR9L6SMOTtC+Fe0Dv75XHno8unvuEgEKnciStjzQ8SftSuAf05vS19Y/vE1DoVI6k9ZGGJ2lfCveAXpt+WH68sw4pAYVE5UhaH2l4kval8A7o48vrT93v722+CPr8iv7van2k4alyJK2PNDxJ+/I0qQIKAJ48A2peyKR/dP3dxD2JToxEpWFAzeuYWt8TWXBPohMjUSGg2XBPohMjUfEOqOez8N9N3JPoxEhU3AO6ef2nw+tAv5u4J9GJkai4B9TxnUjfTdyT6MRIVNwD+vjy9FWn98J/N3FPohMjUXEP6PyB29WYvpu4J9GJkaj4B3T+4Mqin+/esr/c+p7IgnsSnRiJSoOAHqH1PZEF9yQ6MRIVUzECGh73JDoxEhVTMQIaHvckOjESFVMxAhoe9yQ6MRIVUzECGh73JDoxEhVTMQIaHvckOjESFVMxAhoe9yQ6MRIVUzECGh73JDoxEhVTMQIaHvckOjESFVMxAhoe9yQ6MRIVUzECGh73JDoxEhVTMQIaHvckOjESFVMxAhoe9yQ6MRIVUzECGh73JDoxEhVTMQIaHvckOjESFVMxAhoe9yQ6MRIVUzECGh73JDoxEhVTMQIaHvckOjESFVMxAhoe9yQ6MRIVUzECGh73JDoxEhVTMQIaHvckOjESFVMxAhoe9yQ6MRIVUzECGh73JDoxEhVTMQIaHvckOjESFVMxAhoe9yQ6MRIVUzECGh73JDoxEhVTMQIaHvckOjESFVOxhgGFxvPPt/43wOgxkoEQ0PA4G+jESAZCQMPjbKATIxkIAQ2Ps4FOjGQgBDQ8zgY6MZKBENDwOBvoxEgGQkDD42ygEyMZCAEFgEoEFAAqEVAAqERAAaASAQWASgQUACoRUACoREABoBIBDeHRxen7+z995Yum/y4Yk8eXp+dv7f/0w7b/Mt9BBDSERUDPfbL5KQHFgft7m/+23tlPKdwQ0BAWAZ2+tvkpAcWWm9PVIB5d3Pw3Fn4IaAiLw/E368/PCCgO2Xx55+bmP7FwREBDWFTzf+xtHmisfnxwZTqdvnu96b8WxuBO+fLO/fU+FsPYm05/en31858tRvLv/7bhv1x2BDSEZTXXjzDWAb2zOCUL53ja4Dvv8eXlMq6tP0O5vzWM9c95aDocAhrCsprrJ1lXAV0cjXf/9/zxv0z5uhfu75375P7e6hmkxSf0792aP/7X5RdGF4v5D4tf/Lc9RjIYAhpCqebqk7RVQDdf8LrGowssVnD+v6wjuRnGzen7PK3kgICGsKpmqWX56f5L/njpCrZfpPH48rqZy0eki5W8+j9b/nt9BxDQEFYBLY8oyk/3H1vwnDzmy/+OrmewaObG4lduLn989b/yn9jhENAQNs8cLR5vrgO6PjAEFPPV483yk+Vj0YOAzv/8N+Wn75HQoRDQEDadvDZ9n0egeMJWQM2XPR//9+Urmd5/2j8EAQIawqaTi/Px3/gaKKz9gD7t/fCP/5WRDIaAhrD/QPPO9K/2eBYexn5AF8NY/Wz5X9bNa+sPfhdqBDSEg8/Ur62+uLV6HehfrvA6UMy3E/no4vT89fn8z3uLR6LLKzUtfv7gMv+VHQwBDeEgoIty8k4kGFuPMdfDmL43P3gn0qt8nXwoBDSEreeKNhff4b3w2Lf9SfrqvfD/ePDzv/qPfAI/GAIKAJUIKABUIqAAUImAAkAlAgoAlQgoAFQioABQiYACQCUCCgCVCCgAVCKgAFCJgAJAJQIKAJUIKABUIqAAUImAAkAlAgoAlQgoAFQioABQiYACQCUCCgCVCCgAVCKgAFCJgAJAJQIKAJUIKABUIqAAUImAAkAlAgoAlQgoAFQioABQiYACQCUCCgCVCCgAVCKgAFCJgAJAJQIKAJUIKABUIqAAUImAAkAlAgoAlQgoAFQioABQiYACQCUCCgCVCCgAVCKgAFCJgAJAJQIKAJUIKABUIqAAUOn/A71FEGOQyBlxAAAAAElFTkSuQmCC">
+            <a:extLst>
+              <a:ext uri="{FF2B5EF4-FFF2-40B4-BE49-F238E27FC236}">
+                <a16:creationId xmlns:a16="http://schemas.microsoft.com/office/drawing/2014/main" id="{8CC047BC-7FEC-4EB1-BCEA-02FB6A9AD576}"/>
+              </a:ext>
+            </a:extLst>
+          </p:cNvPr>
+          <p:cNvSpPr>
+            <a:spLocks noChangeAspect="1" noChangeArrowheads="1"/>
+          </p:cNvSpPr>
+          <p:nvPr/>
+        </p:nvSpPr>
+        <p:spPr bwMode="auto">
+          <a:xfrm>
+            <a:off x="5963478" y="3296478"/>
+            <a:ext cx="284922" cy="284922"/>
+          </a:xfrm>
+          <a:prstGeom prst="rect">
+            <a:avLst/>
+          </a:prstGeom>
+          <a:noFill/>
+          <a:extLst>
+            <a:ext uri="{909E8E84-426E-40DD-AFC4-6F175D3DCCD1}">
+              <a14:hiddenFill xmlns:a14="http://schemas.microsoft.com/office/drawing/2010/main">
+                <a:solidFill>
+                  <a:srgbClr val="FFFFFF"/>
+                </a:solidFill>
+              </a14:hiddenFill>
+            </a:ext>
+          </a:extLst>
+        </p:spPr>
+        <p:txBody>
+          <a:bodyPr vert="horz" wrap="square" lIns="91440" tIns="45720" rIns="91440" bIns="45720" numCol="1" anchor="t" anchorCtr="0" compatLnSpc="1">
+            <a:prstTxWarp prst="textNoShape">
+              <a:avLst/>
+            </a:prstTxWarp>
+          </a:bodyPr>
+          <a:lstStyle/>
+          <a:p>
+            <a:endParaRPr lang="en-US"/>
+          </a:p>
+        </p:txBody>
+      </p:sp>
+    </p:spTree>
+    <p:extLst>
+      <p:ext uri="{BB962C8B-B14F-4D97-AF65-F5344CB8AC3E}">
+        <p14:creationId xmlns:p14="http://schemas.microsoft.com/office/powerpoint/2010/main" val="288936918"/>
+      </p:ext>
+    </p:extLst>
+  </p:cSld>
+  <p:clrMapOvr>
+    <a:masterClrMapping/>
+  </p:clrMapOvr>
+</p:sld>
+</file>
+
+<file path=ppt/slides/slide8.xml><?xml version="1.0" encoding="utf-8"?>
 <p:sld xmlns:a="http://schemas.openxmlformats.org/drawingml/2006/main" xmlns:r="http://schemas.openxmlformats.org/officeDocument/2006/relationships" xmlns:p="http://schemas.openxmlformats.org/presentationml/2006/main">
   <p:cSld>
     <p:bg>
@@ -7771,13 +7905,13 @@
       </p:grpSpPr>
       <p:cxnSp>
         <p:nvCxnSpPr>
-          <p:cNvPr id="72" name="Straight Connector 71">
+          <p:cNvPr id="17" name="Straight Connector 16">
             <a:extLst>
               <a:ext uri="{FF2B5EF4-FFF2-40B4-BE49-F238E27FC236}">
-                <a16:creationId xmlns:a16="http://schemas.microsoft.com/office/drawing/2014/main" xmlns="" id="{DD6CFB6C-6ECB-4250-B68E-01966297A513}"/>
+                <a16:creationId xmlns:a16="http://schemas.microsoft.com/office/drawing/2014/main" id="{DD6CFB6C-6ECB-4250-B68E-01966297A513}"/>
               </a:ext>
               <a:ext uri="{C183D7F6-B498-43B3-948B-1728B52AA6E4}">
-                <adec:decorative xmlns:adec="http://schemas.microsoft.com/office/drawing/2017/decorative" xmlns="" val="1"/>
+                <adec:decorative xmlns:adec="http://schemas.microsoft.com/office/drawing/2017/decorative" val="1"/>
               </a:ext>
             </a:extLst>
           </p:cNvPr>
@@ -7823,13 +7957,13 @@
       </p:cxnSp>
       <p:cxnSp>
         <p:nvCxnSpPr>
-          <p:cNvPr id="74" name="Straight Connector 73">
+          <p:cNvPr id="19" name="Straight Connector 18">
             <a:extLst>
               <a:ext uri="{FF2B5EF4-FFF2-40B4-BE49-F238E27FC236}">
-                <a16:creationId xmlns:a16="http://schemas.microsoft.com/office/drawing/2014/main" xmlns="" id="{B8359141-C085-46E4-B4EC-42F9599BA7D2}"/>
+                <a16:creationId xmlns:a16="http://schemas.microsoft.com/office/drawing/2014/main" id="{B8359141-C085-46E4-B4EC-42F9599BA7D2}"/>
               </a:ext>
               <a:ext uri="{C183D7F6-B498-43B3-948B-1728B52AA6E4}">
-                <adec:decorative xmlns:adec="http://schemas.microsoft.com/office/drawing/2017/decorative" xmlns="" val="1"/>
+                <adec:decorative xmlns:adec="http://schemas.microsoft.com/office/drawing/2017/decorative" val="1"/>
               </a:ext>
             </a:extLst>
           </p:cNvPr>
@@ -7875,13 +8009,13 @@
       </p:cxnSp>
       <p:cxnSp>
         <p:nvCxnSpPr>
-          <p:cNvPr id="76" name="Straight Connector 75">
+          <p:cNvPr id="21" name="Straight Connector 20">
             <a:extLst>
               <a:ext uri="{FF2B5EF4-FFF2-40B4-BE49-F238E27FC236}">
-                <a16:creationId xmlns:a16="http://schemas.microsoft.com/office/drawing/2014/main" xmlns="" id="{FA903156-0F0C-44A5-9019-0CAF51EB494A}"/>
+                <a16:creationId xmlns:a16="http://schemas.microsoft.com/office/drawing/2014/main" id="{FA903156-0F0C-44A5-9019-0CAF51EB494A}"/>
               </a:ext>
               <a:ext uri="{C183D7F6-B498-43B3-948B-1728B52AA6E4}">
-                <adec:decorative xmlns:adec="http://schemas.microsoft.com/office/drawing/2017/decorative" xmlns="" val="1"/>
+                <adec:decorative xmlns:adec="http://schemas.microsoft.com/office/drawing/2017/decorative" val="1"/>
               </a:ext>
             </a:extLst>
           </p:cNvPr>
@@ -7927,13 +8061,13 @@
       </p:cxnSp>
       <p:cxnSp>
         <p:nvCxnSpPr>
-          <p:cNvPr id="78" name="Straight Connector 77">
+          <p:cNvPr id="23" name="Straight Connector 22">
             <a:extLst>
               <a:ext uri="{FF2B5EF4-FFF2-40B4-BE49-F238E27FC236}">
-                <a16:creationId xmlns:a16="http://schemas.microsoft.com/office/drawing/2014/main" xmlns="" id="{66E5E851-3725-463F-9451-2FFEF5D3E089}"/>
+                <a16:creationId xmlns:a16="http://schemas.microsoft.com/office/drawing/2014/main" id="{66E5E851-3725-463F-9451-2FFEF5D3E089}"/>
               </a:ext>
               <a:ext uri="{C183D7F6-B498-43B3-948B-1728B52AA6E4}">
-                <adec:decorative xmlns:adec="http://schemas.microsoft.com/office/drawing/2017/decorative" xmlns="" val="1"/>
+                <adec:decorative xmlns:adec="http://schemas.microsoft.com/office/drawing/2017/decorative" val="1"/>
               </a:ext>
             </a:extLst>
           </p:cNvPr>
@@ -7979,13 +8113,13 @@
       </p:cxnSp>
       <p:cxnSp>
         <p:nvCxnSpPr>
-          <p:cNvPr id="80" name="Straight Connector 79">
+          <p:cNvPr id="25" name="Straight Connector 24">
             <a:extLst>
               <a:ext uri="{FF2B5EF4-FFF2-40B4-BE49-F238E27FC236}">
-                <a16:creationId xmlns:a16="http://schemas.microsoft.com/office/drawing/2014/main" xmlns="" id="{94209D59-6810-40C2-B8D6-6DACF8A06143}"/>
+                <a16:creationId xmlns:a16="http://schemas.microsoft.com/office/drawing/2014/main" id="{94209D59-6810-40C2-B8D6-6DACF8A06143}"/>
               </a:ext>
               <a:ext uri="{C183D7F6-B498-43B3-948B-1728B52AA6E4}">
-                <adec:decorative xmlns:adec="http://schemas.microsoft.com/office/drawing/2017/decorative" xmlns="" val="1"/>
+                <adec:decorative xmlns:adec="http://schemas.microsoft.com/office/drawing/2017/decorative" val="1"/>
               </a:ext>
             </a:extLst>
           </p:cNvPr>
@@ -8031,13 +8165,13 @@
       </p:cxnSp>
       <p:sp useBgFill="1">
         <p:nvSpPr>
-          <p:cNvPr id="82" name="Rectangle 81">
+          <p:cNvPr id="27" name="Rectangle 26">
             <a:extLst>
               <a:ext uri="{FF2B5EF4-FFF2-40B4-BE49-F238E27FC236}">
-                <a16:creationId xmlns:a16="http://schemas.microsoft.com/office/drawing/2014/main" xmlns="" id="{0BE1027C-ABCB-4C82-91A2-F67B9A5A65A6}"/>
+                <a16:creationId xmlns:a16="http://schemas.microsoft.com/office/drawing/2014/main" id="{0BE1027C-ABCB-4C82-91A2-F67B9A5A65A6}"/>
               </a:ext>
               <a:ext uri="{C183D7F6-B498-43B3-948B-1728B52AA6E4}">
-                <adec:decorative xmlns:adec="http://schemas.microsoft.com/office/drawing/2017/decorative" xmlns="" val="1"/>
+                <adec:decorative xmlns:adec="http://schemas.microsoft.com/office/drawing/2017/decorative" val="1"/>
               </a:ext>
             </a:extLst>
           </p:cNvPr>
@@ -8107,18 +8241,13 @@
         </p:spPr>
         <p:txBody>
           <a:bodyPr vert="horz" lIns="91440" tIns="45720" rIns="91440" bIns="45720" rtlCol="0" anchor="b">
-            <a:normAutofit/>
+            <a:normAutofit fontScale="90000"/>
           </a:bodyPr>
           <a:lstStyle/>
           <a:p>
-            <a:pPr>
-              <a:lnSpc>
-                <a:spcPct val="90000"/>
-              </a:lnSpc>
-            </a:pPr>
-            <a:r>
-              <a:rPr lang="en-US" sz="4100" dirty="0"/>
-              <a:t>Third and Fourth Factors attributing to Attrition</a:t>
+            <a:r>
+              <a:rPr lang="en-US" sz="4800" dirty="0"/>
+              <a:t>Top Two Factors Attributed to Company’s Attrition</a:t>
             </a:r>
           </a:p>
         </p:txBody>
@@ -8151,13 +8280,13 @@
       </p:sp>
       <p:grpSp>
         <p:nvGrpSpPr>
-          <p:cNvPr id="84" name="Group 83">
+          <p:cNvPr id="29" name="Group 28">
             <a:extLst>
               <a:ext uri="{FF2B5EF4-FFF2-40B4-BE49-F238E27FC236}">
-                <a16:creationId xmlns:a16="http://schemas.microsoft.com/office/drawing/2014/main" xmlns="" id="{0CC57C46-4659-4AF2-9180-2DEED214CDD7}"/>
+                <a16:creationId xmlns:a16="http://schemas.microsoft.com/office/drawing/2014/main" id="{0CC57C46-4659-4AF2-9180-2DEED214CDD7}"/>
               </a:ext>
               <a:ext uri="{C183D7F6-B498-43B3-948B-1728B52AA6E4}">
-                <adec:decorative xmlns:adec="http://schemas.microsoft.com/office/drawing/2017/decorative" xmlns="" val="1"/>
+                <adec:decorative xmlns:adec="http://schemas.microsoft.com/office/drawing/2017/decorative" val="1"/>
               </a:ext>
             </a:extLst>
           </p:cNvPr>
@@ -8182,13 +8311,13 @@
         </p:grpSpPr>
         <p:cxnSp>
           <p:nvCxnSpPr>
-            <p:cNvPr id="85" name="Straight Connector 84">
+            <p:cNvPr id="30" name="Straight Connector 29">
               <a:extLst>
                 <a:ext uri="{FF2B5EF4-FFF2-40B4-BE49-F238E27FC236}">
-                  <a16:creationId xmlns:a16="http://schemas.microsoft.com/office/drawing/2014/main" xmlns="" id="{CFB52317-0F00-40C0-B1F2-33ED6D30D97A}"/>
+                  <a16:creationId xmlns:a16="http://schemas.microsoft.com/office/drawing/2014/main" id="{CFB52317-0F00-40C0-B1F2-33ED6D30D97A}"/>
                 </a:ext>
                 <a:ext uri="{C183D7F6-B498-43B3-948B-1728B52AA6E4}">
-                  <adec:decorative xmlns:adec="http://schemas.microsoft.com/office/drawing/2017/decorative" xmlns="" val="1"/>
+                  <adec:decorative xmlns:adec="http://schemas.microsoft.com/office/drawing/2017/decorative" val="1"/>
                 </a:ext>
               </a:extLst>
             </p:cNvPr>
@@ -8232,13 +8361,13 @@
         </p:cxnSp>
         <p:cxnSp>
           <p:nvCxnSpPr>
-            <p:cNvPr id="86" name="Straight Connector 85">
+            <p:cNvPr id="31" name="Straight Connector 30">
               <a:extLst>
                 <a:ext uri="{FF2B5EF4-FFF2-40B4-BE49-F238E27FC236}">
-                  <a16:creationId xmlns:a16="http://schemas.microsoft.com/office/drawing/2014/main" xmlns="" id="{2468ACF9-4EF2-4251-9FAD-3F225BF7417D}"/>
+                  <a16:creationId xmlns:a16="http://schemas.microsoft.com/office/drawing/2014/main" id="{2468ACF9-4EF2-4251-9FAD-3F225BF7417D}"/>
                 </a:ext>
                 <a:ext uri="{C183D7F6-B498-43B3-948B-1728B52AA6E4}">
-                  <adec:decorative xmlns:adec="http://schemas.microsoft.com/office/drawing/2017/decorative" xmlns="" val="1"/>
+                  <adec:decorative xmlns:adec="http://schemas.microsoft.com/office/drawing/2017/decorative" val="1"/>
                 </a:ext>
               </a:extLst>
             </p:cNvPr>
@@ -8282,13 +8411,13 @@
         </p:cxnSp>
         <p:cxnSp>
           <p:nvCxnSpPr>
-            <p:cNvPr id="87" name="Straight Connector 86">
+            <p:cNvPr id="32" name="Straight Connector 31">
               <a:extLst>
                 <a:ext uri="{FF2B5EF4-FFF2-40B4-BE49-F238E27FC236}">
-                  <a16:creationId xmlns:a16="http://schemas.microsoft.com/office/drawing/2014/main" xmlns="" id="{CE4A3ECD-6924-4912-B117-3C617B584BCF}"/>
+                  <a16:creationId xmlns:a16="http://schemas.microsoft.com/office/drawing/2014/main" id="{CE4A3ECD-6924-4912-B117-3C617B584BCF}"/>
                 </a:ext>
                 <a:ext uri="{C183D7F6-B498-43B3-948B-1728B52AA6E4}">
-                  <adec:decorative xmlns:adec="http://schemas.microsoft.com/office/drawing/2017/decorative" xmlns="" val="1"/>
+                  <adec:decorative xmlns:adec="http://schemas.microsoft.com/office/drawing/2017/decorative" val="1"/>
                 </a:ext>
               </a:extLst>
             </p:cNvPr>
@@ -8332,13 +8461,13 @@
         </p:cxnSp>
         <p:cxnSp>
           <p:nvCxnSpPr>
-            <p:cNvPr id="88" name="Straight Connector 87">
+            <p:cNvPr id="33" name="Straight Connector 32">
               <a:extLst>
                 <a:ext uri="{FF2B5EF4-FFF2-40B4-BE49-F238E27FC236}">
-                  <a16:creationId xmlns:a16="http://schemas.microsoft.com/office/drawing/2014/main" xmlns="" id="{D1DFE1F5-FA7A-403F-B9D9-0434E2BE2F5B}"/>
+                  <a16:creationId xmlns:a16="http://schemas.microsoft.com/office/drawing/2014/main" id="{D1DFE1F5-FA7A-403F-B9D9-0434E2BE2F5B}"/>
                 </a:ext>
                 <a:ext uri="{C183D7F6-B498-43B3-948B-1728B52AA6E4}">
-                  <adec:decorative xmlns:adec="http://schemas.microsoft.com/office/drawing/2017/decorative" xmlns="" val="1"/>
+                  <adec:decorative xmlns:adec="http://schemas.microsoft.com/office/drawing/2017/decorative" val="1"/>
                 </a:ext>
               </a:extLst>
             </p:cNvPr>
@@ -8382,13 +8511,13 @@
         </p:cxnSp>
         <p:cxnSp>
           <p:nvCxnSpPr>
-            <p:cNvPr id="89" name="Straight Connector 88">
+            <p:cNvPr id="34" name="Straight Connector 33">
               <a:extLst>
                 <a:ext uri="{FF2B5EF4-FFF2-40B4-BE49-F238E27FC236}">
-                  <a16:creationId xmlns:a16="http://schemas.microsoft.com/office/drawing/2014/main" xmlns="" id="{92CF27E4-09D0-444E-B18D-F90487103863}"/>
+                  <a16:creationId xmlns:a16="http://schemas.microsoft.com/office/drawing/2014/main" id="{92CF27E4-09D0-444E-B18D-F90487103863}"/>
                 </a:ext>
                 <a:ext uri="{C183D7F6-B498-43B3-948B-1728B52AA6E4}">
-                  <adec:decorative xmlns:adec="http://schemas.microsoft.com/office/drawing/2017/decorative" xmlns="" val="1"/>
+                  <adec:decorative xmlns:adec="http://schemas.microsoft.com/office/drawing/2017/decorative" val="1"/>
                 </a:ext>
               </a:extLst>
             </p:cNvPr>
@@ -8433,13 +8562,13 @@
       </p:grpSp>
       <p:sp>
         <p:nvSpPr>
-          <p:cNvPr id="91" name="Snip Diagonal Corner Rectangle 12">
+          <p:cNvPr id="36" name="Snip Diagonal Corner Rectangle 12">
             <a:extLst>
               <a:ext uri="{FF2B5EF4-FFF2-40B4-BE49-F238E27FC236}">
-                <a16:creationId xmlns:a16="http://schemas.microsoft.com/office/drawing/2014/main" xmlns="" id="{FDAF26D5-7469-49F5-902D-571FA58A7EEE}"/>
+                <a16:creationId xmlns:a16="http://schemas.microsoft.com/office/drawing/2014/main" id="{FDAF26D5-7469-49F5-902D-571FA58A7EEE}"/>
               </a:ext>
               <a:ext uri="{C183D7F6-B498-43B3-948B-1728B52AA6E4}">
-                <adec:decorative xmlns:adec="http://schemas.microsoft.com/office/drawing/2017/decorative" xmlns="" val="1"/>
+                <adec:decorative xmlns:adec="http://schemas.microsoft.com/office/drawing/2017/decorative" val="1"/>
               </a:ext>
             </a:extLst>
           </p:cNvPr>
@@ -8510,10 +8639,10 @@
       </p:sp>
       <p:pic>
         <p:nvPicPr>
-          <p:cNvPr id="5" name="Picture 4">
+          <p:cNvPr id="10" name="Picture 9">
             <a:extLst>
               <a:ext uri="{FF2B5EF4-FFF2-40B4-BE49-F238E27FC236}">
-                <a16:creationId xmlns:a16="http://schemas.microsoft.com/office/drawing/2014/main" xmlns="" id="{FD53BF36-7A56-44EE-9194-375264E4AA93}"/>
+                <a16:creationId xmlns:a16="http://schemas.microsoft.com/office/drawing/2014/main" id="{2A55B94B-DEEC-41BF-99AF-9CC2C5283D30}"/>
               </a:ext>
             </a:extLst>
           </p:cNvPr>
@@ -8522,15 +8651,16 @@
           </p:cNvPicPr>
           <p:nvPr/>
         </p:nvPicPr>
-        <p:blipFill rotWithShape="1">
+        <p:blipFill>
           <a:blip r:embed="rId2"/>
-          <a:srcRect t="7090" r="1" b="1818"/>
-          <a:stretch/>
+          <a:stretch>
+            <a:fillRect/>
+          </a:stretch>
         </p:blipFill>
         <p:spPr>
           <a:xfrm>
-            <a:off x="1161535" y="1295490"/>
-            <a:ext cx="4201297" cy="2468891"/>
+            <a:off x="5604692" y="946911"/>
+            <a:ext cx="4201297" cy="3000926"/>
           </a:xfrm>
           <a:prstGeom prst="rect">
             <a:avLst/>
@@ -8539,10 +8669,10 @@
       </p:pic>
       <p:pic>
         <p:nvPicPr>
-          <p:cNvPr id="6" name="Picture 5">
+          <p:cNvPr id="12" name="Picture 11">
             <a:extLst>
               <a:ext uri="{FF2B5EF4-FFF2-40B4-BE49-F238E27FC236}">
-                <a16:creationId xmlns:a16="http://schemas.microsoft.com/office/drawing/2014/main" xmlns="" id="{6DA0AA6D-86CD-46D0-86C0-5450BFC0E85E}"/>
+                <a16:creationId xmlns:a16="http://schemas.microsoft.com/office/drawing/2014/main" id="{E2B66158-1DF2-447F-A805-9EFB84231251}"/>
               </a:ext>
             </a:extLst>
           </p:cNvPr>
@@ -8559,104 +8689,153 @@
         </p:blipFill>
         <p:spPr>
           <a:xfrm>
-            <a:off x="5640953" y="1033587"/>
-            <a:ext cx="4157293" cy="2972463"/>
+            <a:off x="989231" y="974025"/>
+            <a:ext cx="4157293" cy="2969494"/>
           </a:xfrm>
           <a:prstGeom prst="rect">
             <a:avLst/>
           </a:prstGeom>
         </p:spPr>
       </p:pic>
+      <p:sp>
+        <p:nvSpPr>
+          <p:cNvPr id="4" name="AutoShape 2" descr="data:image/png;base64,iVBORw0KGgoAAAANSUhEUgAABUAAAAPACAMAAADDuCPrAAABYlBMVEUAAAAAADoAAGYAOjoAOmYAOpAAZrYzMzM6AAA6OgA6Ojo6OmY6ZmY6ZpA6ZrY6kLY6kNtNTU1NTW5NTY5Nbm5Nbo5NbqtNjshmAABmADpmOgBmOjpmZjpmZmZmZpBmkGZmkLZmkNtmtttmtv9uTU1ubk1ubm5ubo5ujqtujshuq8huq+SOTU2Obk2Obm6Oq8iOyOSOyP+QOgCQOjqQZjqQZmaQZpCQkGaQkLaQtraQttuQ2/+rbk2rjk2rjm6rq8iryOSr5Mir5P+2ZgC2Zjq2kDq2kGa2kJC2tpC2tra2ttu229u22/+2///Ijk3Ijm7Iq27Iq6vIyKvI5KvI5OTI5P/I///bkDrbkGbbtmbbtpDbtrbb27bb29vb2//b/7bb///kq27kyI7kyKvk5P/k///r6+v8jVn/tmb/yI7/25D/27b/29v/5Kv/5Mj/5OT//7b//7///8j//9v//+T///+zjZs9AAAACXBIWXMAAB2HAAAdhwGP5fFlAAAgAElEQVR4nO3d/59b5ZnecU0wMDGEILMYh0CWwmwDxaSLN3S7xHW3mGQXkni3aY0TEijO1q2/YMe1rP+/0iNpRnPbM+fMM9e5n3PffN4/xB472Eiv6/mgGUlnJnMAQJVJ638BAIiKgAJAJQIKAJUIKABUIqAAUImAAkAlAgoAlQgoAFQioABQiYACQCUCCgCVCCgAVCKgAFCJgAJAJQIKAJVGENDZl298fzKZ7Lzw8Ten/rNuT570zvzhhcnOLwT/pgCwrXlAZ7/aPWjdS6dNKAEF4Kd1QO+9fih2p+0cAQXgp3FA7y4ffu689dXip9/+6vuCgh78ud/7reRPAoCjtA3o4qHh1ufts1/KCkpAAQyvbUCvLor59tbHy8/An1P8wQQUwPCaBnT5CfzLh37lRvmapeRPJqAABtY0oItcmswtP6d/rvzGwQPRq5vK3vv5Irg7P/jNwT/9zuzT3cnOC09+1n84oJsnka4ufyh/ygsfL3/9yx8vev3Cr/f/f+YvAIBjtQzo7NKTn7Cvmroo3n7/NvWbfWpe7LQM6NUjnro/OqA31n/Iywd/4PpB8BN/AQAcq2VAlw837efrt1c9vHrwO4tfefabVW03VtVdpPBs+fDZJ3t3ZED/fv8Pefvq4ddOPfkXAMCxWgZ0UbknHjyuo3r7IGLrli4fOb709Xz+7aebx4zlseQPv5l/+/VT/+inBnRh+Rn6l4tP1Z+Z7Lz9zeqZ/+fmT/0LAOBYLQN6+ymffS8D+vJ866Xv68/mtx6t3l5/5fTGMaE7OqAvb/6MzV9wdfUQ9il/AQAca6QBXdZxlbr180nbTysdPCY98kWjRwZ0/aubv2a+/yWCp/wFAHCssQZ0UcDypc3lVyaXMdtu2u39xj7lq58rRwb0uYO/5p1D/9en/AUAcKyRfg10Gc7ye+uQbj/Ds3mW58YxT/YcGdCXD//K/v/1aX8BABxrbM/C70f19qFP5W3f7Cfd1qkDeuRjWwDYGOfrQOclcYuIbR6IElAA4zPOdyItlbcNbV7OtPlSqPmntQHliSMAJ9I0oFu5XNt6L3z5HH7/qZ2rTz6vIw3o0/4CADhW26sx2Zdy3t765HnxmPDZ/7X/ls7tp9xv7H95VBjQp/wFAHCstgEtX3k8eOf5jcn2C5tulDderku2deGmzfNM2oA+5S8AgGM1viL9veUVlQ9dkf7gC5Grq9VvSrZ8F9GZX6+/h9LmvZfCgD7lLwCAY435eyJd3X42fPtp8lUbxQF98i8AgGO1Duih78q5c/g6crcn28+Mz36++b+dWV2wUxzQJ/8CADhW84AufPnz5Sfvz7xovy/89lVBl/60vN7x+lrIc31An/gLAOBYYwgoAIREQAGgEgEFgEoEFAAqEVAAqERAAaASAQWASgQUACoRUACoREABoBIBBYBKBBQAKhFQAKhEQAGgEgEFgEoEFAAqEVAAqNQwoP8HEtyT6MRIVEzFCGh43JPoxEhUTMUIaHjck+jESFRMxQhoeNyT6MRIVEzFCGh43JPoxEhUTMUIaHjck+jESFRMxQhoeNyT6MRIVEzFCGh43JPoxEhUTMUIaHjck+jESFRMxQhoeNyT6MRIVEzFCGh43JPoxEhUTMUIaHjck+jESFRMxQhoeNyT6MRIVEzFCGh43JPoxEhUTMUIaHjck+jESFRMxQhoeNyT6MRIVEzFCGh43JPoxEhUTMUIaHjck+jESFRMxQhoeNyT6MRIVEzFCGh43JPoxEhUTMUIaHjck+jESFRMxQhoeNyT6MRIVEzFCGh43JPoxEhUTMUIaHjck+jESFRMxQhoeNyT6MRIVEzFCGh43JPoxEhUTMUIaHjck+jESFRMxQhoeNyT6MRIVEzFCGh43JPoxEhUTMUIaHjck+jESFRMxQhoeNyT6MRIVEzFCGh43JPoxEhUTMUIaHjck+jESFRMxQhoeNyT6MRIVEzFCGh43JPoxEhUTMUIaHjck+jESFRMxQhoeNyT6MRIVEzFUgX0/+I7RL+fxAioiqkYAUVQ+v0kRkBVTMUIKILS7ycxAqpiKkZAEZR+P4kRUBVTMQKKoPT7SYyAqpiKEVAEpd9PYgRUxVSMgCIo/X4SI6AqpmIEFEHp95MYAVUxFSOgCEq/n8QIqIqpGAFFUPr9JEZAVUzFCCiC0u8nMQKqYipGQBGUfj+JEVAVUzECiqD0+0mMgKqYihFQBKXfT2IEVMVUjIAiKP1+EiOgKqZiBBRB6feTGAFVMRUjoAhKv5/ECKiKqRgBRVD6/SRGQFVMxQgogtLvJzECqmIqRkARlH4/iRFQFVMxAoqg9PtJjICqmIoRUASl309iBFTFVIyAIij9fhIjoCqmYgQUQen3kxgBVTEVI6AISr+fxAioiqkYAUVQ+v0kRkBVTMUIKILS7ycxAqpiKkZAEZR+P4kRUBVTMQKKoPT7SYyAqpiKEVAEpd9PYgRUxVSMgCIo/X4SI6AqpmKnDeiji6+tf/b4yt50+u71rg8IKDT0+0mMgKqIA3pt+tqmpNOlV744/gMCChH9fhIjoCrSgD6+Nt0E9Nr0/PX5g8vT87eO/YCAQkS/n8QIqIoyoP/2wXQT0Pt75RHmo4vnPjnuAwIKFf1+EiOgKsKA3pxO3/vzOqA39398/7gPCChU9PtJjICqKAP66j/O76zzeG36YfmxfHz0BwQUKvr9JEZAVYQB3cri48vrT9Dv752/dfQHq3/m+ZVT/s1P0fpIw5N+P8BJEVAEpd8PcFL6gL7yxdEfHPpH9Y+uWx9peNLvJzE+hVcZPKDdj0AJKAT0+0mMgKoQUOSg309iBFRlmIDyLDy86feTGAFVGSigm1d5rl/6edQHBBQq+v0kRkBVBgoo70SCM/1+EiOgKgMF9PHl6av773g/+gMCChX9fhIjoCoDBXT+YPuaS0d/QEAhot9PYgRUZaiAzh9cWVTy3VtdHxBQaOj3kxgBVREH9BT0t631kYYn/X4SI6AqpmIEFEHp95MYAVUxFSOgCEq/n8QIqIqpGAFFUPr9JEZAVUzFCCiC0u8nMQKqYipGQBGUfj+JEVAVUzECiqD0+0mMgKqYihFQBKXfT2IEVMVUjIAiKP1+EiOgKqZiBBRB6feTGAFVMRUjoAhKv5/ECKiKqRgBRVD6/SRGQFVMxQgogtLvJzECqmIqRkARlH4/iRFQFVMxAoqg9PtJjICqmIoRUASl309iBFTFVIyAIij9fhIjoCqmYgQUQen3kxgBVTEVI6AISr+fxAioiqkYAUVQ+v0kRkBVTMUIKILS7ycxAqpiKkZAEZR+P4kRUBVTMQKKoPT7SYyAqpiKEVAEpd9PYgRUxVSMgCIo/X4SI6AqpmIEFEHp95MYAVUxFSOgCEq/n8QIqIqpGAFFUPr9JEZAVUzFCCiC0u8nMQKqYipGQBGUfj+JEVAVUzECiqD0+0mMgKqYihFQBKXfT2IEVMVUjIAiKP1+EiOgKqZiBBRB6feTGAFVMRUjoAhKv5/ECKiKqRgBRVD6/SRGQFVMxQgogtLvJzECqmIqRkARlH4/iRFQFVMxAoqg9PtJjICqmIoRUASl309iBFTFVIyAIij9fhIjoCqmYgQUQen3kxgBVTEVI6AISr+fxAioiqkYAUVQ+v0kRkBVTMUIKILS7ycxAqpiKkZAEZR+P4kRUBVTMQKKoPT7SYyAqpiKEVAEpd9PYgRUxVSMgCIo/X4SI6AqpmIEFEHp95MYAVUxFSOgCEq/n8QIqIqpGAFFUPr9JEZAVUzFCCiC0u8nMQKqYipGQBGUfj+JEVAVUzECiqD0+0mMgKqYihFQBKXfT2IEVMVUjIAiKP1+EiOgKqZiBBRB6feTGAFVMRUjoAhKv5/ECKiKqRgBRVD6/SRGQFVMxQgogtLvJzECqmIqRkARlH4/iRFQFVMxAoqg9PtJjICqmIoRUASl309iBFTFVIyAIij9fhIjoCqmYgQUQen3kxgBVTEVI6AISr+fxAioiqkYAUVQ+v0kRkBVTMUIKILS7ycxAqpiKkZAEZR+P4kRUBVTMQKKoPT7SYyAqpiKEVAEpd9PYgRUxVSMgCIo/X4SI6AqpmIEFEHp95MYAVUxFSOgCEq/n8QIqIqpGAFFUPr9JEZAVUzFCCiC0u8nMQKqYipGQBGUfj+JEVAVU7GGAdVrfaThqfXaAB6BIiz9fhLjEaiKqRgBRVD6/SRGQFVMxQgogtLvJzECqmIqRkARlH4/iRFQFVMxAoqg9PtJjICqmIoRUASl309iBFTFVIyAIij9fhIjoCqmYgQUQen3kxgBVTEVI6AISr+fxAioiqkYAUVQ+v0kRkBVTMUIKILS7ycxAqpiKkZAEZR+P4kRUBVTMQKKoPT7SYyAqpiKEVAEpd9PYgRUxVSMgCIo/X4SI6AqpmIEFEHp95MYAVUxFSOgCEq/n8QIqIqpGAFFUPr9JEZAVUzFCCiC0u8nMQKqYipGQBGUfj+JEVAVUzECiqD0+0mMgKqYihFQBKXfT2IEVMVUjIAiKP1+EiOgKqZiBBRB6feTGAFVMRUjoAhKv5/ECKiKqRgBRVD6/SRGQFVMxQgogtLvJzECqmIqRkARlH4/iRFQFVMxAoqg9PtJjICqmIoRUASl309iBFTFVIyAIij9fhIjoCqmYgQUQen3kxgBVTEVI6AISr+fxAioiqkYAUVQ+v0kRkBVTMUIKILS7ycxAqpiKkZAEZR+P4kRUBVTMQKKoPT7SYyAqpiKEVAEpd9PYgRUxVSMgCIo/X4SI6AqpmIEFEHp95MYAVUxFSOgCEq/n8QIqIqpGAFFUPr9JEZAVUzFCCiC0u8nMQKqYipGQBGUfj+JEVAVUzECiqD0+0mMgKqYihFQBKXfT2IEVMVUjIAiKP1+EiOgKqZiBBRB6feTGAFVMRUjoAhKv5/ECKiKqRgBRVD6/SRGQFVMxQgogtLvJzECqmIqRkARlH4/iRFQFVMxAoqg9PtJjICqmIoRUASl309iBFTFVIyAIij9fhIjoCqmYgQUQen3kxgBVTEVI6AISr+fxAioiqkYAUVQ+v0kRkBVTMUIKILS7ycxAqpiKkZAEZR+P4kRUBVTMQKKoPT7SYyAqpiKEVAEpd9PYgRUxVSMgCIo/X4SI6AqpmIEFEHp95MYAVUxFSOgCEq/n8QIqIqpGAFFUPr9JEZAVUzFCCiC0u8nMQKqYipGQBGUfj+JEVAVUzECiqD0+0mMgKqYihFQBKXfT2IEVMVUjIAiKP1+EiOgKqZiBBRB6feTGAFVMRUjoAhKv5/ECKiKqRgBRVD6/SRGQFVMxQgogtLvJzECqmIqRkARlH4/iRFQFVMxAoqg9PtJjICqmIoRUASl309iBFTFVIyAIij9fhIjoCqmYgQUQen3kxgBVTEVI6AISr+fxAioiqmYKKCPL083XvliPn908eDni9+8sjedvnudgEJJv5/ECKiKS0Dv720FdF3TVUwJKET0+0mMgKoME9CN+3vnPln8cGf62sGvXZuevz5/cHl6/hYBhY5+P4kRUJVBA7p4IPr+qpnvbzV1/Ti0pJWAQkS/n8QIqMqgAb25epj5+PJWLG+uH43e3IoqAcWp6feTGAFVGTKgjy5OP1z9eP53H0ynP72+/ODa6tcOf1pPQHFa+v0kRkBVhgzo5sHm5jmkZTr3H43e39t8EfT5FeXfvNL6SMOTfj/ASSkDuv9lzjvT6Xu35n+5Ml18TEAxDP1+gJNSBvTO5on2zSPR5XNJWwE1L2TSP7pufaThSb+fxPgUXmW4gD6+vP5q56GiPuURKAGFgH4/iRFQleEC+sRDzPIrBBTD0O8nMQKqMlxAn3iafdVMnoXHIPT7SYyAqgwX0P1Xz+9/Ll+auXn9J68DhZR+P4kRUJXBArr16vlrqwebq5DyTiQMQr+fxAioymABfXRx/0ug9/eWL2N68EF5Vn6R0Vd5Lzzk9PtJjICqDBbQ7SeJbq4vxnR9+cEDrsaEAej3kxgBVRksoHe2H2I++Nl0eu699ccPriz6+e4t+w/ob1vrIw1P+v0kRkBVBgvoielvW+sjDU/6/SRGQFVMxQgogtLvJzECqmIqRkARlH4/iRFQFVMxAoqg9PtJjICqmIoRUASl309iBFTFVKwjoLM/fvY5AcUY6feTGAFV6RvQe//pm/n84euTyeTMLwgoxke/n8QIqErPgN6YfO+38/nVydLyZwQUI6PfT2IEVKVfQG+XbN7dnTz7zb0Lk5cJKEZHv5/ECKhKv4BeXZRzmdGdXyz/d/lzAopx0e8nMQKq0iugs0vLcq4z+vDCMJ/D629b6yMNT/r9JEZAVXoFdNXMhxcmz80JKMZJv5/ECKjKCQJ6d3fyDgHFSOn3kxgBVekV0NWn8DfKl0D5GihGSb+fxAioSq+Azq9Onls+/b4sJ8/CY5T0+0mMgKr0C+jt8gLQxWfws59PVo9DCSjGRb+fxAioSr+ALj59X3iuPJG0884g/SSgOBX9fhIjoCo9Azq/99FPPl788PBHP/jNMP0koDgV/X4SI6AqfQM6PP1ta32k4Um/n8QIqIqp2LEBnX09YD8JKE5Fv5/ECKiKqdjRAf3yx8v3wz/80VuDvIaJgOKU9PtJjICq9Azo7NPVdZgeXpicGeZiTAQUp6LfT2IEVKVnQK9OJmf+evd7v5393WSg19ETUJyKfj+JEVCVfgG9PZm8vX4P5x9Wb+gkoBgX/X4SI6Aq/QJ6dfnuo/Wb4G+US4oQUIyLfj+JEVCVXgFdvRd+HdC7u1xMBOOj309iBFSlV0A3l7Mr5eRqTBgj/X4SI6AqBBQ56PeTGAFV6RXQ2aXlE0frcnI5O4yRfj+JEVCVXgFdPXG0CugipjyJhPHR7ycxAqrSL6B3dycvfVMCeu91LmeHMdLvJzECqtIvoOVydmd3d178/uLHYa6nTEBxKvr9JEZAVXoGdP773cnaQP0koDgV/X4SI6AqfQM6//ZXZxf1fGawy4ESUJyKfj+JEVCV3gEdnP62tT7S8KTfT2IEVMVUjOuBIij9fhIjoCqmYlwPFEHp95MYAVXpGVCuB4qR0+8nMQKq0jOgXA8UI6ffT2IEVKVfQLkeKMZOv5/ECKhKv4ByPVCMnX4/iRFQlV4B5XqgGD39fhIjoCq9Asrl7DB6+v0kRkBVCChy0O8nMQKq0iugXA8Uo6ffT2IEVKVXQLkeKEZPv5/ECKhKv4ByPVCMnX4/iRFQlX4B5XqgGDv9fhIjoCo9A8r1QDFy+v0kRkBV+gaU64Fi3PT7SYyAqvQO6OD0t631kYYn/X4SI6AqpmIEFEHp95MYAVUxFTvihfQ/emnQaykTUJyafj+JEVCVfgG9MJk8M9iVlAkoBPT7SYyAqvQK6OpyypMzHw/ZUP1ta32k4Um/n8QIqEqvgC786celoS98TEAxSvr9JEZAVfoGdL76rkgLQ72QSX/bWh9peNLvJzECqnKCgC4+lf/y9WVCd94a4ikl/W1rfaThSb+fxAioyokCuvDtz8tbkl7QPwzV37bWRxqe9PtJjICqnCigs199f/OGzslLBBRjot9PYgRUpX9AN/VcPhf/7af698Trb1vrIw1P+v0kRkBVegZ0/dXPg1eD6i+rrL9trY80POn3kxgBVekV0NmliX3ySP+NPfS3rfWRhif9fhIjoCq9Arp8J9LO4ZcvPbzAI1CMiX4/iRFQlZ4B/cGvzS/NPle/lEl/21ofaXjS7ycxAqrSK6Au9Let9ZGGJ/1+EiOgKqZiBBRB6feTGAFVMRXruCL9ztlB3oREQHFq+v0kRkBV+gb0xv4r6PmeSBgj/X4SI6AqPQO67OczL775Bt+VEyOl309iBFSlX0Dv7k6eXb2K6d4lvi88xki/n8QIqEq/gF49eN/R7NLkOQKK0dHvJzECqtIroLNLW4867+6qX0JPQHF6+v0kRkBVegX00Ps29W/iJKA4Pf1+EiOgKgQUOej3kxgBVekV0NmlyTv7H+ivw0RAcXr6/SRGQFV6BZQnkTB6+v0kRkBV+gX07u7kzOpyIn96nZcxYYz0+0mMgKr0C+jqjUhnz54d8q1Icq2PNDy1XhtwzFs5/7C7fifnztsD/dX6/zi0PtLwpN9PYjwCVekb0PnsyzcWj0Bf/HiQJ5AIKE5Lv5/ECKhK74AOTn/bWh9peNLvJzECqmIqRkARlH4/iRFQFVMxG9DZR28+6Se8DhSjo99PYgRUpSOgy28n9wTeiYTx0e8nMQKqQkCRg34/iRFQlY6AOtLfttZHGp70+0mMgKqYihFQBKXfT2IEVMVU7PiAfjVcPgkoTke/n8QIqIqp2NEB/fLH5X1IP/gNAcUY6feTGAFV6RnQ2aX9p5BeGui9SPrb1vpIw5N+P4kRUJV+AV32c+fFf/jsn97YnQx0NTsCilPR7ycxAqrSL6A3JpMfrh54zn452bq4MgHFWOj3kxgBVekV0MUD0INr2F3lgsoYIf1+EiOgKr0C+vDCoe/KyQvpMT76/SRGQFV6BpRvKoeR0+8nMQKq0iugfF94jJ5+P4kRUJVeAZ3f2Pq65w2+BooR0u8nMQKq0i+gs0v7L/+8MdC1RAgoTkW/n8QIqEqvgM4+Wr7+88W3Pvvn5Y8vDHNVUP1ta32k4Um/n8QIqEqvgLpc1E5/21ofaXjS7ycxAqpCQJGDfj+JEVCVXgF1ob9trY80POn3kxgBVTEVI6AISr+fxAioiqkYAUVQ+v0kRkBVTMWODugfP9v3OS+kx+jo95MYAVXpGdDf7/JN5TBq+v0kRkBV+gX0Nt+VEyOn309iBFSlV0BnlyY7H3+17+sh+klAcSr6/SRGQFV6BfThhYEuokxAoaLfT2IEVKVnQAd6/zsBhYp+P4kRUJVeAZ1dIqAYOf1+EiOgKr0COr/Bp/AYOf1+EiOgKv0Ceuh7ehBQjJB+P4kRUJV+AZ3fuzA58+aG+kJ2BBSnp99PYgRUpWdAP+V1oBg3/X4SI6Aq/QJ6gxfSY+T0+0mMgKr0Cmh5If0gn7cTUIjo95MYAVXpFVCP55AIKE5Fv5/ECKhKz4DyOlCMnH4/iRFQlV4B5YX0GD39fhIjoCq9Ajq/MXmZgGLU9PtJjICq9Avo7NLO2wQUY6bfT2IEVKVXQGcfvTGZ7LzIC+kxXvr9JEZAVXoF1HxbY14HivHR7ycxAqpCQJGDfj+JEVCVXgF1ob9trY80POn3kxgBVTEVI6AISr+fxAioiqkYAUVQ+v0kRkBVTMVsQGd/tN8F/uGPz77A10AxOvr9JEZAVToC+vDC6imj2UebFy9tfoWAYlT0+0mMgKr0DOhBNgkoRkm/n8QIqAoBRQ76/SRGQFUIKHLQ7ycxAqpCQJGDfj+JEVAVAooc9PtJjICqEFDkoN9PYgRUhYAiB/1+EiOgKgQUOej3kxgBVSGgyEG/n8QIqAoBRQ76/SRGQFUIKHLQ7ycxAqrSHdAnEVCMj34/iRFQFQKKHPT7SYyAqnQEdPbRm0/im8phfPT7SYyAqnQE1JH+trU+0vCk309iBFTFVIyAIij9fhIjoCqmYgQUQen3kxgBVTEVI6AISr+fxAioiqkYAUVQ+v0kRkBVTMUIKILS7ycxAqpiKkZAEZR+P4kRUBVTMQKKoPT7SYyAqpiKEVAEpd9PYgRUxVTsiXciXdr5xeKHb78moBg3/X4SI6AqHQF9eGH5xvfV/xJQjJh+P4kRUJXOgC4fgRJQjJ5+P4kRUJWOgM4uTZ79/Ks/Xfjer786MMzn8/rb1vpIw5N+P4kRUJWOgM5vcDk7hKDfT2IEVKUroLNP6wL66OK0eOWL5UePr+xNp+9eX/3WoQ8IKDT0+0mMgKp0BXSR0K8+++fdnX/47MDnPa4Hen9vK6Drmq5ieugDAgoR/X4SI6Aq3QGdVz2JdGf62sEH16bnr88fXJ6ev2U/IKAQ0e8nMQKq0iugs49OfBH6a9P3939+f2/9OPTcJ+YDAgoV/X4SI6AqvQJ6co8vb/Xx5vrR6M1lVA99QEChot9PYgRUpXdAv/3V2clk5+xb/V7D9Oji+d99MJ3+9Pryg2vTD8svlk/rD31AQKGi309iBFSlb0APXs70cp+Abp5DWtZy/9Ho/b3ztw59sPr/Pr/S5489mdZHGp70+wFO6qiALvv5zItvvvH9ngW9M52+d2v+lyvTRS4JKBzo9wOc1BEBvbs7efY35Wf3Lk3K5UU6bL7SuXwuaauZr3xx6IND/4j+0XXrIw1P+v0kxqfwKv0CenXy7OZp+NmlyXPdAd24MzUPOp/yCJSAQkC/n8QIqEqvgK4vardyd/fZ/q9pMg86CSiGot9PYgRUpVdAD72Q/kSvqi+Z5Fl4DE+/n8QIqMowAX18eTuTm5d8rl8HuvUBAYWKfj+JEVCVXgGdXZq8s//B7UmPT+GvrR5frkLKO5EwPP1+EiOgKr0CevInke7vLV/G9OCD8o73RUZf3X/7+6EPCChU9PtJjICq9Avo3d3JmV+Xn/3p9V4vY1p8hr665tL15QcPti/A9ICrMWEA+v0kRkBV+gV09Uaks2fP9n4r0vzBz6bTc++tH2U+uLJI5rtP+4CAQkO/n8QIqErPgM7/sLt+J+fO2736eXL629b6SMOTfj+JEVCVvgGdz758Y/EI9MWPT3pdOwIKF/r9JEZAVXoHdHD629b6SMOTfj+JEVAVUzECiqD0+0mMgKqYihFQBKXfT2IEVMVUjIAiKP1+EiOgKqZiBBRB6feTGAFVMRUjoAhKv5/ECKiKqRgBRVD6/SRGQFVMxQgogtLvJzECqmIqRkARlH4/iRFQFVOxo67G9IPfEFCMmn4/iRFQlV4BfXhh63qgBBRjpN9PYgRUpWdAT/BdPAgoWtDvJzECqtIroIe+qRwBxRjp95MYAVXpFdD5jc23hSegGCn9fhIjoCr9AvrtLyeTZ158c+0ng1zSTn/bWh9peJuln3QAABwGSURBVNLvJzECqtIroA8vTLYN8wVR/W1rfaThSb+fxAioCgFFDvr9JEZAVXoF1IX+trU+0vCk309iBFTFVIyAIij9fhIjoCqmYscGdPb1gP0koDgV/X4SI6AqpmJHB/TLHy+/+PnwR28N9V3l9Let9ZGGJ/1+EiOgKj0DOvt09ezRwwuTMwO9KUl/21ofaXjS7ycxAqrSM6BXJ5Mzf737vd/O/m4yeXaYx6D629b6SMOTfj+JEVCVfgG9PZm8vX5H/B92B7qwiP62tT7S8KTfT2IEVKVfQK9OXt6/pMiNyXMEFKOj309iBFSlV0BXFxNZB/TuLi+kx/jo95MYAVXpFdBVOtcBHeradvrb1vpIw5N+P4kRUBUCihz0+0mMgKr0Cujs0vKJo3U5bw/0NLz+trU+0vCk309iBFSlV0BXTxytArqIKU8iYXz0+0mMgKr0C+jd3clL35SA3nt9MtDV6fW3rfWRhif9fhIjoCr9Arp4CDqZnN3defH7ix9fHqSfBBSnot9PYgRUpWdA57/f3VwNdKB+ElCcin4/iRFQlb4BnX/7q7OLej4z3DeI19+21kcanvT7SYyAqvQO6OD0t631kYYn/X4SI6AqpmLHXw/0qwH7SUBxKvr9JEZAVUzFjr8e6AKfwmOc9PtJjICq9Azo7NL+t5R7aaArKutvW+sjDU/6/SRGQFX6BXTZz50X//Nn//TGoqDDvI6egOJU9PtJjICq9Avo7f1XL81+OeF6oBgh/X4SI6AqvQK6eAB68OrPq7yVEyOk309iBFSlV0AfXth6+ybXA8UY6feTGAFV6RnQrWZyOTuMkX4/iRFQlV4BXV2Rfu3uLpezw/jo95MYAVXpFdBD3wfpxkDvhtffttZHGp70+0mMgKr0C+jDC5MffrPp5zCfwRNQnIp+P4kRUJWOgM4+erN4Y/U60H9+c3cyefEnfAqP0dHvJzECqtIR0MVDzyfxJBLGR7+fxAioCgFFDpUj+X/4DpH2pegIqCP9bWt9pOGpciStjzQ8SftSmIoRUARVOZLWRxqepH0pTMUIKIKqHEnrIw1P0r4UpmJHB/SPn+37nGfhMTqVI2l9pOFJ2peiZ0APvqccTyJhlCpH0vpIw5O0L0W/gN7mWXiMXOVIWh9peJL2pegV0Nmlyc7HX+37eoh+ElCcSuVIWh9peJL2pegV0IcXBrqIMgGFSuVIWh9peJL2pegZ0IHe/05AoVI5ktZHGp6kfSl6BXR2iYBi5CpH0vpIw5O0L0WvgM5v8Ck8Rq5yJK2PNDxJ+1L0C+ih7+lBQDFClSNpfaThSdqXol9A5/cuTM68ucHl7DA+lSNpfaThSdqXomdAP+V1oBi3ypG0PtLwJO1L0S+gN3ghPUauciStjzQ8SftS9ApoeSH9IJ+3E1CIVI6k9ZGGJ2lfil4B9XgOiYDiVCpH0vpIw5O0L0XPgPI6UIxc5UhaH2l4kval6BVQXkiP0ascSesjDU/SvhS9AjrY94InoFCpHEnrIw1P0r4U/QI6u7TzNgHFmFWOpPWRhidpX4peAZ19VL4vPC+kx3hVjqT1kYYnaV+KXgE139yY14FifCpH0vpIw5O0LwUBRQ6VI2l9pOFJ2peiV0Bd6G9b6yMNT5UjaX2k4Unal8JUjIAiqMqRtD7S8CTtS2EqRkARVOVIWh9peJL2pTAVOyKg3361jW8qh/GpHEnrIw1P0r4UvQLq8iSSXusjDU+VI2l9pOFJ2pen4Vl4BFU5ktZHGp6kfSl6BXT2x8/W/v71yc4/fM4L6TE6lSNpfaThSdqXoldAt93dfXaYK4Pqb1vrIw1PlSNpfaThSdqX4sQBHezCIvrb1vpIw1PlSFofaXiS9qU4eUCHegiqv22tjzQ8VY6k9ZGGJ2lfipMHdKirK+tvW+sjDU+VI2l9pOFJ2pfi5AG9u0tAMT6VI2l9pOFJ2pfixAGdXZ3wKTzGp3IkrY80PEn7UvQK6OyjzaVA33xjd8KTSBihypG0PtLwJO1L0Sugh19Iz8uYMEKVI2l9pOFJ2pfixAF95q2BvkG8/ra1PtLwVDmS1kcanqR9KXoF1IX+trU+0vBUOZLWRxqepH0pTMUIKIKqHEnrIw1P0r4UpmIEFEFVjqT1kYYnaV8KUzECiqAqR9L6SMOTtC+FqZgN6NYLmA7wbY0xPpUjaX2k4Unal6IjoOZKoFwPFGNVOZLWRxqepH0pCChyqBxJ6yMNT9K+FB0Btb7cnfBOJIxR5UhaH2l4kvalOFFAZz9f5PPMbwbpJwHFqVSOpPWRhidpX4qTBPQPi4efO0O9EYmA4lQqR9L6SMOTtC9F/4AO+vCTgOKUKkfS+kjDk7QvRe+Aloef/26wfBJQnE7lSFofaXiS9qXoGdB7Az/8JKA4pcqRtD7S8CTtS9EvoIM//CSgOKXKkbQ+0vAk7UvRJ6D3Li2vAjrow08CilOqHEnrIw1P0r4UPQJaHn6+PXA+CShOp3IkrY80PEn7UnQG1OfhJwHFKVWOpPWRhidpX4qugP7e5+EnAcUpVY6k9ZGGJ2lfio6A8l54BFE5ktZHGp6kfSkIKHKoHEnrIw1P0r4UHQHleqAIonIkrY80PEn7UnQE1JH+trU+0vBUOZLWRxqepH0pTMUIKIKqHEnrIw1P0r4UpmIEFEFVjqT1kYYnaV8KUzECiqAqR9L6SMOTtC+FqRgBRVCVI2l9pOFJ2pfCVIyAIqjKkbQ+0vAk7UthKkZAEVTlSFofaXiS9qUwFSOgCKpyJK2PNDxJ+1KYihFQBFU5ktZHGp6kfSlMxQgogqocSesjDU/SvhSmYgQUQVWOpPWRhidpXwpTMQKKoCpH0vpIw5O0L4WpGAFFUJUjaX2k4Unal8JUjIAiqMqRtD7S8CTtS2EqRkARVOVIWh9peJL2pTAVI6AIqnIkrY80PEn7UpiKEVAEVTmS1kcanqR9KUzFCCiCqhxJ6yMNT9K+FKZiBBRBVY6k9ZGGJ2lfClMxAoqgKkfS+kjDk7QvhakYAUVQlSNpfaThSdqXwlSMgCKoypG0PtLwJO1LYSpGQBFU5UhaH2l4kvalMBUjoAiqciStjzQ8SftSmIoRUARVOZLWRxqepH0pTMUIKIKqHEnrIw1P0r4UpmIEFEFVjqT1kYYnaV8KUzECiqAqR9L6SMOTtC+FqRgBRVCVI2l9pOFJ2pfCVIyAIqjKkbQ+0vAk7UthKkZAEVTlSFofaXiS9qUwFSOgCKpyJK2PNDxJ+1KYihFQBFU5ktZHGp6kfSlMxQgogqocSesjDU/SvhSmYgQUQVWOpPWRhidpXwpTMQKKoCpH0vpIw5O0L4WpGAFFUJUjaX2k4Unal8JUjIAiqMqRtD7S8CTtS2EqRkARVOVIWh9peJL2pTAVI6AIqnIkrY80PEn7UpiKEVAEVTmS1kcanqR9KUzFCCiCqhxJ6yMNT9K+FKZiBBRBVY6k9ZGGJ2lfClMxAoqgKkfS+kjDk7QvhakYAUVQlSNpfaThSdqXwlSMgCKoypG0PtLwJO1LYSpGQBFU5UhaH2l4kvalMBUjoAiqciStjzQ8SftSmIrpAvpvP5tOz717vfz80cVp8coXy48eX9mbTte/Q0AhUjmS1kcanqR9KYYK6L+sknnuk+UH9/e2Arqu6SqmBBQilSNpfaThSdqXYqCA3pme+9v5/MHlVSfvTF87+K1r0/PXl79z/hYBhU7lSFofaXiS9qUYJqCPL08/XP64eLT5YWnm+/u/dX9v/Th09eCUgEKjciStjzQ8SftSDBPQRxfXn6GXdD6+vBXLm+tHoze3okpAcWqVI2l9pOFJ2pdimIDuKwF9dPH87z6YTn96ffUr5bHp4U/rCShOq3IkrY80PEn7Ugwb0NUn6pvnkJbp3H80en9v80XQ51e0f/NS6yMNT5UjaX2k4Unal6cRB3T1+fqd6fS9W/O/XFk+J09AMYzKkbQ+0vAk7cvTaAN6Z/Uyps2XPZefz28F1LyQSf/ouvWRhqfKkbQ+0vAk7UsxZEDv7J378HBPz996yiNQAgqBypG0PtLwJO1LMWBAb07NK5WWDzoJKIZROZLWRxqepH0phgvov9h+rprJs/AYROVIWh9peJL2pRgqoI+vTV9df41z86r6VTM3r//kdaCQqhxJ6yMNT9K+FEMF9NrWWzWvrR5srkLKO5EwiMqRtD7S8CTtSzFQQG9uv9X9/t7yZUwPPii/tsjoq7wXHnKVI2l9pOFJ2pdimIBurl+38FrJ6eoCTNeXv/eAqzFhAJUjaX2k4Unal2KYgN6ZHgro/MHy4qDvrR9yPriy+OV3b9l/Rn/bWh9peKocSesjDU/SvhTDBLSG/ra1PtLwVDmS1kcanqR9KUzFCCiCqhxJ6yMNT9K+FKZiBBRBVY6k9ZGGJ2lfClMxAoqgKkfS+kjDk7QvhakYAUVQlSNpfaThSdqXwlSMgCKoypG0PtLwJO1LYSpGQBFU5UhaH2l4kvalMBUjoAiqciStjzQ8SftSmIoRUARVOZLWRxqepH0pTMUIKIKqHEnrIw1P0r4UpmIEFEFVjqT1kYYnaV8KUzECiqAqR9L6SMOTtC+FqRgBRVCVI2l9pOFJ2pfCVIyAIqjKkbQ+0vAk7UthKkZAEVTlSFofaXiS9qUwFSOgCKpyJK2PNDxJ+1KYihFQBFU5ktZHGp6kfSlMxQgogqocSesjDU/SvhSmYgQUQVWOpPWRhidpXwpTMQKKoCpH0vpIw5O0L4WpGAFFUJUjaX2k4Unal8JUjIAiqMqRtD7S8CTtS2EqRkARVOVIWh9peJL2pTAVI6AIqnIkrY80PEn7UpiKEVAEVTmS1kcanqR9KUzFCCiCqhxJ6yMNT9K+FKZiBBRBVY6k9ZGGJ2lfClMxAoqgKkfS+kjDk7QvhakYAUVQlSNpfaThSdqXwlSMgCKoypG0PtLwJO1LYSpGQBFU5UhaH2l4kvalMBUjoAiqciStjzQ8SftSmIoRUARVOZLWRxqepH0pTMUIKIKqHEnrIw1P0r4UpmIEFEFVjqT1kYYnaV8KUzECiqAqR9L6SMOTtC+FqRgBRVCVI2l9pOFJ2pfCVIyAIqjKkbQ+0vAk7UthKkZAEVTlSFofaXiS9qUwFSOgCKpyJK2PNDxJ+1KYihFQBFU5ktZHGp6kfSlMxQgogqocSesjDU/SvhSmYgQUQVWOpPWRhidpXwpTMQKKoCpH0vpIw5O0L4WpGAFFUJUjaX2k4Unal8JUjIAiqMqRtD7S8CTtS2EqRkARVOVIWh9peJL2pTAVI6AIqnIkrY80PEn7UpiKEVAEVTmS1kcanqR9KUzFCCiCqhxJ6yMNT9K+FKZiBBRBVY6k9ZGGJ2lfClMxAoqgKkfS+kjDk7QvhakYAUVQlSNpfaThSdqXwlSMgCKoypG0PtLwJO1LYSpGQBFU5UhaH2l4kvalMBUjoAiqciStjzQ8SftSmIoRUARVOZLWRxqepH0pTMUIKIKqHEnrIw1P0r4UpmIEFEFVjqT1kYYnaV8KUzECiqAqR9L6SMOTtC+FqRgBRVCVI2l9pOFJ2pfCVIyAIqjKkbQ+0vAk7UthKkZAEVTlSFofaXiS9qUwFSOgCKpyJK2PNDxJ+1KYihFQBFU5ktZHGp6kfSlMxQgogqocSesjDU/SvhSmYgQUQVWOpPWRhidpXwpTMQKKoCpH0vpIw5O0L4WpGAFFUJUjaX2k4Unal8JUjIAiqMqRtD7S8CTtS2EqRkARVOVIWh9peJL2pTAVI6AIqnIkrY80PEn7UpiKEVAEVTmS1kcanqR9KUzFCCiCqhxJ6yMNT9K+FKZiBBRBVY6k9ZGGJ2lfClMxAoqgKkfS+kjDk7QvhakYAUVQlSNpfaThSdqXwlSMgCKoypG0PtLwJO1LYSpGQBFU5UhaH2l4kvalMBVrGFC91kcanipH0vpIw5O0L0/DI1AEVTmS1kcanqR9KUzFCCiCqhxJ6yMNT9K+FKZiBBRBVY6k9ZGGJ2lfClMxAoqgKkfS+kjDk7QvhakYAUVQlSNpfaThSdqXwlSMgCKoypG0PtLwJO1LYSpGQBFU5UhaH2l4kvalMBUjoAiqciStjzQ8SftSmIoRUARVOZLWRxqepH0pTMUIKIKqHEnrIw1P0r4UpmIEFEFVjqT1kYYnaV8KUzECiqAqR9L6SMOTtC+FqRgBRVCVI2l9pOFJ2pfCVIyAIqjKkbQ+0vAk7UthKkZAEVTlSFofaXiS9qUwFSOgCKpyJK2PNDxJ+1KYihFQBFU5ktZHGp6kfSlMxQgogqocSesjDU/SvhSmYgQUQVWOpPWRhidpXwpTMQKKoCpH0vpIw5O0L4WpGAFFUJUjaX2k4Unal8JUjIAiqMqRtD7S8CTtS2EqRkARVOVIWh9peJL2pTAVI6AIqnIkrY80PEn7UpiKEVAEVTmS1kcanqR9KUzFCCiCqhxJ6yMNT9K+FKZiBBRBVY6k9ZGGJ2lfClMxAoqgKkfS+kjDk7QvhakYAUVQlSNpfaThSdqXwlSMgCKoypG0PtLwJO1LYSpGQBFU5UhaH2l4kvalMBUjoAiqciStjzQ8SftSmIoRUARVOZLWRxqepH0pTMUIKIKqHEnrIw1P0r4UpmIEFEFVjqT1kYYnaV8KUzECiqAqR9L6SMOTtC+FqRgBRVCVI2l9pOFJ2pfCVIyAIqjKkbQ+0vAk7UthKkZAEVTlSFofaXiS9qUwFSOgCKpyJK2PNDxJ+1KYihFQBFU5ktZHGp6kfSlMxQgogqocSesjDU/SvhSmYgQUQVWOpPWRhidpXwpTMQKKoCpH0vpIw5O0L4WpGAFFUJUjaX2k4Unal8JUjIAiqMqRtD7S8CTtS2EqRkARVOVIWh9peJL2pTAVI6AIqnIkrY80PEn7UpiKEVAEVTmS1kcanqR9KUzFCCiCqhxJ6yMNT9K+FKZiBBRBVY6k9ZGGJ2lfClMxAoqgKkfS+kjDk7QvhakYAUVQlSNpfaThSdqXwlSMgCKoypG0PtLwJO1LYSpGQBFU5UhaH2l4kvalMBUjoAiqciStjzQ8SftSmIoRUARVOZLWRxqepH0pTMUIKIKqHEnrIw1P0r4UpmIEFEFVjqT1kYYnaV8KUzECiqAqR9L6SMOTtC+FqRgBRVCVI2l9pOFJ2pfCVIyAIqjKkbQ+0vAk7UthKkZAEVTlSFofaXiS9qUwFSOgCKpyJK2PNDxJ+1KYihFQBFU5ktZHGp6kfSlMxQgogqocSesjDU/SvhSmYgQUQVWOpPWRhidpXwpTMQKKoCpH0vpIw5O0L4WpGAFFUJUjaX2k4Unal8JUjIAiqMqRtD7S8CTtS2EqRkARVOVIWh9peJL2pTAVI6AIqnIkrY80PEn7UpiKEVAEVTmS1kcanqR9KUzFCCiCqhxJ6yMNT9K+FKZiBBRBVY6k9ZGGJ2lfClMxAoqgKkfS+kjDk7QvhakYAUVQlSNpfaThSdqXwlSMgCKoypG0PtLwJO1LYSpGQBFU5UhaH2l4kvalMBUjoAiqciStjzQ8SftSmIp5BPTxlb3p9N3rBBRKlSNpfaThSdqXwj+gjy5Ol175goBCqHIkrY80PEn7UvgH9Nr0/PX5g8vT87cIKHQqR9L6SMOTtC+Fe0Dv75XHno8unvuEgEKnciStjzQ8SftSuAf05vS19Y/vE1DoVI6k9ZGGJ2lfCveAXpt+WH68sw4pAYVE5UhaH2l4kval8A7o48vrT93v722+CPr8iv7van2k4alyJK2PNDxJ+/I0qQIKAJ48A2peyKR/dP3dxD2JToxEpWFAzeuYWt8TWXBPohMjUSGg2XBPohMjUfEOqOez8N9N3JPoxEhU3AO6ef2nw+tAv5u4J9GJkai4B9TxnUjfTdyT6MRIVNwD+vjy9FWn98J/N3FPohMjUXEP6PyB29WYvpu4J9GJkaj4B3T+4Mqin+/esr/c+p7IgnsSnRiJSoOAHqH1PZEF9yQ6MRIVUzECGh73JDoxEhVTMQIaHvckOjESFVMxAhoe9yQ6MRIVUzECGh73JDoxEhVTMQIaHvckOjESFVMxAhoe9yQ6MRIVUzECGh73JDoxEhVTMQIaHvckOjESFVMxAhoe9yQ6MRIVUzECGh73JDoxEhVTMQIaHvckOjESFVMxAhoe9yQ6MRIVUzECGh73JDoxEhVTMQIaHvckOjESFVMxAhoe9yQ6MRIVUzECGh73JDoxEhVTMQIaHvckOjESFVMxAhoe9yQ6MRIVUzECGh73JDoxEhVTMQIaHvckOjESFVMxAhoe9yQ6MRIVUzECGh73JDoxEhVTMQIaHvckOjESFVMxAhoe9yQ6MRIVUzECGh73JDoxEhVTMQIaHvckOjESFVOxhgGFxvPPt/43wOgxkoEQ0PA4G+jESAZCQMPjbKATIxkIAQ2Ps4FOjGQgBDQ8zgY6MZKBENDwOBvoxEgGQkDD42ygEyMZCAEFgEoEFAAqEVAAqERAAaASAQWASgQUACoRUACoREABoBIBDeHRxen7+z995Yum/y4Yk8eXp+dv7f/0w7b/Mt9BBDSERUDPfbL5KQHFgft7m/+23tlPKdwQ0BAWAZ2+tvkpAcWWm9PVIB5d3Pw3Fn4IaAiLw/E368/PCCgO2Xx55+bmP7FwREBDWFTzf+xtHmisfnxwZTqdvnu96b8WxuBO+fLO/fU+FsPYm05/en31858tRvLv/7bhv1x2BDSEZTXXjzDWAb2zOCUL53ja4Dvv8eXlMq6tP0O5vzWM9c95aDocAhrCsprrJ1lXAV0cjXf/9/zxv0z5uhfu75375P7e6hmkxSf0792aP/7X5RdGF4v5D4tf/Lc9RjIYAhpCqebqk7RVQDdf8LrGowssVnD+v6wjuRnGzen7PK3kgICGsKpmqWX56f5L/njpCrZfpPH48rqZy0eki5W8+j9b/nt9BxDQEFYBLY8oyk/3H1vwnDzmy/+OrmewaObG4lduLn989b/yn9jhENAQNs8cLR5vrgO6PjAEFPPV483yk+Vj0YOAzv/8N+Wn75HQoRDQEDadvDZ9n0egeMJWQM2XPR//9+Urmd5/2j8EAQIawqaTi/Px3/gaKKz9gD7t/fCP/5WRDIaAhrD/QPPO9K/2eBYexn5AF8NY/Wz5X9bNa+sPfhdqBDSEg8/Ur62+uLV6HehfrvA6UMy3E/no4vT89fn8z3uLR6LLKzUtfv7gMv+VHQwBDeEgoIty8k4kGFuPMdfDmL43P3gn0qt8nXwoBDSEreeKNhff4b3w2Lf9SfrqvfD/ePDzv/qPfAI/GAIKAJUIKABUIqAAUImAAkAlAgoAlQgoAFQioABQiYACQCUCCgCVCCgAVCKgAFCJgAJAJQIKAJUIKABUIqAAUImAAkAlAgoAlQgoAFQioABQiYACQCUCCgCVCCgAVCKgAFCJgAJAJQIKAJUIKABUIqAAUImAAkAlAgoAlQgoAFQioABQiYACQCUCCgCVCCgAVCKgAFCJgAJAJQIKAJUIKABUIqAAUImAAkAlAgoAlQgoAFQioABQiYACQCUCCgCVCCgAVCKgAFCJgAJAJQIKAJUIKABUIqAAUOn/A71FEGOQyBlxAAAAAElFTkSuQmCC">
+            <a:extLst>
+              <a:ext uri="{FF2B5EF4-FFF2-40B4-BE49-F238E27FC236}">
+                <a16:creationId xmlns:a16="http://schemas.microsoft.com/office/drawing/2014/main" id="{8CC047BC-7FEC-4EB1-BCEA-02FB6A9AD576}"/>
+              </a:ext>
+            </a:extLst>
+          </p:cNvPr>
+          <p:cNvSpPr>
+            <a:spLocks noChangeAspect="1" noChangeArrowheads="1"/>
+          </p:cNvSpPr>
+          <p:nvPr/>
+        </p:nvSpPr>
+        <p:spPr bwMode="auto">
+          <a:xfrm>
+            <a:off x="5963478" y="3296478"/>
+            <a:ext cx="284922" cy="284922"/>
+          </a:xfrm>
+          <a:prstGeom prst="rect">
+            <a:avLst/>
+          </a:prstGeom>
+          <a:noFill/>
+          <a:extLst>
+            <a:ext uri="{909E8E84-426E-40DD-AFC4-6F175D3DCCD1}">
+              <a14:hiddenFill xmlns:a14="http://schemas.microsoft.com/office/drawing/2010/main">
+                <a:solidFill>
+                  <a:srgbClr val="FFFFFF"/>
+                </a:solidFill>
+              </a14:hiddenFill>
+            </a:ext>
+          </a:extLst>
+        </p:spPr>
+        <p:txBody>
+          <a:bodyPr vert="horz" wrap="square" lIns="91440" tIns="45720" rIns="91440" bIns="45720" numCol="1" anchor="t" anchorCtr="0" compatLnSpc="1">
+            <a:prstTxWarp prst="textNoShape">
+              <a:avLst/>
+            </a:prstTxWarp>
+          </a:bodyPr>
+          <a:lstStyle/>
+          <a:p>
+            <a:endParaRPr lang="en-US"/>
+          </a:p>
+        </p:txBody>
+      </p:sp>
+      <p:sp>
+        <p:nvSpPr>
+          <p:cNvPr id="5" name="AutoShape 2" descr="data:image/png;base64,iVBORw0KGgoAAAANSUhEUgAABUAAAAPACAMAAADDuCPrAAABYlBMVEUAAAAAADoAAGYAOjoAOmYAOpAAZrYzMzM6AAA6OgA6Ojo6OmY6ZmY6ZpA6ZrY6kLY6kNtNTU1NTW5NTY5Nbm5Nbo5NbqtNjshmAABmADpmOgBmOjpmZjpmZmZmZpBmkGZmkLZmkNtmtttmtv9uTU1ubk1ubm5ubo5ujqtujshuq8huq+SOTU2Obk2Obm6Oq8iOyOSOyP+QOgCQOjqQZjqQZmaQZpCQkGaQkLaQtraQttuQ2/+rbk2rjk2rjm6rq8iryOSr5Mir5P+2ZgC2Zjq2kDq2kGa2kJC2tpC2tra2ttu229u22/+2///Ijk3Ijm7Iq27Iq6vIyKvI5KvI5OTI5P/I///bkDrbkGbbtmbbtpDbtrbb27bb29vb2//b/7bb///kq27kyI7kyKvk5P/k///r6+v8jVn/tmb/yI7/25D/27b/29v/5Kv/5Mj/5OT//7b//7///8j//9v//+T///+zjZs9AAAACXBIWXMAAB2HAAAdhwGP5fFlAAAgAElEQVR4nO3d/59b5ZnecU0wMDGEILMYh0CWwmwDxaSLN3S7xHW3mGQXkni3aY0TEijO1q2/YMe1rP+/0iNpRnPbM+fMM9e5n3PffN4/xB472Eiv6/mgGUlnJnMAQJVJ638BAIiKgAJAJQIKAJUIKABUIqAAUImAAkAlAgoAlQgoAFQioABQiYACQCUCCgCVCCgAVCKgAFCJgAJAJQIKAJVGENDZl298fzKZ7Lzw8Ten/rNuT570zvzhhcnOLwT/pgCwrXlAZ7/aPWjdS6dNKAEF4Kd1QO+9fih2p+0cAQXgp3FA7y4ffu689dXip9/+6vuCgh78ud/7reRPAoCjtA3o4qHh1ufts1/KCkpAAQyvbUCvLor59tbHy8/An1P8wQQUwPCaBnT5CfzLh37lRvmapeRPJqAABtY0oItcmswtP6d/rvzGwQPRq5vK3vv5Irg7P/jNwT/9zuzT3cnOC09+1n84oJsnka4ufyh/ygsfL3/9yx8vev3Cr/f/f+YvAIBjtQzo7NKTn7Cvmroo3n7/NvWbfWpe7LQM6NUjnro/OqA31n/Iywd/4PpB8BN/AQAcq2VAlw837efrt1c9vHrwO4tfefabVW03VtVdpPBs+fDZJ3t3ZED/fv8Pefvq4ddOPfkXAMCxWgZ0UbknHjyuo3r7IGLrli4fOb709Xz+7aebx4zlseQPv5l/+/VT/+inBnRh+Rn6l4tP1Z+Z7Lz9zeqZ/+fmT/0LAOBYLQN6+ymffS8D+vJ866Xv68/mtx6t3l5/5fTGMaE7OqAvb/6MzV9wdfUQ9il/AQAca6QBXdZxlbr180nbTysdPCY98kWjRwZ0/aubv2a+/yWCp/wFAHCssQZ0UcDypc3lVyaXMdtu2u39xj7lq58rRwb0uYO/5p1D/9en/AUAcKyRfg10Gc7ye+uQbj/Ds3mW58YxT/YcGdCXD//K/v/1aX8BABxrbM/C70f19qFP5W3f7Cfd1qkDeuRjWwDYGOfrQOclcYuIbR6IElAA4zPOdyItlbcNbV7OtPlSqPmntQHliSMAJ9I0oFu5XNt6L3z5HH7/qZ2rTz6vIw3o0/4CADhW26sx2Zdy3t765HnxmPDZ/7X/ls7tp9xv7H95VBjQp/wFAHCstgEtX3k8eOf5jcn2C5tulDderku2deGmzfNM2oA+5S8AgGM1viL9veUVlQ9dkf7gC5Grq9VvSrZ8F9GZX6+/h9LmvZfCgD7lLwCAY435eyJd3X42fPtp8lUbxQF98i8AgGO1Duih78q5c/g6crcn28+Mz36++b+dWV2wUxzQJ/8CADhW84AufPnz5Sfvz7xovy/89lVBl/60vN7x+lrIc31An/gLAOBYYwgoAIREQAGgEgEFgEoEFAAqEVAAqERAAaASAQWASgQUACoRUACoREABoBIBBYBKBBQAKhFQAKhEQAGgEgEFgEoEFAAqEVAAqNQwoP8HEtyT6MRIVEzFCGh43JPoxEhUTMUIaHjck+jESFRMxQhoeNyT6MRIVEzFCGh43JPoxEhUTMUIaHjck+jESFRMxQhoeNyT6MRIVEzFCGh43JPoxEhUTMUIaHjck+jESFRMxQhoeNyT6MRIVEzFCGh43JPoxEhUTMUIaHjck+jESFRMxQhoeNyT6MRIVEzFCGh43JPoxEhUTMUIaHjck+jESFRMxQhoeNyT6MRIVEzFCGh43JPoxEhUTMUIaHjck+jESFRMxQhoeNyT6MRIVEzFCGh43JPoxEhUTMUIaHjck+jESFRMxQhoeNyT6MRIVEzFCGh43JPoxEhUTMUIaHjck+jESFRMxQhoeNyT6MRIVEzFCGh43JPoxEhUTMUIaHjck+jESFRMxQhoeNyT6MRIVEzFCGh43JPoxEhUTMUIaHjck+jESFRMxQhoeNyT6MRIVEzFCGh43JPoxEhUTMUIaHjck+jESFRMxQhoeNyT6MRIVEzFCGh43JPoxEhUTMUIaHjck+jESFRMxQhoeNyT6MRIVEzFUgX0/+I7RL+fxAioiqkYAUVQ+v0kRkBVTMUIKILS7ycxAqpiKkZAEZR+P4kRUBVTMQKKoPT7SYyAqpiKEVAEpd9PYgRUxVSMgCIo/X4SI6AqpmIEFEHp95MYAVUxFSOgCEq/n8QIqIqpGAFFUPr9JEZAVUzFCCiC0u8nMQKqYipGQBGUfj+JEVAVUzECiqD0+0mMgKqYihFQBKXfT2IEVMVUjIAiKP1+EiOgKqZiBBRB6feTGAFVMRUjoAhKv5/ECKiKqRgBRVD6/SRGQFVMxQgogtLvJzECqmIqRkARlH4/iRFQFVMxAoqg9PtJjICqmIoRUASl309iBFTFVIyAIij9fhIjoCqmYgQUQen3kxgBVTEVI6AISr+fxAioiqkYAUVQ+v0kRkBVTMUIKILS7ycxAqpiKkZAEZR+P4kRUBVTMQKKoPT7SYyAqpiKEVAEpd9PYgRUxVSMgCIo/X4SI6AqpmKnDeiji6+tf/b4yt50+u71rg8IKDT0+0mMgKqIA3pt+tqmpNOlV744/gMCChH9fhIjoCrSgD6+Nt0E9Nr0/PX5g8vT87eO/YCAQkS/n8QIqIoyoP/2wXQT0Pt75RHmo4vnPjnuAwIKFf1+EiOgKsKA3pxO3/vzOqA39398/7gPCChU9PtJjICqKAP66j/O76zzeG36YfmxfHz0BwQUKvr9JEZAVYQB3cri48vrT9Dv752/dfQHq3/m+ZVT/s1P0fpIw5N+P8BJEVAEpd8PcFL6gL7yxdEfHPpH9Y+uWx9peNLvJzE+hVcZPKDdj0AJKAT0+0mMgKoQUOSg309iBFRlmIDyLDy86feTGAFVGSigm1d5rl/6edQHBBQq+v0kRkBVBgoo70SCM/1+EiOgKgMF9PHl6av773g/+gMCChX9fhIjoCoDBXT+YPuaS0d/QEAhot9PYgRUZaiAzh9cWVTy3VtdHxBQaOj3kxgBVREH9BT0t631kYYn/X4SI6AqpmIEFEHp95MYAVUxFSOgCEq/n8QIqIqpGAFFUPr9JEZAVUzFCCiC0u8nMQKqYipGQBGUfj+JEVAVUzECiqD0+0mMgKqYihFQBKXfT2IEVMVUjIAiKP1+EiOgKqZiBBRB6feTGAFVMRUjoAhKv5/ECKiKqRgBRVD6/SRGQFVMxQgogtLvJzECqmIqRkARlH4/iRFQFVMxAoqg9PtJjICqmIoRUASl309iBFTFVIyAIij9fhIjoCqmYgQUQen3kxgBVTEVI6AISr+fxAioiqkYAUVQ+v0kRkBVTMUIKILS7ycxAqpiKkZAEZR+P4kRUBVTMQKKoPT7SYyAqpiKEVAEpd9PYgRUxVSMgCIo/X4SI6AqpmIEFEHp95MYAVUxFSOgCEq/n8QIqIqpGAFFUPr9JEZAVUzFCCiC0u8nMQKqYipGQBGUfj+JEVAVUzECiqD0+0mMgKqYihFQBKXfT2IEVMVUjIAiKP1+EiOgKqZiBBRB6feTGAFVMRUjoAhKv5/ECKiKqRgBRVD6/SRGQFVMxQgogtLvJzECqmIqRkARlH4/iRFQFVMxAoqg9PtJjICqmIoRUASl309iBFTFVIyAIij9fhIjoCqmYgQUQen3kxgBVTEVI6AISr+fxAioiqkYAUVQ+v0kRkBVTMUIKILS7ycxAqpiKkZAEZR+P4kRUBVTMQKKoPT7SYyAqpiKEVAEpd9PYgRUxVSMgCIo/X4SI6AqpmIEFEHp95MYAVUxFSOgCEq/n8QIqIqpGAFFUPr9JEZAVUzFCCiC0u8nMQKqYipGQBGUfj+JEVAVUzECiqD0+0mMgKqYihFQBKXfT2IEVMVUjIAiKP1+EiOgKqZiBBRB6feTGAFVMRUjoAhKv5/ECKiKqRgBRVD6/SRGQFVMxQgogtLvJzECqmIqRkARlH4/iRFQFVMxAoqg9PtJjICqmIoRUASl309iBFTFVIyAIij9fhIjoCqmYgQUQen3kxgBVTEVI6AISr+fxAioiqkYAUVQ+v0kRkBVTMUIKILS7ycxAqpiKkZAEZR+P4kRUBVTMQKKoPT7SYyAqpiKEVAEpd9PYgRUxVSMgCIo/X4SI6AqpmIEFEHp95MYAVUxFSOgCEq/n8QIqIqpGAFFUPr9JEZAVUzFCCiC0u8nMQKqYipGQBGUfj+JEVAVU7GGAdVrfaThqfXaAB6BIiz9fhLjEaiKqRgBRVD6/SRGQFVMxQgogtLvJzECqmIqRkARlH4/iRFQFVMxAoqg9PtJjICqmIoRUASl309iBFTFVIyAIij9fhIjoCqmYgQUQen3kxgBVTEVI6AISr+fxAioiqkYAUVQ+v0kRkBVTMUIKILS7ycxAqpiKkZAEZR+P4kRUBVTMQKKoPT7SYyAqpiKEVAEpd9PYgRUxVSMgCIo/X4SI6AqpmIEFEHp95MYAVUxFSOgCEq/n8QIqIqpGAFFUPr9JEZAVUzFCCiC0u8nMQKqYipGQBGUfj+JEVAVUzECiqD0+0mMgKqYihFQBKXfT2IEVMVUjIAiKP1+EiOgKqZiBBRB6feTGAFVMRUjoAhKv5/ECKiKqRgBRVD6/SRGQFVMxQgogtLvJzECqmIqRkARlH4/iRFQFVMxAoqg9PtJjICqmIoRUASl309iBFTFVIyAIij9fhIjoCqmYgQUQen3kxgBVTEVI6AISr+fxAioiqkYAUVQ+v0kRkBVTMUIKILS7ycxAqpiKkZAEZR+P4kRUBVTMQKKoPT7SYyAqpiKEVAEpd9PYgRUxVSMgCIo/X4SI6AqpmIEFEHp95MYAVUxFSOgCEq/n8QIqIqpGAFFUPr9JEZAVUzFCCiC0u8nMQKqYipGQBGUfj+JEVAVUzECiqD0+0mMgKqYihFQBKXfT2IEVMVUjIAiKP1+EiOgKqZiBBRB6feTGAFVMRUjoAhKv5/ECKiKqRgBRVD6/SRGQFVMxQgogtLvJzECqmIqRkARlH4/iRFQFVMxAoqg9PtJjICqmIoRUASl309iBFTFVIyAIij9fhIjoCqmYgQUQen3kxgBVTEVI6AISr+fxAioiqkYAUVQ+v0kRkBVTMUIKILS7ycxAqpiKkZAEZR+P4kRUBVTMQKKoPT7SYyAqpiKEVAEpd9PYgRUxVSMgCIo/X4SI6AqpmIEFEHp95MYAVUxFSOgCEq/n8QIqIqpGAFFUPr9JEZAVUzFCCiC0u8nMQKqYipGQBGUfj+JEVAVUzECiqD0+0mMgKqYihFQBKXfT2IEVMVUjIAiKP1+EiOgKqZiBBRB6feTGAFVMRUjoAhKv5/ECKiKqRgBRVD6/SRGQFVMxQgogtLvJzECqmIqRkARlH4/iRFQFVMxAoqg9PtJjICqmIoRUASl309iBFTFVIyAIij9fhIjoCqmYgQUQen3kxgBVTEVI6AISr+fxAioiqmYKKCPL083XvliPn908eDni9+8sjedvnudgEJJv5/ECKiKS0Dv720FdF3TVUwJKET0+0mMgKoME9CN+3vnPln8cGf62sGvXZuevz5/cHl6/hYBhY5+P4kRUJVBA7p4IPr+qpnvbzV1/Ti0pJWAQkS/n8QIqMqgAb25epj5+PJWLG+uH43e3IoqAcWp6feTGAFVGTKgjy5OP1z9eP53H0ynP72+/ODa6tcOf1pPQHFa+v0kRkBVhgzo5sHm5jmkZTr3H43e39t8EfT5FeXfvNL6SMOTfj/ASSkDuv9lzjvT6Xu35n+5Ml18TEAxDP1+gJNSBvTO5on2zSPR5XNJWwE1L2TSP7pufaThSb+fxPgUXmW4gD6+vP5q56GiPuURKAGFgH4/iRFQleEC+sRDzPIrBBTD0O8nMQKqMlxAn3iafdVMnoXHIPT7SYyAqgwX0P1Xz+9/Ll+auXn9J68DhZR+P4kRUJXBArr16vlrqwebq5DyTiQMQr+fxAioymABfXRx/0ug9/eWL2N68EF5Vn6R0Vd5Lzzk9PtJjICqDBbQ7SeJbq4vxnR9+cEDrsaEAej3kxgBVRksoHe2H2I++Nl0eu699ccPriz6+e4t+w/ob1vrIw1P+v0kRkBVBgvoielvW+sjDU/6/SRGQFVMxQgogtLvJzECqmIqRkARlH4/iRFQFVMxAoqg9PtJjICqmIoRUASl309iBFTFVKwjoLM/fvY5AcUY6feTGAFV6RvQe//pm/n84euTyeTMLwgoxke/n8QIqErPgN6YfO+38/nVydLyZwQUI6PfT2IEVKVfQG+XbN7dnTz7zb0Lk5cJKEZHv5/ECKhKv4BeXZRzmdGdXyz/d/lzAopx0e8nMQKq0iugs0vLcq4z+vDCMJ/D629b6yMNT/r9JEZAVXoFdNXMhxcmz80JKMZJv5/ECKjKCQJ6d3fyDgHFSOn3kxgBVekV0NWn8DfKl0D5GihGSb+fxAioSq+Azq9Onls+/b4sJ8/CY5T0+0mMgKr0C+jt8gLQxWfws59PVo9DCSjGRb+fxAioSr+ALj59X3iuPJG0884g/SSgOBX9fhIjoCo9Azq/99FPPl788PBHP/jNMP0koDgV/X4SI6AqfQM6PP1ta32k4Um/n8QIqIqp2LEBnX09YD8JKE5Fv5/ECKiKqdjRAf3yx8v3wz/80VuDvIaJgOKU9PtJjICq9Azo7NPVdZgeXpicGeZiTAQUp6LfT2IEVKVnQK9OJmf+evd7v5393WSg19ETUJyKfj+JEVCVfgG9PZm8vX4P5x9Wb+gkoBgX/X4SI6Aq/QJ6dfnuo/Wb4G+US4oQUIyLfj+JEVCVXgFdvRd+HdC7u1xMBOOj309iBFSlV0A3l7Mr5eRqTBgj/X4SI6AqBBQ56PeTGAFV6RXQ2aXlE0frcnI5O4yRfj+JEVCVXgFdPXG0CugipjyJhPHR7ycxAqrSL6B3dycvfVMCeu91LmeHMdLvJzECqtIvoOVydmd3d178/uLHYa6nTEBxKvr9JEZAVXoGdP773cnaQP0koDgV/X4SI6AqfQM6//ZXZxf1fGawy4ESUJyKfj+JEVCV3gEdnP62tT7S8KTfT2IEVMVUjOuBIij9fhIjoCqmYlwPFEHp95MYAVXpGVCuB4qR0+8nMQKq0jOgXA8UI6ffT2IEVKVfQLkeKMZOv5/ECKhKv4ByPVCMnX4/iRFQlV4B5XqgGD39fhIjoCq9Asrl7DB6+v0kRkBVCChy0O8nMQKq0iugXA8Uo6ffT2IEVKVXQLkeKEZPv5/ECKhKv4ByPVCMnX4/iRFQlX4B5XqgGDv9fhIjoCo9A8r1QDFy+v0kRkBV+gaU64Fi3PT7SYyAqvQO6OD0t631kYYn/X4SI6AqpmIEFEHp95MYAVUxFTvihfQ/emnQaykTUJyafj+JEVCVfgG9MJk8M9iVlAkoBPT7SYyAqvQK6OpyypMzHw/ZUP1ta32k4Um/n8QIqEqvgC786celoS98TEAxSvr9JEZAVfoGdL76rkgLQ72QSX/bWh9peNLvJzECqnKCgC4+lf/y9WVCd94a4ikl/W1rfaThSb+fxAioyokCuvDtz8tbkl7QPwzV37bWRxqe9PtJjICqnCigs199f/OGzslLBBRjot9PYgRUpX9AN/VcPhf/7af698Trb1vrIw1P+v0kRkBVegZ0/dXPg1eD6i+rrL9trY80POn3kxgBVekV0NmliX3ySP+NPfS3rfWRhif9fhIjoCq9Arp8J9LO4ZcvPbzAI1CMiX4/iRFQlZ4B/cGvzS/NPle/lEl/21ofaXjS7ycxAqrSK6Au9Let9ZGGJ/1+EiOgKqZiBBRB6feTGAFVMRXruCL9ztlB3oREQHFq+v0kRkBV+gb0xv4r6PmeSBgj/X4SI6AqPQO67OczL775Bt+VEyOl309iBFSlX0Dv7k6eXb2K6d4lvi88xki/n8QIqEq/gF49eN/R7NLkOQKK0dHvJzECqtIroLNLW4867+6qX0JPQHF6+v0kRkBVegX00Ps29W/iJKA4Pf1+EiOgKgQUOej3kxgBVekV0NmlyTv7H+ivw0RAcXr6/SRGQFV6BZQnkTB6+v0kRkBV+gX07u7kzOpyIn96nZcxYYz0+0mMgKr0C+jqjUhnz54d8q1Icq2PNDy1XhtwzFs5/7C7fifnztsD/dX6/zi0PtLwpN9PYjwCVekb0PnsyzcWj0Bf/HiQJ5AIKE5Lv5/ECKhK74AOTn/bWh9peNLvJzECqmIqRkARlH4/iRFQFVMxG9DZR28+6Se8DhSjo99PYgRUpSOgy28n9wTeiYTx0e8nMQKqQkCRg34/iRFQlY6AOtLfttZHGp70+0mMgKqYihFQBKXfT2IEVMVU7PiAfjVcPgkoTke/n8QIqIqp2NEB/fLH5X1IP/gNAcUY6feTGAFV6RnQ2aX9p5BeGui9SPrb1vpIw5N+P4kRUJV+AV32c+fFf/jsn97YnQx0NTsCilPR7ycxAqrSL6A3JpMfrh54zn452bq4MgHFWOj3kxgBVekV0MUD0INr2F3lgsoYIf1+EiOgKr0C+vDCoe/KyQvpMT76/SRGQFV6BpRvKoeR0+8nMQKq0iugfF94jJ5+P4kRUJVeAZ3f2Pq65w2+BooR0u8nMQKq0i+gs0v7L/+8MdC1RAgoTkW/n8QIqEqvgM4+Wr7+88W3Pvvn5Y8vDHNVUP1ta32k4Um/n8QIqEqvgLpc1E5/21ofaXjS7ycxAqpCQJGDfj+JEVCVXgF1ob9trY80POn3kxgBVTEVI6AISr+fxAioiqkYAUVQ+v0kRkBVTMWODugfP9v3OS+kx+jo95MYAVXpGdDf7/JN5TBq+v0kRkBV+gX0Nt+VEyOn309iBFSlV0BnlyY7H3+17+sh+klAcSr6/SRGQFV6BfThhYEuokxAoaLfT2IEVKVnQAd6/zsBhYp+P4kRUJVeAZ1dIqAYOf1+EiOgKr0COr/Bp/AYOf1+EiOgKv0Ceuh7ehBQjJB+P4kRUJV+AZ3fuzA58+aG+kJ2BBSnp99PYgRUpWdAP+V1oBg3/X4SI6Aq/QJ6gxfSY+T0+0mMgKr0Cmh5If0gn7cTUIjo95MYAVXpFVCP55AIKE5Fv5/ECKhKz4DyOlCMnH4/iRFQlV4B5YX0GD39fhIjoCq9Ajq/MXmZgGLU9PtJjICq9Avo7NLO2wQUY6bfT2IEVKVXQGcfvTGZ7LzIC+kxXvr9JEZAVXoF1HxbY14HivHR7ycxAqpCQJGDfj+JEVCVXgF1ob9trY80POn3kxgBVTEVI6AISr+fxAioiqkYAUVQ+v0kRkBVTMVsQGd/tN8F/uGPz77A10AxOvr9JEZAVToC+vDC6imj2UebFy9tfoWAYlT0+0mMgKr0DOhBNgkoRkm/n8QIqAoBRQ76/SRGQFUIKHLQ7ycxAqpCQJGDfj+JEVAVAooc9PtJjICqEFDkoN9PYgRUhYAiB/1+EiOgKgQUOej3kxgBVSGgyEG/n8QIqAoBRQ76/SRGQFUIKHLQ7ycxAqrSHdAnEVCMj34/iRFQFQKKHPT7SYyAqnQEdPbRm0/im8phfPT7SYyAqnQE1JH+trU+0vCk309iBFTFVIyAIij9fhIjoCqmYgQUQen3kxgBVTEVI6AISr+fxAioiqkYAUVQ+v0kRkBVTMUIKILS7ycxAqpiKkZAEZR+P4kRUBVTMQKKoPT7SYyAqpiKEVAEpd9PYgRUxVTsiXciXdr5xeKHb78moBg3/X4SI6AqHQF9eGH5xvfV/xJQjJh+P4kRUJXOgC4fgRJQjJ5+P4kRUJWOgM4uTZ79/Ks/Xfjer786MMzn8/rb1vpIw5N+P4kRUJWOgM5vcDk7hKDfT2IEVKUroLNP6wL66OK0eOWL5UePr+xNp+9eX/3WoQ8IKDT0+0mMgKp0BXSR0K8+++fdnX/47MDnPa4Hen9vK6Drmq5ieugDAgoR/X4SI6Aq3QGdVz2JdGf62sEH16bnr88fXJ6ev2U/IKAQ0e8nMQKq0iugs49OfBH6a9P3939+f2/9OPTcJ+YDAgoV/X4SI6AqvQJ6co8vb/Xx5vrR6M1lVA99QEChot9PYgRUpXdAv/3V2clk5+xb/V7D9Oji+d99MJ3+9Pryg2vTD8svlk/rD31AQKGi309iBFSlb0APXs70cp+Abp5DWtZy/9Ho/b3ztw59sPr/Pr/S5489mdZHGp70+wFO6qiALvv5zItvvvH9ngW9M52+d2v+lyvTRS4JKBzo9wOc1BEBvbs7efY35Wf3Lk3K5UU6bL7SuXwuaauZr3xx6IND/4j+0XXrIw1P+v0kxqfwKv0CenXy7OZp+NmlyXPdAd24MzUPOp/yCJSAQkC/n8QIqEqvgK4vardyd/fZ/q9pMg86CSiGot9PYgRUpVdAD72Q/kSvqi+Z5Fl4DE+/n8QIqMowAX18eTuTm5d8rl8HuvUBAYWKfj+JEVCVXgGdXZq8s//B7UmPT+GvrR5frkLKO5EwPP1+EiOgKr0CevInke7vLV/G9OCD8o73RUZf3X/7+6EPCChU9PtJjICq9Avo3d3JmV+Xn/3p9V4vY1p8hr665tL15QcPti/A9ICrMWEA+v0kRkBV+gV09Uaks2fP9n4r0vzBz6bTc++tH2U+uLJI5rtP+4CAQkO/n8QIqErPgM7/sLt+J+fO2736eXL629b6SMOTfj+JEVCVvgGdz758Y/EI9MWPT3pdOwIKF/r9JEZAVXoHdHD629b6SMOTfj+JEVAVUzECiqD0+0mMgKqYihFQBKXfT2IEVMVUjIAiKP1+EiOgKqZiBBRB6feTGAFVMRUjoAhKv5/ECKiKqRgBRVD6/SRGQFVMxQgogtLvJzECqmIqRkARlH4/iRFQFVOxo67G9IPfEFCMmn4/iRFQlV4BfXhh63qgBBRjpN9PYgRUpWdAT/BdPAgoWtDvJzECqtIroIe+qRwBxRjp95MYAVXpFdD5jc23hSegGCn9fhIjoCr9AvrtLyeTZ158c+0ng1zSTn/bWh9peJuln3QAABwGSURBVNLvJzECqtIroA8vTLYN8wVR/W1rfaThSb+fxAioCgFFDvr9JEZAVXoF1IX+trU+0vCk309iBFTFVIyAIij9fhIjoCqmYscGdPb1gP0koDgV/X4SI6AqpmJHB/TLHy+/+PnwR28N9V3l9Let9ZGGJ/1+EiOgKj0DOvt09ezRwwuTMwO9KUl/21ofaXjS7ycxAqrSM6BXJ5Mzf737vd/O/m4yeXaYx6D629b6SMOTfj+JEVCVfgG9PZm8vX5H/B92B7qwiP62tT7S8KTfT2IEVKVfQK9OXt6/pMiNyXMEFKOj309iBFSlV0BXFxNZB/TuLi+kx/jo95MYAVXpFdBVOtcBHeradvrb1vpIw5N+P4kRUBUCihz0+0mMgKr0Cujs0vKJo3U5bw/0NLz+trU+0vCk309iBFSlV0BXTxytArqIKU8iYXz0+0mMgKr0C+jd3clL35SA3nt9MtDV6fW3rfWRhif9fhIjoCr9Arp4CDqZnN3defH7ix9fHqSfBBSnot9PYgRUpWdA57/f3VwNdKB+ElCcin4/iRFQlb4BnX/7q7OLej4z3DeI19+21kcanvT7SYyAqvQO6OD0t631kYYn/X4SI6AqpmLHXw/0qwH7SUBxKvr9JEZAVUzFjr8e6AKfwmOc9PtJjICq9Azo7NL+t5R7aaArKutvW+sjDU/6/SRGQFX6BXTZz50X//Nn//TGoqDDvI6egOJU9PtJjICq9Avo7f1XL81+OeF6oBgh/X4SI6AqvQK6eAB68OrPq7yVEyOk309iBFSlV0AfXth6+ybXA8UY6feTGAFV6RnQrWZyOTuMkX4/iRFQlV4BXV2Rfu3uLpezw/jo95MYAVXpFdBD3wfpxkDvhtffttZHGp70+0mMgKr0C+jDC5MffrPp5zCfwRNQnIp+P4kRUJWOgM4+erN4Y/U60H9+c3cyefEnfAqP0dHvJzECqtIR0MVDzyfxJBLGR7+fxAioCgFFDpUj+X/4DpH2pegIqCP9bWt9pOGpciStjzQ8SftSmIoRUARVOZLWRxqepH0pTMUIKIKqHEnrIw1P0r4UpmJHB/SPn+37nGfhMTqVI2l9pOFJ2peiZ0APvqccTyJhlCpH0vpIw5O0L0W/gN7mWXiMXOVIWh9peJL2pegV0Nmlyc7HX+37eoh+ElCcSuVIWh9peJL2pegV0IcXBrqIMgGFSuVIWh9peJL2pegZ0IHe/05AoVI5ktZHGp6kfSl6BXR2iYBi5CpH0vpIw5O0L0WvgM5v8Ck8Rq5yJK2PNDxJ+1L0C+ih7+lBQDFClSNpfaThSdqXol9A5/cuTM68ucHl7DA+lSNpfaThSdqXomdAP+V1oBi3ypG0PtLwJO1L0S+gN3ghPUauciStjzQ8SftS9ApoeSH9IJ+3E1CIVI6k9ZGGJ2lfil4B9XgOiYDiVCpH0vpIw5O0L0XPgPI6UIxc5UhaH2l4kval6BVQXkiP0ascSesjDU/SvhS9AjrY94InoFCpHEnrIw1P0r4U/QI6u7TzNgHFmFWOpPWRhidpX4peAZ19VL4vPC+kx3hVjqT1kYYnaV+KXgE139yY14FifCpH0vpIw5O0LwUBRQ6VI2l9pOFJ2peiV0Bd6G9b6yMNT5UjaX2k4Unal8JUjIAiqMqRtD7S8CTtS2EqRkARVOVIWh9peJL2pTAVOyKg3361jW8qh/GpHEnrIw1P0r4UvQLq8iSSXusjDU+VI2l9pOFJ2pen4Vl4BFU5ktZHGp6kfSl6BXT2x8/W/v71yc4/fM4L6TE6lSNpfaThSdqXoldAt93dfXaYK4Pqb1vrIw1PlSNpfaThSdqX4sQBHezCIvrb1vpIw1PlSFofaXiS9qU4eUCHegiqv22tjzQ8VY6k9ZGGJ2lfipMHdKirK+tvW+sjDU+VI2l9pOFJ2pfi5AG9u0tAMT6VI2l9pOFJ2pfixAGdXZ3wKTzGp3IkrY80PEn7UvQK6OyjzaVA33xjd8KTSBihypG0PtLwJO1L0Sugh19Iz8uYMEKVI2l9pOFJ2pfixAF95q2BvkG8/ra1PtLwVDmS1kcanqR9KXoF1IX+trU+0vBUOZLWRxqepH0pTMUIKIKqHEnrIw1P0r4UpmIEFEFVjqT1kYYnaV8KUzECiqAqR9L6SMOTtC+FqZgN6NYLmA7wbY0xPpUjaX2k4Unal6IjoOZKoFwPFGNVOZLWRxqepH0pCChyqBxJ6yMNT9K+FB0Btb7cnfBOJIxR5UhaH2l4kvalOFFAZz9f5PPMbwbpJwHFqVSOpPWRhidpX4qTBPQPi4efO0O9EYmA4lQqR9L6SMOTtC9F/4AO+vCTgOKUKkfS+kjDk7QvRe+Aloef/26wfBJQnE7lSFofaXiS9qXoGdB7Az/8JKA4pcqRtD7S8CTtS9EvoIM//CSgOKXKkbQ+0vAk7UvRJ6D3Li2vAjrow08CilOqHEnrIw1P0r4UPQJaHn6+PXA+CShOp3IkrY80PEn7UnQG1OfhJwHFKVWOpPWRhidpX4qugP7e5+EnAcUpVY6k9ZGGJ2lfio6A8l54BFE5ktZHGp6kfSkIKHKoHEnrIw1P0r4UHQHleqAIonIkrY80PEn7UnQE1JH+trU+0vBUOZLWRxqepH0pTMUIKIKqHEnrIw1P0r4UpmIEFEFVjqT1kYYnaV8KUzECiqAqR9L6SMOTtC+FqRgBRVCVI2l9pOFJ2pfCVIyAIqjKkbQ+0vAk7UthKkZAEVTlSFofaXiS9qUwFSOgCKpyJK2PNDxJ+1KYihFQBFU5ktZHGp6kfSlMxQgogqocSesjDU/SvhSmYgQUQVWOpPWRhidpXwpTMQKKoCpH0vpIw5O0L4WpGAFFUJUjaX2k4Unal8JUjIAiqMqRtD7S8CTtS2EqRkARVOVIWh9peJL2pTAVI6AIqnIkrY80PEn7UpiKEVAEVTmS1kcanqR9KUzFCCiCqhxJ6yMNT9K+FKZiBBRBVY6k9ZGGJ2lfClMxAoqgKkfS+kjDk7QvhakYAUVQlSNpfaThSdqXwlSMgCKoypG0PtLwJO1LYSpGQBFU5UhaH2l4kvalMBUjoAiqciStjzQ8SftSmIoRUARVOZLWRxqepH0pTMUIKIKqHEnrIw1P0r4UpmIEFEFVjqT1kYYnaV8KUzECiqAqR9L6SMOTtC+FqRgBRVCVI2l9pOFJ2pfCVIyAIqjKkbQ+0vAk7UthKkZAEVTlSFofaXiS9qUwFSOgCKpyJK2PNDxJ+1KYihFQBFU5ktZHGp6kfSlMxQgogqocSesjDU/SvhSmYgQUQVWOpPWRhidpXwpTMQKKoCpH0vpIw5O0L4WpGAFFUJUjaX2k4Unal8JUjIAiqMqRtD7S8CTtS2EqRkARVOVIWh9peJL2pTAVI6AIqnIkrY80PEn7UpiKEVAEVTmS1kcanqR9KUzFCCiCqhxJ6yMNT9K+FKZiBBRBVY6k9ZGGJ2lfClMxAoqgKkfS+kjDk7QvhakYAUVQlSNpfaThSdqXwlSMgCKoypG0PtLwJO1LYSpGQBFU5UhaH2l4kvalMBUjoAiqciStjzQ8SftSmIrpAvpvP5tOz717vfz80cVp8coXy48eX9mbTte/Q0AhUjmS1kcanqR9KYYK6L+sknnuk+UH9/e2Arqu6SqmBBQilSNpfaThSdqXYqCA3pme+9v5/MHlVSfvTF87+K1r0/PXl79z/hYBhU7lSFofaXiS9qUYJqCPL08/XP64eLT5YWnm+/u/dX9v/Th09eCUgEKjciStjzQ8SftSDBPQRxfXn6GXdD6+vBXLm+tHoze3okpAcWqVI2l9pOFJ2pdimIDuKwF9dPH87z6YTn96ffUr5bHp4U/rCShOq3IkrY80PEn7Ugwb0NUn6pvnkJbp3H80en9v80XQ51e0f/NS6yMNT5UjaX2k4Unal6cRB3T1+fqd6fS9W/O/XFk+J09AMYzKkbQ+0vAk7cvTaAN6Z/Uyps2XPZefz28F1LyQSf/ouvWRhqfKkbQ+0vAk7UsxZEDv7J378HBPz996yiNQAgqBypG0PtLwJO1LMWBAb07NK5WWDzoJKIZROZLWRxqepH0phgvov9h+rprJs/AYROVIWh9peJL2pRgqoI+vTV9df41z86r6VTM3r//kdaCQqhxJ6yMNT9K+FEMF9NrWWzWvrR5srkLKO5EwiMqRtD7S8CTtSzFQQG9uv9X9/t7yZUwPPii/tsjoq7wXHnKVI2l9pOFJ2pdimIBurl+38FrJ6eoCTNeXv/eAqzFhAJUjaX2k4Unal2KYgN6ZHgro/MHy4qDvrR9yPriy+OV3b9l/Rn/bWh9peKocSesjDU/SvhTDBLSG/ra1PtLwVDmS1kcanqR9KUzFCCiCqhxJ6yMNT9K+FKZiBBRBVY6k9ZGGJ2lfClMxAoqgKkfS+kjDk7QvhakYAUVQlSNpfaThSdqXwlSMgCKoypG0PtLwJO1LYSpGQBFU5UhaH2l4kvalMBUjoAiqciStjzQ8SftSmIoRUARVOZLWRxqepH0pTMUIKIKqHEnrIw1P0r4UpmIEFEFVjqT1kYYnaV8KUzECiqAqR9L6SMOTtC+FqRgBRVCVI2l9pOFJ2pfCVIyAIqjKkbQ+0vAk7UthKkZAEVTlSFofaXiS9qUwFSOgCKpyJK2PNDxJ+1KYihFQBFU5ktZHGp6kfSlMxQgogqocSesjDU/SvhSmYgQUQVWOpPWRhidpXwpTMQKKoCpH0vpIw5O0L4WpGAFFUJUjaX2k4Unal8JUjIAiqMqRtD7S8CTtS2EqRkARVOVIWh9peJL2pTAVI6AIqnIkrY80PEn7UpiKEVAEVTmS1kcanqR9KUzFCCiCqhxJ6yMNT9K+FKZiBBRBVY6k9ZGGJ2lfClMxAoqgKkfS+kjDk7QvhakYAUVQlSNpfaThSdqXwlSMgCKoypG0PtLwJO1LYSpGQBFU5UhaH2l4kvalMBUjoAiqciStjzQ8SftSmIoRUARVOZLWRxqepH0pTMUIKIKqHEnrIw1P0r4UpmIEFEFVjqT1kYYnaV8KUzECiqAqR9L6SMOTtC+FqRgBRVCVI2l9pOFJ2pfCVIyAIqjKkbQ+0vAk7UthKkZAEVTlSFofaXiS9qUwFSOgCKpyJK2PNDxJ+1KYihFQBFU5ktZHGp6kfSlMxQgogqocSesjDU/SvhSmYgQUQVWOpPWRhidpXwpTMQKKoCpH0vpIw5O0L4WpGAFFUJUjaX2k4Unal8JUjIAiqMqRtD7S8CTtS2EqRkARVOVIWh9peJL2pTAVI6AIqnIkrY80PEn7UpiKEVAEVTmS1kcanqR9KUzFCCiCqhxJ6yMNT9K+FKZiBBRBVY6k9ZGGJ2lfClMxAoqgKkfS+kjDk7QvhakYAUVQlSNpfaThSdqXwlSMgCKoypG0PtLwJO1LYSpGQBFU5UhaH2l4kvalMBUjoAiqciStjzQ8SftSmIoRUARVOZLWRxqepH0pTMUIKIKqHEnrIw1P0r4UpmIEFEFVjqT1kYYnaV8KUzECiqAqR9L6SMOTtC+FqRgBRVCVI2l9pOFJ2pfCVIyAIqjKkbQ+0vAk7UthKkZAEVTlSFofaXiS9qUwFSOgCKpyJK2PNDxJ+1KYihFQBFU5ktZHGp6kfSlMxQgogqocSesjDU/SvhSmYgQUQVWOpPWRhidpXwpTMQKKoCpH0vpIw5O0L4WpGAFFUJUjaX2k4Unal8JUjIAiqMqRtD7S8CTtS2EqRkARVOVIWh9peJL2pTAVI6AIqnIkrY80PEn7UpiKEVAEVTmS1kcanqR9KUzFCCiCqhxJ6yMNT9K+FKZiBBRBVY6k9ZGGJ2lfClMxAoqgKkfS+kjDk7QvhakYAUVQlSNpfaThSdqXwlSMgCKoypG0PtLwJO1LYSpGQBFU5UhaH2l4kvalMBVrGFC91kcanipH0vpIw5O0L0/DI1AEVTmS1kcanqR9KUzFCCiCqhxJ6yMNT9K+FKZiBBRBVY6k9ZGGJ2lfClMxAoqgKkfS+kjDk7QvhakYAUVQlSNpfaThSdqXwlSMgCKoypG0PtLwJO1LYSpGQBFU5UhaH2l4kvalMBUjoAiqciStjzQ8SftSmIoRUARVOZLWRxqepH0pTMUIKIKqHEnrIw1P0r4UpmIEFEFVjqT1kYYnaV8KUzECiqAqR9L6SMOTtC+FqRgBRVCVI2l9pOFJ2pfCVIyAIqjKkbQ+0vAk7UthKkZAEVTlSFofaXiS9qUwFSOgCKpyJK2PNDxJ+1KYihFQBFU5ktZHGp6kfSlMxQgogqocSesjDU/SvhSmYgQUQVWOpPWRhidpXwpTMQKKoCpH0vpIw5O0L4WpGAFFUJUjaX2k4Unal8JUjIAiqMqRtD7S8CTtS2EqRkARVOVIWh9peJL2pTAVI6AIqnIkrY80PEn7UpiKEVAEVTmS1kcanqR9KUzFCCiCqhxJ6yMNT9K+FKZiBBRBVY6k9ZGGJ2lfClMxAoqgKkfS+kjDk7QvhakYAUVQlSNpfaThSdqXwlSMgCKoypG0PtLwJO1LYSpGQBFU5UhaH2l4kvalMBUjoAiqciStjzQ8SftSmIoRUARVOZLWRxqepH0pTMUIKIKqHEnrIw1P0r4UpmIEFEFVjqT1kYYnaV8KUzECiqAqR9L6SMOTtC+FqRgBRVCVI2l9pOFJ2pfCVIyAIqjKkbQ+0vAk7UthKkZAEVTlSFofaXiS9qUwFSOgCKpyJK2PNDxJ+1KYihFQBFU5ktZHGp6kfSlMxQgogqocSesjDU/SvhSmYgQUQVWOpPWRhidpXwpTMQKKoCpH0vpIw5O0L4WpGAFFUJUjaX2k4Unal8JUjIAiqMqRtD7S8CTtS2EqRkARVOVIWh9peJL2pTAVI6AIqnIkrY80PEn7UpiKEVAEVTmS1kcanqR9KUzFCCiCqhxJ6yMNT9K+FKZiBBRBVY6k9ZGGJ2lfClMxAoqgKkfS+kjDk7QvhakYAUVQlSNpfaThSdqXwlSMgCKoypG0PtLwJO1LYSpGQBFU5UhaH2l4kvalMBUjoAiqciStjzQ8SftSmIoRUARVOZLWRxqepH0pTMUIKIKqHEnrIw1P0r4UpmIEFEFVjqT1kYYnaV8KUzECiqAqR9L6SMOTtC+FqRgBRVCVI2l9pOFJ2pfCVIyAIqjKkbQ+0vAk7UthKkZAEVTlSFofaXiS9qUwFSOgCKpyJK2PNDxJ+1KYihFQBFU5ktZHGp6kfSlMxQgogqocSesjDU/SvhSmYgQUQVWOpPWRhidpXwpTMQKKoCpH0vpIw5O0L4WpGAFFUJUjaX2k4Unal8JUjIAiqMqRtD7S8CTtS2EqRkARVOVIWh9peJL2pTAVI6AIqnIkrY80PEn7UpiKEVAEVTmS1kcanqR9KUzFCCiCqhxJ6yMNT9K+FKZiBBRBVY6k9ZGGJ2lfClMxAoqgKkfS+kjDk7QvhakYAUVQlSNpfaThSdqXwlSMgCKoypG0PtLwJO1LYSpGQBFU5UhaH2l4kvalMBUjoAiqciStjzQ8SftSmIp5BPTxlb3p9N3rBBRKlSNpfaThSdqXwj+gjy5Ol175goBCqHIkrY80PEn7UvgH9Nr0/PX5g8vT87cIKHQqR9L6SMOTtC+Fe0Dv75XHno8unvuEgEKnciStjzQ8SftSuAf05vS19Y/vE1DoVI6k9ZGGJ2lfCveAXpt+WH68sw4pAYVE5UhaH2l4kval8A7o48vrT93v722+CPr8iv7van2k4alyJK2PNDxJ+/I0qQIKAJ48A2peyKR/dP3dxD2JToxEpWFAzeuYWt8TWXBPohMjUSGg2XBPohMjUfEOqOez8N9N3JPoxEhU3AO6ef2nw+tAv5u4J9GJkai4B9TxnUjfTdyT6MRIVNwD+vjy9FWn98J/N3FPohMjUXEP6PyB29WYvpu4J9GJkaj4B3T+4Mqin+/esr/c+p7IgnsSnRiJSoOAHqH1PZEF9yQ6MRIVUzECGh73JDoxEhVTMQIaHvckOjESFVMxAhoe9yQ6MRIVUzECGh73JDoxEhVTMQIaHvckOjESFVMxAhoe9yQ6MRIVUzECGh73JDoxEhVTMQIaHvckOjESFVMxAhoe9yQ6MRIVUzECGh73JDoxEhVTMQIaHvckOjESFVMxAhoe9yQ6MRIVUzECGh73JDoxEhVTMQIaHvckOjESFVMxAhoe9yQ6MRIVUzECGh73JDoxEhVTMQIaHvckOjESFVMxAhoe9yQ6MRIVUzECGh73JDoxEhVTMQIaHvckOjESFVMxAhoe9yQ6MRIVUzECGh73JDoxEhVTMQIaHvckOjESFVMxAhoe9yQ6MRIVUzECGh73JDoxEhVTMQIaHvckOjESFVOxhgGFxvPPt/43wOgxkoEQ0PA4G+jESAZCQMPjbKATIxkIAQ2Ps4FOjGQgBDQ8zgY6MZKBENDwOBvoxEgGQkDD42ygEyMZCAEFgEoEFAAqEVAAqERAAaASAQWASgQUACoRUACoREABoBIBDeHRxen7+z995Yum/y4Yk8eXp+dv7f/0w7b/Mt9BBDSERUDPfbL5KQHFgft7m/+23tlPKdwQ0BAWAZ2+tvkpAcWWm9PVIB5d3Pw3Fn4IaAiLw/E368/PCCgO2Xx55+bmP7FwREBDWFTzf+xtHmisfnxwZTqdvnu96b8WxuBO+fLO/fU+FsPYm05/en31858tRvLv/7bhv1x2BDSEZTXXjzDWAb2zOCUL53ja4Dvv8eXlMq6tP0O5vzWM9c95aDocAhrCsprrJ1lXAV0cjXf/9/zxv0z5uhfu75375P7e6hmkxSf0792aP/7X5RdGF4v5D4tf/Lc9RjIYAhpCqebqk7RVQDdf8LrGowssVnD+v6wjuRnGzen7PK3kgICGsKpmqWX56f5L/njpCrZfpPH48rqZy0eki5W8+j9b/nt9BxDQEFYBLY8oyk/3H1vwnDzmy/+OrmewaObG4lduLn989b/yn9jhENAQNs8cLR5vrgO6PjAEFPPV483yk+Vj0YOAzv/8N+Wn75HQoRDQEDadvDZ9n0egeMJWQM2XPR//9+Urmd5/2j8EAQIawqaTi/Px3/gaKKz9gD7t/fCP/5WRDIaAhrD/QPPO9K/2eBYexn5AF8NY/Wz5X9bNa+sPfhdqBDSEg8/Ur62+uLV6HehfrvA6UMy3E/no4vT89fn8z3uLR6LLKzUtfv7gMv+VHQwBDeEgoIty8k4kGFuPMdfDmL43P3gn0qt8nXwoBDSEreeKNhff4b3w2Lf9SfrqvfD/ePDzv/qPfAI/GAIKAJUIKABUIqAAUImAAkAlAgoAlQgoAFQioABQiYACQCUCCgCVCCgAVCKgAFCJgAJAJQIKAJUIKABUIqAAUImAAkAlAgoAlQgoAFQioABQiYACQCUCCgCVCCgAVCKgAFCJgAJAJQIKAJUIKABUIqAAUImAAkAlAgoAlQgoAFQioABQiYACQCUCCgCVCCgAVCKgAFCJgAJAJQIKAJUIKABUIqAAUImAAkAlAgoAlQgoAFQioABQiYACQCUCCgCVCCgAVCKgAFCJgAJAJQIKAJUIKABUIqAAUOn/A71FEGOQyBlxAAAAAElFTkSuQmCC">
+            <a:extLst>
+              <a:ext uri="{FF2B5EF4-FFF2-40B4-BE49-F238E27FC236}">
+                <a16:creationId xmlns:a16="http://schemas.microsoft.com/office/drawing/2014/main" id="{27CC6064-973B-4FF1-9446-C7722D5F572B}"/>
+              </a:ext>
+            </a:extLst>
+          </p:cNvPr>
+          <p:cNvSpPr>
+            <a:spLocks noChangeAspect="1" noChangeArrowheads="1"/>
+          </p:cNvSpPr>
+          <p:nvPr/>
+        </p:nvSpPr>
+        <p:spPr bwMode="auto">
+          <a:xfrm>
+            <a:off x="2895600" y="228600"/>
+            <a:ext cx="6400800" cy="6400800"/>
+          </a:xfrm>
+          <a:prstGeom prst="rect">
+            <a:avLst/>
+          </a:prstGeom>
+          <a:noFill/>
+          <a:extLst>
+            <a:ext uri="{909E8E84-426E-40DD-AFC4-6F175D3DCCD1}">
+              <a14:hiddenFill xmlns:a14="http://schemas.microsoft.com/office/drawing/2010/main">
+                <a:solidFill>
+                  <a:srgbClr val="FFFFFF"/>
+                </a:solidFill>
+              </a14:hiddenFill>
+            </a:ext>
+          </a:extLst>
+        </p:spPr>
+        <p:txBody>
+          <a:bodyPr vert="horz" wrap="square" lIns="91440" tIns="45720" rIns="91440" bIns="45720" numCol="1" anchor="t" anchorCtr="0" compatLnSpc="1">
+            <a:prstTxWarp prst="textNoShape">
+              <a:avLst/>
+            </a:prstTxWarp>
+          </a:bodyPr>
+          <a:lstStyle/>
+          <a:p>
+            <a:endParaRPr lang="en-US"/>
+          </a:p>
+        </p:txBody>
+      </p:sp>
+      <p:sp>
+        <p:nvSpPr>
+          <p:cNvPr id="6" name="AutoShape 4" descr="data:image/png;base64,iVBORw0KGgoAAAANSUhEUgAABUAAAAPACAMAAADDuCPrAAABYlBMVEUAAAAAADoAAGYAOjoAOmYAOpAAZrYzMzM6AAA6OgA6Ojo6OmY6ZmY6ZpA6ZrY6kLY6kNtNTU1NTW5NTY5Nbm5Nbo5NbqtNjshmAABmADpmOgBmOjpmZjpmZmZmZpBmkGZmkLZmkNtmtttmtv9uTU1ubk1ubm5ubo5ujqtujshuq8huq+SOTU2Obk2Obm6Oq8iOyOSOyP+QOgCQOjqQZjqQZmaQZpCQkGaQkLaQtraQttuQ2/+rbk2rjk2rjm6rq8iryOSr5Mir5P+2ZgC2Zjq2kDq2kGa2kJC2tpC2tra2ttu229u22/+2///Ijk3Ijm7Iq27Iq6vIyKvI5KvI5OTI5P/I///bkDrbkGbbtmbbtpDbtrbb27bb29vb2//b/7bb///kq27kyI7kyKvk5P/k///r6+v8jVn/tmb/yI7/25D/27b/29v/5Kv/5Mj/5OT//7b//7///8j//9v//+T///+zjZs9AAAACXBIWXMAAB2HAAAdhwGP5fFlAAAgAElEQVR4nO3d/59b5ZnecU0wMDGEILMYh0CWwmwDxaSLN3S7xHW3mGQXkni3aY0TEijO1q2/YMe1rP+/0iNpRnPbM+fMM9e5n3PffN4/xB472Eiv6/mgGUlnJnMAQJVJ638BAIiKgAJAJQIKAJUIKABUIqAAUImAAkAlAgoAlQgoAFQioABQiYACQCUCCgCVCCgAVCKgAFCJgAJAJQIKAJVGENDZl298fzKZ7Lzw8Ten/rNuT570zvzhhcnOLwT/pgCwrXlAZ7/aPWjdS6dNKAEF4Kd1QO+9fih2p+0cAQXgp3FA7y4ffu689dXip9/+6vuCgh78ud/7reRPAoCjtA3o4qHh1ufts1/KCkpAAQyvbUCvLor59tbHy8/An1P8wQQUwPCaBnT5CfzLh37lRvmapeRPJqAABtY0oItcmswtP6d/rvzGwQPRq5vK3vv5Irg7P/jNwT/9zuzT3cnOC09+1n84oJsnka4ufyh/ygsfL3/9yx8vev3Cr/f/f+YvAIBjtQzo7NKTn7Cvmroo3n7/NvWbfWpe7LQM6NUjnro/OqA31n/Iywd/4PpB8BN/AQAcq2VAlw837efrt1c9vHrwO4tfefabVW03VtVdpPBs+fDZJ3t3ZED/fv8Pefvq4ddOPfkXAMCxWgZ0UbknHjyuo3r7IGLrli4fOb709Xz+7aebx4zlseQPv5l/+/VT/+inBnRh+Rn6l4tP1Z+Z7Lz9zeqZ/+fmT/0LAOBYLQN6+ymffS8D+vJ866Xv68/mtx6t3l5/5fTGMaE7OqAvb/6MzV9wdfUQ9il/AQAca6QBXdZxlbr180nbTysdPCY98kWjRwZ0/aubv2a+/yWCp/wFAHCssQZ0UcDypc3lVyaXMdtu2u39xj7lq58rRwb0uYO/5p1D/9en/AUAcKyRfg10Gc7ye+uQbj/Ds3mW58YxT/YcGdCXD//K/v/1aX8BABxrbM/C70f19qFP5W3f7Cfd1qkDeuRjWwDYGOfrQOclcYuIbR6IElAA4zPOdyItlbcNbV7OtPlSqPmntQHliSMAJ9I0oFu5XNt6L3z5HH7/qZ2rTz6vIw3o0/4CADhW26sx2Zdy3t765HnxmPDZ/7X/ls7tp9xv7H95VBjQp/wFAHCstgEtX3k8eOf5jcn2C5tulDderku2deGmzfNM2oA+5S8AgGM1viL9veUVlQ9dkf7gC5Grq9VvSrZ8F9GZX6+/h9LmvZfCgD7lLwCAY435eyJd3X42fPtp8lUbxQF98i8AgGO1Duih78q5c/g6crcn28+Mz36++b+dWV2wUxzQJ/8CADhW84AufPnz5Sfvz7xovy/89lVBl/60vN7x+lrIc31An/gLAOBYYwgoAIREQAGgEgEFgEoEFAAqEVAAqERAAaASAQWASgQUACoRUACoREABoBIBBYBKBBQAKhFQAKhEQAGgEgEFgEoEFAAqEVAAqNQwoP8HEtyT6MRIVEzFCGh43JPoxEhUTMUIaHjck+jESFRMxQhoeNyT6MRIVEzFCGh43JPoxEhUTMUIaHjck+jESFRMxQhoeNyT6MRIVEzFCGh43JPoxEhUTMUIaHjck+jESFRMxQhoeNyT6MRIVEzFCGh43JPoxEhUTMUIaHjck+jESFRMxQhoeNyT6MRIVEzFCGh43JPoxEhUTMUIaHjck+jESFRMxQhoeNyT6MRIVEzFCGh43JPoxEhUTMUIaHjck+jESFRMxQhoeNyT6MRIVEzFCGh43JPoxEhUTMUIaHjck+jESFRMxQhoeNyT6MRIVEzFCGh43JPoxEhUTMUIaHjck+jESFRMxQhoeNyT6MRIVEzFCGh43JPoxEhUTMUIaHjck+jESFRMxQhoeNyT6MRIVEzFCGh43JPoxEhUTMUIaHjck+jESFRMxQhoeNyT6MRIVEzFCGh43JPoxEhUTMUIaHjck+jESFRMxQhoeNyT6MRIVEzFCGh43JPoxEhUTMUIaHjck+jESFRMxQhoeNyT6MRIVEzFUgX0/+I7RL+fxAioiqkYAUVQ+v0kRkBVTMUIKILS7ycxAqpiKkZAEZR+P4kRUBVTMQKKoPT7SYyAqpiKEVAEpd9PYgRUxVSMgCIo/X4SI6AqpmIEFEHp95MYAVUxFSOgCEq/n8QIqIqpGAFFUPr9JEZAVUzFCCiC0u8nMQKqYipGQBGUfj+JEVAVUzECiqD0+0mMgKqYihFQBKXfT2IEVMVUjIAiKP1+EiOgKqZiBBRB6feTGAFVMRUjoAhKv5/ECKiKqRgBRVD6/SRGQFVMxQgogtLvJzECqmIqRkARlH4/iRFQFVMxAoqg9PtJjICqmIoRUASl309iBFTFVIyAIij9fhIjoCqmYgQUQen3kxgBVTEVI6AISr+fxAioiqkYAUVQ+v0kRkBVTMUIKILS7ycxAqpiKkZAEZR+P4kRUBVTMQKKoPT7SYyAqpiKEVAEpd9PYgRUxVSMgCIo/X4SI6AqpmKnDeiji6+tf/b4yt50+u71rg8IKDT0+0mMgKqIA3pt+tqmpNOlV744/gMCChH9fhIjoCrSgD6+Nt0E9Nr0/PX5g8vT87eO/YCAQkS/n8QIqIoyoP/2wXQT0Pt75RHmo4vnPjnuAwIKFf1+EiOgKsKA3pxO3/vzOqA39398/7gPCChU9PtJjICqKAP66j/O76zzeG36YfmxfHz0BwQUKvr9JEZAVYQB3cri48vrT9Dv752/dfQHq3/m+ZVT/s1P0fpIw5N+P8BJEVAEpd8PcFL6gL7yxdEfHPpH9Y+uWx9peNLvJzE+hVcZPKDdj0AJKAT0+0mMgKoQUOSg309iBFRlmIDyLDy86feTGAFVGSigm1d5rl/6edQHBBQq+v0kRkBVBgoo70SCM/1+EiOgKgMF9PHl6av773g/+gMCChX9fhIjoCoDBXT+YPuaS0d/QEAhot9PYgRUZaiAzh9cWVTy3VtdHxBQaOj3kxgBVREH9BT0t631kYYn/X4SI6AqpmIEFEHp95MYAVUxFSOgCEq/n8QIqIqpGAFFUPr9JEZAVUzFCCiC0u8nMQKqYipGQBGUfj+JEVAVUzECiqD0+0mMgKqYihFQBKXfT2IEVMVUjIAiKP1+EiOgKqZiBBRB6feTGAFVMRUjoAhKv5/ECKiKqRgBRVD6/SRGQFVMxQgogtLvJzECqmIqRkARlH4/iRFQFVMxAoqg9PtJjICqmIoRUASl309iBFTFVIyAIij9fhIjoCqmYgQUQen3kxgBVTEVI6AISr+fxAioiqkYAUVQ+v0kRkBVTMUIKILS7ycxAqpiKkZAEZR+P4kRUBVTMQKKoPT7SYyAqpiKEVAEpd9PYgRUxVSMgCIo/X4SI6AqpmIEFEHp95MYAVUxFSOgCEq/n8QIqIqpGAFFUPr9JEZAVUzFCCiC0u8nMQKqYipGQBGUfj+JEVAVUzECiqD0+0mMgKqYihFQBKXfT2IEVMVUjIAiKP1+EiOgKqZiBBRB6feTGAFVMRUjoAhKv5/ECKiKqRgBRVD6/SRGQFVMxQgogtLvJzECqmIqRkARlH4/iRFQFVMxAoqg9PtJjICqmIoRUASl309iBFTFVIyAIij9fhIjoCqmYgQUQen3kxgBVTEVI6AISr+fxAioiqkYAUVQ+v0kRkBVTMUIKILS7ycxAqpiKkZAEZR+P4kRUBVTMQKKoPT7SYyAqpiKEVAEpd9PYgRUxVSMgCIo/X4SI6AqpmIEFEHp95MYAVUxFSOgCEq/n8QIqIqpGAFFUPr9JEZAVUzFCCiC0u8nMQKqYipGQBGUfj+JEVAVUzECiqD0+0mMgKqYihFQBKXfT2IEVMVUjIAiKP1+EiOgKqZiBBRB6feTGAFVMRUjoAhKv5/ECKiKqRgBRVD6/SRGQFVMxQgogtLvJzECqmIqRkARlH4/iRFQFVMxAoqg9PtJjICqmIoRUASl309iBFTFVIyAIij9fhIjoCqmYgQUQen3kxgBVTEVI6AISr+fxAioiqkYAUVQ+v0kRkBVTMUIKILS7ycxAqpiKkZAEZR+P4kRUBVTMQKKoPT7SYyAqpiKEVAEpd9PYgRUxVSMgCIo/X4SI6AqpmIEFEHp95MYAVUxFSOgCEq/n8QIqIqpGAFFUPr9JEZAVUzFCCiC0u8nMQKqYipGQBGUfj+JEVAVU7GGAdVrfaThqfXaAB6BIiz9fhLjEaiKqRgBRVD6/SRGQFVMxQgogtLvJzECqmIqRkARlH4/iRFQFVMxAoqg9PtJjICqmIoRUASl309iBFTFVIyAIij9fhIjoCqmYgQUQen3kxgBVTEVI6AISr+fxAioiqkYAUVQ+v0kRkBVTMUIKILS7ycxAqpiKkZAEZR+P4kRUBVTMQKKoPT7SYyAqpiKEVAEpd9PYgRUxVSMgCIo/X4SI6AqpmIEFEHp95MYAVUxFSOgCEq/n8QIqIqpGAFFUPr9JEZAVUzFCCiC0u8nMQKqYipGQBGUfj+JEVAVUzECiqD0+0mMgKqYihFQBKXfT2IEVMVUjIAiKP1+EiOgKqZiBBRB6feTGAFVMRUjoAhKv5/ECKiKqRgBRVD6/SRGQFVMxQgogtLvJzECqmIqRkARlH4/iRFQFVMxAoqg9PtJjICqmIoRUASl309iBFTFVIyAIij9fhIjoCqmYgQUQen3kxgBVTEVI6AISr+fxAioiqkYAUVQ+v0kRkBVTMUIKILS7ycxAqpiKkZAEZR+P4kRUBVTMQKKoPT7SYyAqpiKEVAEpd9PYgRUxVSMgCIo/X4SI6AqpmIEFEHp95MYAVUxFSOgCEq/n8QIqIqpGAFFUPr9JEZAVUzFCCiC0u8nMQKqYipGQBGUfj+JEVAVUzECiqD0+0mMgKqYihFQBKXfT2IEVMVUjIAiKP1+EiOgKqZiBBRB6feTGAFVMRUjoAhKv5/ECKiKqRgBRVD6/SRGQFVMxQgogtLvJzECqmIqRkARlH4/iRFQFVMxAoqg9PtJjICqmIoRUASl309iBFTFVIyAIij9fhIjoCqmYgQUQen3kxgBVTEVI6AISr+fxAioiqkYAUVQ+v0kRkBVTMUIKILS7ycxAqpiKkZAEZR+P4kRUBVTMQKKoPT7SYyAqpiKEVAEpd9PYgRUxVSMgCIo/X4SI6AqpmIEFEHp95MYAVUxFSOgCEq/n8QIqIqpGAFFUPr9JEZAVUzFCCiC0u8nMQKqYipGQBGUfj+JEVAVUzECiqD0+0mMgKqYihFQBKXfT2IEVMVUjIAiKP1+EiOgKqZiBBRB6feTGAFVMRUjoAhKv5/ECKiKqRgBRVD6/SRGQFVMxQgogtLvJzECqmIqRkARlH4/iRFQFVMxAoqg9PtJjICqmIoRUASl309iBFTFVIyAIij9fhIjoCqmYgQUQen3kxgBVTEVI6AISr+fxAioiqmYKKCPL083XvliPn908eDni9+8sjedvnudgEJJv5/ECKiKS0Dv720FdF3TVUwJKET0+0mMgKoME9CN+3vnPln8cGf62sGvXZuevz5/cHl6/hYBhY5+P4kRUJVBA7p4IPr+qpnvbzV1/Ti0pJWAQkS/n8QIqMqgAb25epj5+PJWLG+uH43e3IoqAcWp6feTGAFVGTKgjy5OP1z9eP53H0ynP72+/ODa6tcOf1pPQHFa+v0kRkBVhgzo5sHm5jmkZTr3H43e39t8EfT5FeXfvNL6SMOTfj/ASSkDuv9lzjvT6Xu35n+5Ml18TEAxDP1+gJNSBvTO5on2zSPR5XNJWwE1L2TSP7pufaThSb+fxPgUXmW4gD6+vP5q56GiPuURKAGFgH4/iRFQleEC+sRDzPIrBBTD0O8nMQKqMlxAn3iafdVMnoXHIPT7SYyAqgwX0P1Xz+9/Ll+auXn9J68DhZR+P4kRUJXBArr16vlrqwebq5DyTiQMQr+fxAioymABfXRx/0ug9/eWL2N68EF5Vn6R0Vd5Lzzk9PtJjICqDBbQ7SeJbq4vxnR9+cEDrsaEAej3kxgBVRksoHe2H2I++Nl0eu699ccPriz6+e4t+w/ob1vrIw1P+v0kRkBVBgvoielvW+sjDU/6/SRGQFVMxQgogtLvJzECqmIqRkARlH4/iRFQFVMxAoqg9PtJjICqmIoRUASl309iBFTFVKwjoLM/fvY5AcUY6feTGAFV6RvQe//pm/n84euTyeTMLwgoxke/n8QIqErPgN6YfO+38/nVydLyZwQUI6PfT2IEVKVfQG+XbN7dnTz7zb0Lk5cJKEZHv5/ECKhKv4BeXZRzmdGdXyz/d/lzAopx0e8nMQKq0iugs0vLcq4z+vDCMJ/D629b6yMNT/r9JEZAVXoFdNXMhxcmz80JKMZJv5/ECKjKCQJ6d3fyDgHFSOn3kxgBVekV0NWn8DfKl0D5GihGSb+fxAioSq+Azq9Onls+/b4sJ8/CY5T0+0mMgKr0C+jt8gLQxWfws59PVo9DCSjGRb+fxAioSr+ALj59X3iuPJG0884g/SSgOBX9fhIjoCo9Azq/99FPPl788PBHP/jNMP0koDgV/X4SI6AqfQM6PP1ta32k4Um/n8QIqIqp2LEBnX09YD8JKE5Fv5/ECKiKqdjRAf3yx8v3wz/80VuDvIaJgOKU9PtJjICq9Azo7NPVdZgeXpicGeZiTAQUp6LfT2IEVKVnQK9OJmf+evd7v5393WSg19ETUJyKfj+JEVCVfgG9PZm8vX4P5x9Wb+gkoBgX/X4SI6Aq/QJ6dfnuo/Wb4G+US4oQUIyLfj+JEVCVXgFdvRd+HdC7u1xMBOOj309iBFSlV0A3l7Mr5eRqTBgj/X4SI6AqBBQ56PeTGAFV6RXQ2aXlE0frcnI5O4yRfj+JEVCVXgFdPXG0CugipjyJhPHR7ycxAqrSL6B3dycvfVMCeu91LmeHMdLvJzECqtIvoOVydmd3d178/uLHYa6nTEBxKvr9JEZAVXoGdP773cnaQP0koDgV/X4SI6AqfQM6//ZXZxf1fGawy4ESUJyKfj+JEVCV3gEdnP62tT7S8KTfT2IEVMVUjOuBIij9fhIjoCqmYlwPFEHp95MYAVXpGVCuB4qR0+8nMQKq0jOgXA8UI6ffT2IEVKVfQLkeKMZOv5/ECKhKv4ByPVCMnX4/iRFQlV4B5XqgGD39fhIjoCq9Asrl7DB6+v0kRkBVCChy0O8nMQKq0iugXA8Uo6ffT2IEVKVXQLkeKEZPv5/ECKhKv4ByPVCMnX4/iRFQlX4B5XqgGDv9fhIjoCo9A8r1QDFy+v0kRkBV+gaU64Fi3PT7SYyAqvQO6OD0t631kYYn/X4SI6AqpmIEFEHp95MYAVUxFTvihfQ/emnQaykTUJyafj+JEVCVfgG9MJk8M9iVlAkoBPT7SYyAqvQK6OpyypMzHw/ZUP1ta32k4Um/n8QIqEqvgC786celoS98TEAxSvr9JEZAVfoGdL76rkgLQ72QSX/bWh9peNLvJzECqnKCgC4+lf/y9WVCd94a4ikl/W1rfaThSb+fxAioyokCuvDtz8tbkl7QPwzV37bWRxqe9PtJjICqnCigs199f/OGzslLBBRjot9PYgRUpX9AN/VcPhf/7af698Trb1vrIw1P+v0kRkBVegZ0/dXPg1eD6i+rrL9trY80POn3kxgBVekV0NmliX3ySP+NPfS3rfWRhif9fhIjoCq9Arp8J9LO4ZcvPbzAI1CMiX4/iRFQlZ4B/cGvzS/NPle/lEl/21ofaXjS7ycxAqrSK6Au9Let9ZGGJ/1+EiOgKqZiBBRB6feTGAFVMRXruCL9ztlB3oREQHFq+v0kRkBV+gb0xv4r6PmeSBgj/X4SI6AqPQO67OczL775Bt+VEyOl309iBFSlX0Dv7k6eXb2K6d4lvi88xki/n8QIqEq/gF49eN/R7NLkOQKK0dHvJzECqtIroLNLW4867+6qX0JPQHF6+v0kRkBVegX00Ps29W/iJKA4Pf1+EiOgKgQUOej3kxgBVekV0NmlyTv7H+ivw0RAcXr6/SRGQFV6BZQnkTB6+v0kRkBV+gX07u7kzOpyIn96nZcxYYz0+0mMgKr0C+jqjUhnz54d8q1Icq2PNDy1XhtwzFs5/7C7fifnztsD/dX6/zi0PtLwpN9PYjwCVekb0PnsyzcWj0Bf/HiQJ5AIKE5Lv5/ECKhK74AOTn/bWh9peNLvJzECqmIqRkARlH4/iRFQFVMxG9DZR28+6Se8DhSjo99PYgRUpSOgy28n9wTeiYTx0e8nMQKqQkCRg34/iRFQlY6AOtLfttZHGp70+0mMgKqYihFQBKXfT2IEVMVU7PiAfjVcPgkoTke/n8QIqIqp2NEB/fLH5X1IP/gNAcUY6feTGAFV6RnQ2aX9p5BeGui9SPrb1vpIw5N+P4kRUJV+AV32c+fFf/jsn97YnQx0NTsCilPR7ycxAqrSL6A3JpMfrh54zn452bq4MgHFWOj3kxgBVekV0MUD0INr2F3lgsoYIf1+EiOgKr0C+vDCoe/KyQvpMT76/SRGQFV6BpRvKoeR0+8nMQKq0iugfF94jJ5+P4kRUJVeAZ3f2Pq65w2+BooR0u8nMQKq0i+gs0v7L/+8MdC1RAgoTkW/n8QIqEqvgM4+Wr7+88W3Pvvn5Y8vDHNVUP1ta32k4Um/n8QIqEqvgLpc1E5/21ofaXjS7ycxAqpCQJGDfj+JEVCVXgF1ob9trY80POn3kxgBVTEVI6AISr+fxAioiqkYAUVQ+v0kRkBVTMWODugfP9v3OS+kx+jo95MYAVXpGdDf7/JN5TBq+v0kRkBV+gX0Nt+VEyOn309iBFSlV0BnlyY7H3+17+sh+klAcSr6/SRGQFV6BfThhYEuokxAoaLfT2IEVKVnQAd6/zsBhYp+P4kRUJVeAZ1dIqAYOf1+EiOgKr0COr/Bp/AYOf1+EiOgKv0Ceuh7ehBQjJB+P4kRUJV+AZ3fuzA58+aG+kJ2BBSnp99PYgRUpWdAP+V1oBg3/X4SI6Aq/QJ6gxfSY+T0+0mMgKr0Cmh5If0gn7cTUIjo95MYAVXpFVCP55AIKE5Fv5/ECKhKz4DyOlCMnH4/iRFQlV4B5YX0GD39fhIjoCq9Ajq/MXmZgGLU9PtJjICq9Avo7NLO2wQUY6bfT2IEVKVXQGcfvTGZ7LzIC+kxXvr9JEZAVXoF1HxbY14HivHR7ycxAqpCQJGDfj+JEVCVXgF1ob9trY80POn3kxgBVTEVI6AISr+fxAioiqkYAUVQ+v0kRkBVTMVsQGd/tN8F/uGPz77A10AxOvr9JEZAVToC+vDC6imj2UebFy9tfoWAYlT0+0mMgKr0DOhBNgkoRkm/n8QIqAoBRQ76/SRGQFUIKHLQ7ycxAqpCQJGDfj+JEVAVAooc9PtJjICqEFDkoN9PYgRUhYAiB/1+EiOgKgQUOej3kxgBVSGgyEG/n8QIqAoBRQ76/SRGQFUIKHLQ7ycxAqrSHdAnEVCMj34/iRFQFQKKHPT7SYyAqnQEdPbRm0/im8phfPT7SYyAqnQE1JH+trU+0vCk309iBFTFVIyAIij9fhIjoCqmYgQUQen3kxgBVTEVI6AISr+fxAioiqkYAUVQ+v0kRkBVTMUIKILS7ycxAqpiKkZAEZR+P4kRUBVTMQKKoPT7SYyAqpiKEVAEpd9PYgRUxVTsiXciXdr5xeKHb78moBg3/X4SI6AqHQF9eGH5xvfV/xJQjJh+P4kRUJXOgC4fgRJQjJ5+P4kRUJWOgM4uTZ79/Ks/Xfjer786MMzn8/rb1vpIw5N+P4kRUJWOgM5vcDk7hKDfT2IEVKUroLNP6wL66OK0eOWL5UePr+xNp+9eX/3WoQ8IKDT0+0mMgKp0BXSR0K8+++fdnX/47MDnPa4Hen9vK6Drmq5ieugDAgoR/X4SI6Aq3QGdVz2JdGf62sEH16bnr88fXJ6ev2U/IKAQ0e8nMQKq0iugs49OfBH6a9P3939+f2/9OPTcJ+YDAgoV/X4SI6AqvQJ6co8vb/Xx5vrR6M1lVA99QEChot9PYgRUpXdAv/3V2clk5+xb/V7D9Oji+d99MJ3+9Pryg2vTD8svlk/rD31AQKGi309iBFSlb0APXs70cp+Abp5DWtZy/9Ho/b3ztw59sPr/Pr/S5489mdZHGp70+wFO6qiALvv5zItvvvH9ngW9M52+d2v+lyvTRS4JKBzo9wOc1BEBvbs7efY35Wf3Lk3K5UU6bL7SuXwuaauZr3xx6IND/4j+0XXrIw1P+v0kxqfwKv0CenXy7OZp+NmlyXPdAd24MzUPOp/yCJSAQkC/n8QIqEqvgK4vardyd/fZ/q9pMg86CSiGot9PYgRUpVdAD72Q/kSvqi+Z5Fl4DE+/n8QIqMowAX18eTuTm5d8rl8HuvUBAYWKfj+JEVCVXgGdXZq8s//B7UmPT+GvrR5frkLKO5EwPP1+EiOgKr0CevInke7vLV/G9OCD8o73RUZf3X/7+6EPCChU9PtJjICq9Avo3d3JmV+Xn/3p9V4vY1p8hr665tL15QcPti/A9ICrMWEA+v0kRkBV+gV09Uaks2fP9n4r0vzBz6bTc++tH2U+uLJI5rtP+4CAQkO/n8QIqErPgM7/sLt+J+fO2736eXL629b6SMOTfj+JEVCVvgGdz758Y/EI9MWPT3pdOwIKF/r9JEZAVXoHdHD629b6SMOTfj+JEVAVUzECiqD0+0mMgKqYihFQBKXfT2IEVMVUjIAiKP1+EiOgKqZiBBRB6feTGAFVMRUjoAhKv5/ECKiKqRgBRVD6/SRGQFVMxQgogtLvJzECqmIqRkARlH4/iRFQFVOxo67G9IPfEFCMmn4/iRFQlV4BfXhh63qgBBRjpN9PYgRUpWdAT/BdPAgoWtDvJzECqtIroIe+qRwBxRjp95MYAVXpFdD5jc23hSegGCn9fhIjoCr9AvrtLyeTZ158c+0ng1zSTn/bWh9peJuln3QAABwGSURBVNLvJzECqtIroA8vTLYN8wVR/W1rfaThSb+fxAioCgFFDvr9JEZAVXoF1IX+trU+0vCk309iBFTFVIyAIij9fhIjoCqmYscGdPb1gP0koDgV/X4SI6AqpmJHB/TLHy+/+PnwR28N9V3l9Let9ZGGJ/1+EiOgKj0DOvt09ezRwwuTMwO9KUl/21ofaXjS7ycxAqrSM6BXJ5Mzf737vd/O/m4yeXaYx6D629b6SMOTfj+JEVCVfgG9PZm8vX5H/B92B7qwiP62tT7S8KTfT2IEVKVfQK9OXt6/pMiNyXMEFKOj309iBFSlV0BXFxNZB/TuLi+kx/jo95MYAVXpFdBVOtcBHeradvrb1vpIw5N+P4kRUBUCihz0+0mMgKr0Cujs0vKJo3U5bw/0NLz+trU+0vCk309iBFSlV0BXTxytArqIKU8iYXz0+0mMgKr0C+jd3clL35SA3nt9MtDV6fW3rfWRhif9fhIjoCr9Arp4CDqZnN3defH7ix9fHqSfBBSnot9PYgRUpWdA57/f3VwNdKB+ElCcin4/iRFQlb4BnX/7q7OLej4z3DeI19+21kcanvT7SYyAqvQO6OD0t631kYYn/X4SI6AqpmLHXw/0qwH7SUBxKvr9JEZAVUzFjr8e6AKfwmOc9PtJjICq9Azo7NL+t5R7aaArKutvW+sjDU/6/SRGQFX6BXTZz50X//Nn//TGoqDDvI6egOJU9PtJjICq9Avo7f1XL81+OeF6oBgh/X4SI6AqvQK6eAB68OrPq7yVEyOk309iBFSlV0AfXth6+ybXA8UY6feTGAFV6RnQrWZyOTuMkX4/iRFQlV4BXV2Rfu3uLpezw/jo95MYAVXpFdBD3wfpxkDvhtffttZHGp70+0mMgKr0C+jDC5MffrPp5zCfwRNQnIp+P4kRUJWOgM4+erN4Y/U60H9+c3cyefEnfAqP0dHvJzECqtIR0MVDzyfxJBLGR7+fxAioCgFFDpUj+X/4DpH2pegIqCP9bWt9pOGpciStjzQ8SftSmIoRUARVOZLWRxqepH0pTMUIKIKqHEnrIw1P0r4UpmJHB/SPn+37nGfhMTqVI2l9pOFJ2peiZ0APvqccTyJhlCpH0vpIw5O0L0W/gN7mWXiMXOVIWh9peJL2pegV0Nmlyc7HX+37eoh+ElCcSuVIWh9peJL2pegV0IcXBrqIMgGFSuVIWh9peJL2pegZ0IHe/05AoVI5ktZHGp6kfSl6BXR2iYBi5CpH0vpIw5O0L0WvgM5v8Ck8Rq5yJK2PNDxJ+1L0C+ih7+lBQDFClSNpfaThSdqXol9A5/cuTM68ucHl7DA+lSNpfaThSdqXomdAP+V1oBi3ypG0PtLwJO1L0S+gN3ghPUauciStjzQ8SftS9ApoeSH9IJ+3E1CIVI6k9ZGGJ2lfil4B9XgOiYDiVCpH0vpIw5O0L0XPgPI6UIxc5UhaH2l4kval6BVQXkiP0ascSesjDU/SvhS9AjrY94InoFCpHEnrIw1P0r4U/QI6u7TzNgHFmFWOpPWRhidpX4peAZ19VL4vPC+kx3hVjqT1kYYnaV+KXgE139yY14FifCpH0vpIw5O0LwUBRQ6VI2l9pOFJ2peiV0Bd6G9b6yMNT5UjaX2k4Unal8JUjIAiqMqRtD7S8CTtS2EqRkARVOVIWh9peJL2pTAVOyKg3361jW8qh/GpHEnrIw1P0r4UvQLq8iSSXusjDU+VI2l9pOFJ2pen4Vl4BFU5ktZHGp6kfSl6BXT2x8/W/v71yc4/fM4L6TE6lSNpfaThSdqXoldAt93dfXaYK4Pqb1vrIw1PlSNpfaThSdqX4sQBHezCIvrb1vpIw1PlSFofaXiS9qU4eUCHegiqv22tjzQ8VY6k9ZGGJ2lfipMHdKirK+tvW+sjDU+VI2l9pOFJ2pfi5AG9u0tAMT6VI2l9pOFJ2pfixAGdXZ3wKTzGp3IkrY80PEn7UvQK6OyjzaVA33xjd8KTSBihypG0PtLwJO1L0Sugh19Iz8uYMEKVI2l9pOFJ2pfixAF95q2BvkG8/ra1PtLwVDmS1kcanqR9KXoF1IX+trU+0vBUOZLWRxqepH0pTMUIKIKqHEnrIw1P0r4UpmIEFEFVjqT1kYYnaV8KUzECiqAqR9L6SMOTtC+FqZgN6NYLmA7wbY0xPpUjaX2k4Unal6IjoOZKoFwPFGNVOZLWRxqepH0pCChyqBxJ6yMNT9K+FB0Btb7cnfBOJIxR5UhaH2l4kvalOFFAZz9f5PPMbwbpJwHFqVSOpPWRhidpX4qTBPQPi4efO0O9EYmA4lQqR9L6SMOTtC9F/4AO+vCTgOKUKkfS+kjDk7QvRe+Aloef/26wfBJQnE7lSFofaXiS9qXoGdB7Az/8JKA4pcqRtD7S8CTtS9EvoIM//CSgOKXKkbQ+0vAk7UvRJ6D3Li2vAjrow08CilOqHEnrIw1P0r4UPQJaHn6+PXA+CShOp3IkrY80PEn7UnQG1OfhJwHFKVWOpPWRhidpX4qugP7e5+EnAcUpVY6k9ZGGJ2lfio6A8l54BFE5ktZHGp6kfSkIKHKoHEnrIw1P0r4UHQHleqAIonIkrY80PEn7UnQE1JH+trU+0vBUOZLWRxqepH0pTMUIKIKqHEnrIw1P0r4UpmIEFEFVjqT1kYYnaV8KUzECiqAqR9L6SMOTtC+FqRgBRVCVI2l9pOFJ2pfCVIyAIqjKkbQ+0vAk7UthKkZAEVTlSFofaXiS9qUwFSOgCKpyJK2PNDxJ+1KYihFQBFU5ktZHGp6kfSlMxQgogqocSesjDU/SvhSmYgQUQVWOpPWRhidpXwpTMQKKoCpH0vpIw5O0L4WpGAFFUJUjaX2k4Unal8JUjIAiqMqRtD7S8CTtS2EqRkARVOVIWh9peJL2pTAVI6AIqnIkrY80PEn7UpiKEVAEVTmS1kcanqR9KUzFCCiCqhxJ6yMNT9K+FKZiBBRBVY6k9ZGGJ2lfClMxAoqgKkfS+kjDk7QvhakYAUVQlSNpfaThSdqXwlSMgCKoypG0PtLwJO1LYSpGQBFU5UhaH2l4kvalMBUjoAiqciStjzQ8SftSmIoRUARVOZLWRxqepH0pTMUIKIKqHEnrIw1P0r4UpmIEFEFVjqT1kYYnaV8KUzECiqAqR9L6SMOTtC+FqRgBRVCVI2l9pOFJ2pfCVIyAIqjKkbQ+0vAk7UthKkZAEVTlSFofaXiS9qUwFSOgCKpyJK2PNDxJ+1KYihFQBFU5ktZHGp6kfSlMxQgogqocSesjDU/SvhSmYgQUQVWOpPWRhidpXwpTMQKKoCpH0vpIw5O0L4WpGAFFUJUjaX2k4Unal8JUjIAiqMqRtD7S8CTtS2EqRkARVOVIWh9peJL2pTAVI6AIqnIkrY80PEn7UpiKEVAEVTmS1kcanqR9KUzFCCiCqhxJ6yMNT9K+FKZiBBRBVY6k9ZGGJ2lfClMxAoqgKkfS+kjDk7QvhakYAUVQlSNpfaThSdqXwlSMgCKoypG0PtLwJO1LYSpGQBFU5UhaH2l4kvalMBUjoAiqciStjzQ8SftSmIrpAvpvP5tOz717vfz80cVp8coXy48eX9mbTte/Q0AhUjmS1kcanqR9KYYK6L+sknnuk+UH9/e2Arqu6SqmBBQilSNpfaThSdqXYqCA3pme+9v5/MHlVSfvTF87+K1r0/PXl79z/hYBhU7lSFofaXiS9qUYJqCPL08/XP64eLT5YWnm+/u/dX9v/Th09eCUgEKjciStjzQ8SftSDBPQRxfXn6GXdD6+vBXLm+tHoze3okpAcWqVI2l9pOFJ2pdimIDuKwF9dPH87z6YTn96ffUr5bHp4U/rCShOq3IkrY80PEn7Ugwb0NUn6pvnkJbp3H80en9v80XQ51e0f/NS6yMNT5UjaX2k4Unal6cRB3T1+fqd6fS9W/O/XFk+J09AMYzKkbQ+0vAk7cvTaAN6Z/Uyps2XPZefz28F1LyQSf/ouvWRhqfKkbQ+0vAk7UsxZEDv7J378HBPz996yiNQAgqBypG0PtLwJO1LMWBAb07NK5WWDzoJKIZROZLWRxqepH0phgvov9h+rprJs/AYROVIWh9peJL2pRgqoI+vTV9df41z86r6VTM3r//kdaCQqhxJ6yMNT9K+FEMF9NrWWzWvrR5srkLKO5EwiMqRtD7S8CTtSzFQQG9uv9X9/t7yZUwPPii/tsjoq7wXHnKVI2l9pOFJ2pdimIBurl+38FrJ6eoCTNeXv/eAqzFhAJUjaX2k4Unal2KYgN6ZHgro/MHy4qDvrR9yPriy+OV3b9l/Rn/bWh9peKocSesjDU/SvhTDBLSG/ra1PtLwVDmS1kcanqR9KUzFCCiCqhxJ6yMNT9K+FKZiBBRBVY6k9ZGGJ2lfClMxAoqgKkfS+kjDk7QvhakYAUVQlSNpfaThSdqXwlSMgCKoypG0PtLwJO1LYSpGQBFU5UhaH2l4kvalMBUjoAiqciStjzQ8SftSmIoRUARVOZLWRxqepH0pTMUIKIKqHEnrIw1P0r4UpmIEFEFVjqT1kYYnaV8KUzECiqAqR9L6SMOTtC+FqRgBRVCVI2l9pOFJ2pfCVIyAIqjKkbQ+0vAk7UthKkZAEVTlSFofaXiS9qUwFSOgCKpyJK2PNDxJ+1KYihFQBFU5ktZHGp6kfSlMxQgogqocSesjDU/SvhSmYgQUQVWOpPWRhidpXwpTMQKKoCpH0vpIw5O0L4WpGAFFUJUjaX2k4Unal8JUjIAiqMqRtD7S8CTtS2EqRkARVOVIWh9peJL2pTAVI6AIqnIkrY80PEn7UpiKEVAEVTmS1kcanqR9KUzFCCiCqhxJ6yMNT9K+FKZiBBRBVY6k9ZGGJ2lfClMxAoqgKkfS+kjDk7QvhakYAUVQlSNpfaThSdqXwlSMgCKoypG0PtLwJO1LYSpGQBFU5UhaH2l4kvalMBUjoAiqciStjzQ8SftSmIoRUARVOZLWRxqepH0pTMUIKIKqHEnrIw1P0r4UpmIEFEFVjqT1kYYnaV8KUzECiqAqR9L6SMOTtC+FqRgBRVCVI2l9pOFJ2pfCVIyAIqjKkbQ+0vAk7UthKkZAEVTlSFofaXiS9qUwFSOgCKpyJK2PNDxJ+1KYihFQBFU5ktZHGp6kfSlMxQgogqocSesjDU/SvhSmYgQUQVWOpPWRhidpXwpTMQKKoCpH0vpIw5O0L4WpGAFFUJUjaX2k4Unal8JUjIAiqMqRtD7S8CTtS2EqRkARVOVIWh9peJL2pTAVI6AIqnIkrY80PEn7UpiKEVAEVTmS1kcanqR9KUzFCCiCqhxJ6yMNT9K+FKZiBBRBVY6k9ZGGJ2lfClMxAoqgKkfS+kjDk7QvhakYAUVQlSNpfaThSdqXwlSMgCKoypG0PtLwJO1LYSpGQBFU5UhaH2l4kvalMBUjoAiqciStjzQ8SftSmIoRUARVOZLWRxqepH0pTMUIKIKqHEnrIw1P0r4UpmIEFEFVjqT1kYYnaV8KUzECiqAqR9L6SMOTtC+FqRgBRVCVI2l9pOFJ2pfCVIyAIqjKkbQ+0vAk7UthKkZAEVTlSFofaXiS9qUwFSOgCKpyJK2PNDxJ+1KYihFQBFU5ktZHGp6kfSlMxQgogqocSesjDU/SvhSmYgQUQVWOpPWRhidpXwpTMQKKoCpH0vpIw5O0L4WpGAFFUJUjaX2k4Unal8JUjIAiqMqRtD7S8CTtS2EqRkARVOVIWh9peJL2pTAVI6AIqnIkrY80PEn7UpiKEVAEVTmS1kcanqR9KUzFCCiCqhxJ6yMNT9K+FKZiBBRBVY6k9ZGGJ2lfClMxAoqgKkfS+kjDk7QvhakYAUVQlSNpfaThSdqXwlSMgCKoypG0PtLwJO1LYSpGQBFU5UhaH2l4kvalMBVrGFC91kcanipH0vpIw5O0L0/DI1AEVTmS1kcanqR9KUzFCCiCqhxJ6yMNT9K+FKZiBBRBVY6k9ZGGJ2lfClMxAoqgKkfS+kjDk7QvhakYAUVQlSNpfaThSdqXwlSMgCKoypG0PtLwJO1LYSpGQBFU5UhaH2l4kvalMBUjoAiqciStjzQ8SftSmIoRUARVOZLWRxqepH0pTMUIKIKqHEnrIw1P0r4UpmIEFEFVjqT1kYYnaV8KUzECiqAqR9L6SMOTtC+FqRgBRVCVI2l9pOFJ2pfCVIyAIqjKkbQ+0vAk7UthKkZAEVTlSFofaXiS9qUwFSOgCKpyJK2PNDxJ+1KYihFQBFU5ktZHGp6kfSlMxQgogqocSesjDU/SvhSmYgQUQVWOpPWRhidpXwpTMQKKoCpH0vpIw5O0L4WpGAFFUJUjaX2k4Unal8JUjIAiqMqRtD7S8CTtS2EqRkARVOVIWh9peJL2pTAVI6AIqnIkrY80PEn7UpiKEVAEVTmS1kcanqR9KUzFCCiCqhxJ6yMNT9K+FKZiBBRBVY6k9ZGGJ2lfClMxAoqgKkfS+kjDk7QvhakYAUVQlSNpfaThSdqXwlSMgCKoypG0PtLwJO1LYSpGQBFU5UhaH2l4kvalMBUjoAiqciStjzQ8SftSmIoRUARVOZLWRxqepH0pTMUIKIKqHEnrIw1P0r4UpmIEFEFVjqT1kYYnaV8KUzECiqAqR9L6SMOTtC+FqRgBRVCVI2l9pOFJ2pfCVIyAIqjKkbQ+0vAk7UthKkZAEVTlSFofaXiS9qUwFSOgCKpyJK2PNDxJ+1KYihFQBFU5ktZHGp6kfSlMxQgogqocSesjDU/SvhSmYgQUQVWOpPWRhidpXwpTMQKKoCpH0vpIw5O0L4WpGAFFUJUjaX2k4Unal8JUjIAiqMqRtD7S8CTtS2EqRkARVOVIWh9peJL2pTAVI6AIqnIkrY80PEn7UpiKEVAEVTmS1kcanqR9KUzFCCiCqhxJ6yMNT9K+FKZiBBRBVY6k9ZGGJ2lfClMxAoqgKkfS+kjDk7QvhakYAUVQlSNpfaThSdqXwlSMgCKoypG0PtLwJO1LYSpGQBFU5UhaH2l4kvalMBUjoAiqciStjzQ8SftSmIoRUARVOZLWRxqepH0pTMUIKIKqHEnrIw1P0r4UpmIEFEFVjqT1kYYnaV8KUzECiqAqR9L6SMOTtC+FqRgBRVCVI2l9pOFJ2pfCVIyAIqjKkbQ+0vAk7UthKkZAEVTlSFofaXiS9qUwFSOgCKpyJK2PNDxJ+1KYihFQBFU5ktZHGp6kfSlMxQgogqocSesjDU/SvhSmYgQUQVWOpPWRhidpXwpTMQKKoCpH0vpIw5O0L4WpGAFFUJUjaX2k4Unal8JUjIAiqMqRtD7S8CTtS2EqRkARVOVIWh9peJL2pTAVI6AIqnIkrY80PEn7UpiKEVAEVTmS1kcanqR9KUzFCCiCqhxJ6yMNT9K+FKZiBBRBVY6k9ZGGJ2lfClMxAoqgKkfS+kjDk7QvhakYAUVQlSNpfaThSdqXwlSMgCKoypG0PtLwJO1LYSpGQBFU5UhaH2l4kvalMBUjoAiqciStjzQ8SftSmIp5BPTxlb3p9N3rBBRKlSNpfaThSdqXwj+gjy5Ol175goBCqHIkrY80PEn7UvgH9Nr0/PX5g8vT87cIKHQqR9L6SMOTtC+Fe0Dv75XHno8unvuEgEKnciStjzQ8SftSuAf05vS19Y/vE1DoVI6k9ZGGJ2lfCveAXpt+WH68sw4pAYVE5UhaH2l4kval8A7o48vrT93v722+CPr8iv7van2k4alyJK2PNDxJ+/I0qQIKAJ48A2peyKR/dP3dxD2JToxEpWFAzeuYWt8TWXBPohMjUSGg2XBPohMjUfEOqOez8N9N3JPoxEhU3AO6ef2nw+tAv5u4J9GJkai4B9TxnUjfTdyT6MRIVNwD+vjy9FWn98J/N3FPohMjUXEP6PyB29WYvpu4J9GJkaj4B3T+4Mqin+/esr/c+p7IgnsSnRiJSoOAHqH1PZEF9yQ6MRIVUzECGh73JDoxEhVTMQIaHvckOjESFVMxAhoe9yQ6MRIVUzECGh73JDoxEhVTMQIaHvckOjESFVMxAhoe9yQ6MRIVUzECGh73JDoxEhVTMQIaHvckOjESFVMxAhoe9yQ6MRIVUzECGh73JDoxEhVTMQIaHvckOjESFVMxAhoe9yQ6MRIVUzECGh73JDoxEhVTMQIaHvckOjESFVMxAhoe9yQ6MRIVUzECGh73JDoxEhVTMQIaHvckOjESFVMxAhoe9yQ6MRIVUzECGh73JDoxEhVTMQIaHvckOjESFVMxAhoe9yQ6MRIVUzECGh73JDoxEhVTMQIaHvckOjESFVMxAhoe9yQ6MRIVUzECGh73JDoxEhVTMQIaHvckOjESFVOxhgGFxvPPt/43wOgxkoEQ0PA4G+jESAZCQMPjbKATIxkIAQ2Ps4FOjGQgBDQ8zgY6MZKBENDwOBvoxEgGQkDD42ygEyMZCAEFgEoEFAAqEVAAqERAAaASAQWASgQUACoRUACoREABoBIBDeHRxen7+z995Yum/y4Yk8eXp+dv7f/0w7b/Mt9BBDSERUDPfbL5KQHFgft7m/+23tlPKdwQ0BAWAZ2+tvkpAcWWm9PVIB5d3Pw3Fn4IaAiLw/E368/PCCgO2Xx55+bmP7FwREBDWFTzf+xtHmisfnxwZTqdvnu96b8WxuBO+fLO/fU+FsPYm05/en31858tRvLv/7bhv1x2BDSEZTXXjzDWAb2zOCUL53ja4Dvv8eXlMq6tP0O5vzWM9c95aDocAhrCsprrJ1lXAV0cjXf/9/zxv0z5uhfu75375P7e6hmkxSf0792aP/7X5RdGF4v5D4tf/Lc9RjIYAhpCqebqk7RVQDdf8LrGowssVnD+v6wjuRnGzen7PK3kgICGsKpmqWX56f5L/njpCrZfpPH48rqZy0eki5W8+j9b/nt9BxDQEFYBLY8oyk/3H1vwnDzmy/+OrmewaObG4lduLn989b/yn9jhENAQNs8cLR5vrgO6PjAEFPPV483yk+Vj0YOAzv/8N+Wn75HQoRDQEDadvDZ9n0egeMJWQM2XPR//9+Urmd5/2j8EAQIawqaTi/Px3/gaKKz9gD7t/fCP/5WRDIaAhrD/QPPO9K/2eBYexn5AF8NY/Wz5X9bNa+sPfhdqBDSEg8/Ur62+uLV6HehfrvA6UMy3E/no4vT89fn8z3uLR6LLKzUtfv7gMv+VHQwBDeEgoIty8k4kGFuPMdfDmL43P3gn0qt8nXwoBDSEreeKNhff4b3w2Lf9SfrqvfD/ePDzv/qPfAI/GAIKAJUIKABUIqAAUImAAkAlAgoAlQgoAFQioABQiYACQCUCCgCVCCgAVCKgAFCJgAJAJQIKAJUIKABUIqAAUImAAkAlAgoAlQgoAFQioABQiYACQCUCCgCVCCgAVCKgAFCJgAJAJQIKAJUIKABUIqAAUImAAkAlAgoAlQgoAFQioABQiYACQCUCCgCVCCgAVCKgAFCJgAJAJQIKAJUIKABUIqAAUImAAkAlAgoAlQgoAFQioABQiYACQCUCCgCVCCgAVCKgAFCJgAJAJQIKAJUIKABUIqAAUOn/A71FEGOQyBlxAAAAAElFTkSuQmCC">
+            <a:extLst>
+              <a:ext uri="{FF2B5EF4-FFF2-40B4-BE49-F238E27FC236}">
+                <a16:creationId xmlns:a16="http://schemas.microsoft.com/office/drawing/2014/main" id="{303DEEFB-7094-4F9F-A65F-D2AFDD19F5FE}"/>
+              </a:ext>
+            </a:extLst>
+          </p:cNvPr>
+          <p:cNvSpPr>
+            <a:spLocks noChangeAspect="1" noChangeArrowheads="1"/>
+          </p:cNvSpPr>
+          <p:nvPr/>
+        </p:nvSpPr>
+        <p:spPr bwMode="auto">
+          <a:xfrm>
+            <a:off x="5943600" y="3276600"/>
+            <a:ext cx="304800" cy="304800"/>
+          </a:xfrm>
+          <a:prstGeom prst="rect">
+            <a:avLst/>
+          </a:prstGeom>
+          <a:noFill/>
+          <a:extLst>
+            <a:ext uri="{909E8E84-426E-40DD-AFC4-6F175D3DCCD1}">
+              <a14:hiddenFill xmlns:a14="http://schemas.microsoft.com/office/drawing/2010/main">
+                <a:solidFill>
+                  <a:srgbClr val="FFFFFF"/>
+                </a:solidFill>
+              </a14:hiddenFill>
+            </a:ext>
+          </a:extLst>
+        </p:spPr>
+        <p:txBody>
+          <a:bodyPr vert="horz" wrap="square" lIns="91440" tIns="45720" rIns="91440" bIns="45720" numCol="1" anchor="t" anchorCtr="0" compatLnSpc="1">
+            <a:prstTxWarp prst="textNoShape">
+              <a:avLst/>
+            </a:prstTxWarp>
+          </a:bodyPr>
+          <a:lstStyle/>
+          <a:p>
+            <a:endParaRPr lang="en-US"/>
+          </a:p>
+        </p:txBody>
+      </p:sp>
     </p:spTree>
     <p:extLst>
       <p:ext uri="{BB962C8B-B14F-4D97-AF65-F5344CB8AC3E}">
-        <p14:creationId xmlns:p14="http://schemas.microsoft.com/office/powerpoint/2010/main" val="3079319670"/>
-      </p:ext>
-    </p:extLst>
-  </p:cSld>
-  <p:clrMapOvr>
-    <a:masterClrMapping/>
-  </p:clrMapOvr>
-</p:sld>
-</file>
-
-<file path=ppt/slides/slide8.xml><?xml version="1.0" encoding="utf-8"?>
-<p:sld xmlns:a="http://schemas.openxmlformats.org/drawingml/2006/main" xmlns:r="http://schemas.openxmlformats.org/officeDocument/2006/relationships" xmlns:p="http://schemas.openxmlformats.org/presentationml/2006/main">
-  <p:cSld>
-    <p:spTree>
-      <p:nvGrpSpPr>
-        <p:cNvPr id="1" name=""/>
-        <p:cNvGrpSpPr/>
-        <p:nvPr/>
-      </p:nvGrpSpPr>
-      <p:grpSpPr>
-        <a:xfrm>
-          <a:off x="0" y="0"/>
-          <a:ext cx="0" cy="0"/>
-          <a:chOff x="0" y="0"/>
-          <a:chExt cx="0" cy="0"/>
-        </a:xfrm>
-      </p:grpSpPr>
-      <p:sp>
-        <p:nvSpPr>
-          <p:cNvPr id="2" name="Title 1"/>
-          <p:cNvSpPr>
-            <a:spLocks noGrp="1"/>
-          </p:cNvSpPr>
-          <p:nvPr>
-            <p:ph type="title"/>
-          </p:nvPr>
-        </p:nvSpPr>
-        <p:spPr>
-          <a:xfrm>
-            <a:off x="557211" y="342900"/>
-            <a:ext cx="8534401" cy="685800"/>
-          </a:xfrm>
-        </p:spPr>
-        <p:txBody>
-          <a:bodyPr/>
-          <a:lstStyle/>
-          <a:p>
-            <a:r>
-              <a:rPr lang="en-US"/>
-              <a:t>How to mitigate attrition</a:t>
-            </a:r>
-            <a:endParaRPr lang="en-US" dirty="0"/>
-          </a:p>
-        </p:txBody>
-      </p:sp>
-      <p:sp>
-        <p:nvSpPr>
-          <p:cNvPr id="3" name="Text Placeholder 2"/>
-          <p:cNvSpPr>
-            <a:spLocks noGrp="1"/>
-          </p:cNvSpPr>
-          <p:nvPr>
-            <p:ph type="body" idx="1"/>
-          </p:nvPr>
-        </p:nvSpPr>
-        <p:spPr>
-          <a:xfrm>
-            <a:off x="684213" y="1193800"/>
-            <a:ext cx="8534400" cy="4800600"/>
-          </a:xfrm>
-        </p:spPr>
-        <p:txBody>
-          <a:bodyPr/>
-          <a:lstStyle/>
-          <a:p>
-            <a:r>
-              <a:rPr lang="en-US"/>
-              <a:t>Whole Team Provides content</a:t>
-            </a:r>
-            <a:endParaRPr lang="en-US" dirty="0"/>
-          </a:p>
-        </p:txBody>
-      </p:sp>
-    </p:spTree>
-    <p:extLst>
-      <p:ext uri="{BB962C8B-B14F-4D97-AF65-F5344CB8AC3E}">
-        <p14:creationId xmlns:p14="http://schemas.microsoft.com/office/powerpoint/2010/main" val="288936918"/>
+        <p14:creationId xmlns:p14="http://schemas.microsoft.com/office/powerpoint/2010/main" val="1982764186"/>
       </p:ext>
     </p:extLst>
   </p:cSld>

</xml_diff>